<commit_message>
edit to make picture and text orientated..did not work
</commit_message>
<xml_diff>
--- a/edoc person.pptx
+++ b/edoc person.pptx
@@ -3380,2169 +3380,42 @@
       </p:grpSpPr>
       <p:grpSp>
         <p:nvGrpSpPr>
-          <p:cNvPr id="53" name="Group 52"/>
+          <p:cNvPr id="56" name="Group 55"/>
           <p:cNvGrpSpPr/>
           <p:nvPr/>
         </p:nvGrpSpPr>
         <p:grpSpPr>
           <a:xfrm>
             <a:off x="2551082" y="0"/>
-            <a:ext cx="3364031" cy="5845947"/>
-            <a:chOff x="2876216" y="194834"/>
-            <a:chExt cx="3364031" cy="5845947"/>
+            <a:ext cx="3854072" cy="5845947"/>
+            <a:chOff x="2551082" y="0"/>
+            <a:chExt cx="3854072" cy="5845947"/>
           </a:xfrm>
         </p:grpSpPr>
-        <p:sp>
-          <p:nvSpPr>
-            <p:cNvPr id="48" name="Rounded Rectangle 47"/>
-            <p:cNvSpPr/>
-            <p:nvPr/>
-          </p:nvSpPr>
-          <p:spPr>
-            <a:xfrm rot="2967531">
-              <a:off x="3279954" y="2257246"/>
-              <a:ext cx="437696" cy="1245171"/>
-            </a:xfrm>
-            <a:custGeom>
-              <a:avLst/>
-              <a:gdLst>
-                <a:gd name="connsiteX0" fmla="*/ 0 w 413579"/>
-                <a:gd name="connsiteY0" fmla="*/ 68931 h 1069684"/>
-                <a:gd name="connsiteX1" fmla="*/ 68931 w 413579"/>
-                <a:gd name="connsiteY1" fmla="*/ 0 h 1069684"/>
-                <a:gd name="connsiteX2" fmla="*/ 344648 w 413579"/>
-                <a:gd name="connsiteY2" fmla="*/ 0 h 1069684"/>
-                <a:gd name="connsiteX3" fmla="*/ 413579 w 413579"/>
-                <a:gd name="connsiteY3" fmla="*/ 68931 h 1069684"/>
-                <a:gd name="connsiteX4" fmla="*/ 413579 w 413579"/>
-                <a:gd name="connsiteY4" fmla="*/ 1000753 h 1069684"/>
-                <a:gd name="connsiteX5" fmla="*/ 344648 w 413579"/>
-                <a:gd name="connsiteY5" fmla="*/ 1069684 h 1069684"/>
-                <a:gd name="connsiteX6" fmla="*/ 68931 w 413579"/>
-                <a:gd name="connsiteY6" fmla="*/ 1069684 h 1069684"/>
-                <a:gd name="connsiteX7" fmla="*/ 0 w 413579"/>
-                <a:gd name="connsiteY7" fmla="*/ 1000753 h 1069684"/>
-                <a:gd name="connsiteX8" fmla="*/ 0 w 413579"/>
-                <a:gd name="connsiteY8" fmla="*/ 68931 h 1069684"/>
-                <a:gd name="connsiteX0" fmla="*/ 0 w 413579"/>
-                <a:gd name="connsiteY0" fmla="*/ 68931 h 1069742"/>
-                <a:gd name="connsiteX1" fmla="*/ 68931 w 413579"/>
-                <a:gd name="connsiteY1" fmla="*/ 0 h 1069742"/>
-                <a:gd name="connsiteX2" fmla="*/ 344648 w 413579"/>
-                <a:gd name="connsiteY2" fmla="*/ 0 h 1069742"/>
-                <a:gd name="connsiteX3" fmla="*/ 413579 w 413579"/>
-                <a:gd name="connsiteY3" fmla="*/ 68931 h 1069742"/>
-                <a:gd name="connsiteX4" fmla="*/ 413579 w 413579"/>
-                <a:gd name="connsiteY4" fmla="*/ 1000753 h 1069742"/>
-                <a:gd name="connsiteX5" fmla="*/ 344648 w 413579"/>
-                <a:gd name="connsiteY5" fmla="*/ 1069684 h 1069742"/>
-                <a:gd name="connsiteX6" fmla="*/ 68931 w 413579"/>
-                <a:gd name="connsiteY6" fmla="*/ 1069684 h 1069742"/>
-                <a:gd name="connsiteX7" fmla="*/ 28307 w 413579"/>
-                <a:gd name="connsiteY7" fmla="*/ 1034665 h 1069742"/>
-                <a:gd name="connsiteX8" fmla="*/ 0 w 413579"/>
-                <a:gd name="connsiteY8" fmla="*/ 68931 h 1069742"/>
-                <a:gd name="connsiteX0" fmla="*/ 4022 w 417601"/>
-                <a:gd name="connsiteY0" fmla="*/ 68931 h 1069742"/>
-                <a:gd name="connsiteX1" fmla="*/ 72953 w 417601"/>
-                <a:gd name="connsiteY1" fmla="*/ 0 h 1069742"/>
-                <a:gd name="connsiteX2" fmla="*/ 348670 w 417601"/>
-                <a:gd name="connsiteY2" fmla="*/ 0 h 1069742"/>
-                <a:gd name="connsiteX3" fmla="*/ 417601 w 417601"/>
-                <a:gd name="connsiteY3" fmla="*/ 68931 h 1069742"/>
-                <a:gd name="connsiteX4" fmla="*/ 417601 w 417601"/>
-                <a:gd name="connsiteY4" fmla="*/ 1000753 h 1069742"/>
-                <a:gd name="connsiteX5" fmla="*/ 348670 w 417601"/>
-                <a:gd name="connsiteY5" fmla="*/ 1069684 h 1069742"/>
-                <a:gd name="connsiteX6" fmla="*/ 72953 w 417601"/>
-                <a:gd name="connsiteY6" fmla="*/ 1069684 h 1069742"/>
-                <a:gd name="connsiteX7" fmla="*/ 32329 w 417601"/>
-                <a:gd name="connsiteY7" fmla="*/ 1034665 h 1069742"/>
-                <a:gd name="connsiteX8" fmla="*/ 4022 w 417601"/>
-                <a:gd name="connsiteY8" fmla="*/ 68931 h 1069742"/>
-                <a:gd name="connsiteX0" fmla="*/ 5062 w 418641"/>
-                <a:gd name="connsiteY0" fmla="*/ 68931 h 1109463"/>
-                <a:gd name="connsiteX1" fmla="*/ 73993 w 418641"/>
-                <a:gd name="connsiteY1" fmla="*/ 0 h 1109463"/>
-                <a:gd name="connsiteX2" fmla="*/ 349710 w 418641"/>
-                <a:gd name="connsiteY2" fmla="*/ 0 h 1109463"/>
-                <a:gd name="connsiteX3" fmla="*/ 418641 w 418641"/>
-                <a:gd name="connsiteY3" fmla="*/ 68931 h 1109463"/>
-                <a:gd name="connsiteX4" fmla="*/ 418641 w 418641"/>
-                <a:gd name="connsiteY4" fmla="*/ 1000753 h 1109463"/>
-                <a:gd name="connsiteX5" fmla="*/ 349710 w 418641"/>
-                <a:gd name="connsiteY5" fmla="*/ 1069684 h 1109463"/>
-                <a:gd name="connsiteX6" fmla="*/ 73993 w 418641"/>
-                <a:gd name="connsiteY6" fmla="*/ 1069684 h 1109463"/>
-                <a:gd name="connsiteX7" fmla="*/ 31047 w 418641"/>
-                <a:gd name="connsiteY7" fmla="*/ 1097637 h 1109463"/>
-                <a:gd name="connsiteX8" fmla="*/ 5062 w 418641"/>
-                <a:gd name="connsiteY8" fmla="*/ 68931 h 1109463"/>
-                <a:gd name="connsiteX0" fmla="*/ 24117 w 437696"/>
-                <a:gd name="connsiteY0" fmla="*/ 68931 h 1109463"/>
-                <a:gd name="connsiteX1" fmla="*/ 93048 w 437696"/>
-                <a:gd name="connsiteY1" fmla="*/ 0 h 1109463"/>
-                <a:gd name="connsiteX2" fmla="*/ 368765 w 437696"/>
-                <a:gd name="connsiteY2" fmla="*/ 0 h 1109463"/>
-                <a:gd name="connsiteX3" fmla="*/ 437696 w 437696"/>
-                <a:gd name="connsiteY3" fmla="*/ 68931 h 1109463"/>
-                <a:gd name="connsiteX4" fmla="*/ 437696 w 437696"/>
-                <a:gd name="connsiteY4" fmla="*/ 1000753 h 1109463"/>
-                <a:gd name="connsiteX5" fmla="*/ 368765 w 437696"/>
-                <a:gd name="connsiteY5" fmla="*/ 1069684 h 1109463"/>
-                <a:gd name="connsiteX6" fmla="*/ 93048 w 437696"/>
-                <a:gd name="connsiteY6" fmla="*/ 1069684 h 1109463"/>
-                <a:gd name="connsiteX7" fmla="*/ 50102 w 437696"/>
-                <a:gd name="connsiteY7" fmla="*/ 1097637 h 1109463"/>
-                <a:gd name="connsiteX8" fmla="*/ 24117 w 437696"/>
-                <a:gd name="connsiteY8" fmla="*/ 68931 h 1109463"/>
-              </a:gdLst>
-              <a:ahLst/>
-              <a:cxnLst>
-                <a:cxn ang="0">
-                  <a:pos x="connsiteX0" y="connsiteY0"/>
-                </a:cxn>
-                <a:cxn ang="0">
-                  <a:pos x="connsiteX1" y="connsiteY1"/>
-                </a:cxn>
-                <a:cxn ang="0">
-                  <a:pos x="connsiteX2" y="connsiteY2"/>
-                </a:cxn>
-                <a:cxn ang="0">
-                  <a:pos x="connsiteX3" y="connsiteY3"/>
-                </a:cxn>
-                <a:cxn ang="0">
-                  <a:pos x="connsiteX4" y="connsiteY4"/>
-                </a:cxn>
-                <a:cxn ang="0">
-                  <a:pos x="connsiteX5" y="connsiteY5"/>
-                </a:cxn>
-                <a:cxn ang="0">
-                  <a:pos x="connsiteX6" y="connsiteY6"/>
-                </a:cxn>
-                <a:cxn ang="0">
-                  <a:pos x="connsiteX7" y="connsiteY7"/>
-                </a:cxn>
-                <a:cxn ang="0">
-                  <a:pos x="connsiteX8" y="connsiteY8"/>
-                </a:cxn>
-              </a:cxnLst>
-              <a:rect l="l" t="t" r="r" b="b"/>
-              <a:pathLst>
-                <a:path w="437696" h="1109463">
-                  <a:moveTo>
-                    <a:pt x="24117" y="68931"/>
-                  </a:moveTo>
-                  <a:cubicBezTo>
-                    <a:pt x="24117" y="30861"/>
-                    <a:pt x="54978" y="0"/>
-                    <a:pt x="93048" y="0"/>
-                  </a:cubicBezTo>
-                  <a:lnTo>
-                    <a:pt x="368765" y="0"/>
-                  </a:lnTo>
-                  <a:cubicBezTo>
-                    <a:pt x="406835" y="0"/>
-                    <a:pt x="437696" y="30861"/>
-                    <a:pt x="437696" y="68931"/>
-                  </a:cubicBezTo>
-                  <a:lnTo>
-                    <a:pt x="437696" y="1000753"/>
-                  </a:lnTo>
-                  <a:cubicBezTo>
-                    <a:pt x="437696" y="1038823"/>
-                    <a:pt x="406835" y="1069684"/>
-                    <a:pt x="368765" y="1069684"/>
-                  </a:cubicBezTo>
-                  <a:lnTo>
-                    <a:pt x="93048" y="1069684"/>
-                  </a:lnTo>
-                  <a:cubicBezTo>
-                    <a:pt x="54978" y="1069684"/>
-                    <a:pt x="50102" y="1135707"/>
-                    <a:pt x="50102" y="1097637"/>
-                  </a:cubicBezTo>
-                  <a:cubicBezTo>
-                    <a:pt x="-44674" y="801626"/>
-                    <a:pt x="24117" y="379538"/>
-                    <a:pt x="24117" y="68931"/>
-                  </a:cubicBezTo>
-                  <a:close/>
-                </a:path>
-              </a:pathLst>
-            </a:custGeom>
-            <a:solidFill>
-              <a:schemeClr val="accent5">
-                <a:lumMod val="50000"/>
-              </a:schemeClr>
-            </a:solidFill>
-            <a:ln>
-              <a:noFill/>
-            </a:ln>
-            <a:effectLst>
-              <a:innerShdw blurRad="63500" dist="50800">
-                <a:prstClr val="black">
-                  <a:alpha val="50000"/>
-                </a:prstClr>
-              </a:innerShdw>
-            </a:effectLst>
-          </p:spPr>
-          <p:style>
-            <a:lnRef idx="1">
-              <a:schemeClr val="accent1"/>
-            </a:lnRef>
-            <a:fillRef idx="3">
-              <a:schemeClr val="accent1"/>
-            </a:fillRef>
-            <a:effectRef idx="2">
-              <a:schemeClr val="accent1"/>
-            </a:effectRef>
-            <a:fontRef idx="minor">
-              <a:schemeClr val="lt1"/>
-            </a:fontRef>
-          </p:style>
-          <p:txBody>
-            <a:bodyPr rtlCol="0" anchor="ctr"/>
-            <a:lstStyle/>
-            <a:p>
-              <a:pPr algn="ctr"/>
-              <a:endParaRPr lang="en-US">
-                <a:solidFill>
-                  <a:srgbClr val="FAC090"/>
-                </a:solidFill>
-              </a:endParaRPr>
-            </a:p>
-          </p:txBody>
-        </p:sp>
-        <p:sp>
-          <p:nvSpPr>
-            <p:cNvPr id="49" name="Rounded Rectangle 48"/>
-            <p:cNvSpPr/>
-            <p:nvPr/>
-          </p:nvSpPr>
-          <p:spPr>
-            <a:xfrm rot="18196753">
-              <a:off x="3304388" y="2775980"/>
-              <a:ext cx="413579" cy="1215167"/>
-            </a:xfrm>
-            <a:custGeom>
-              <a:avLst/>
-              <a:gdLst>
-                <a:gd name="connsiteX0" fmla="*/ 0 w 413579"/>
-                <a:gd name="connsiteY0" fmla="*/ 68931 h 1187468"/>
-                <a:gd name="connsiteX1" fmla="*/ 68931 w 413579"/>
-                <a:gd name="connsiteY1" fmla="*/ 0 h 1187468"/>
-                <a:gd name="connsiteX2" fmla="*/ 344648 w 413579"/>
-                <a:gd name="connsiteY2" fmla="*/ 0 h 1187468"/>
-                <a:gd name="connsiteX3" fmla="*/ 413579 w 413579"/>
-                <a:gd name="connsiteY3" fmla="*/ 68931 h 1187468"/>
-                <a:gd name="connsiteX4" fmla="*/ 413579 w 413579"/>
-                <a:gd name="connsiteY4" fmla="*/ 1118537 h 1187468"/>
-                <a:gd name="connsiteX5" fmla="*/ 344648 w 413579"/>
-                <a:gd name="connsiteY5" fmla="*/ 1187468 h 1187468"/>
-                <a:gd name="connsiteX6" fmla="*/ 68931 w 413579"/>
-                <a:gd name="connsiteY6" fmla="*/ 1187468 h 1187468"/>
-                <a:gd name="connsiteX7" fmla="*/ 0 w 413579"/>
-                <a:gd name="connsiteY7" fmla="*/ 1118537 h 1187468"/>
-                <a:gd name="connsiteX8" fmla="*/ 0 w 413579"/>
-                <a:gd name="connsiteY8" fmla="*/ 68931 h 1187468"/>
-                <a:gd name="connsiteX0" fmla="*/ 0 w 413579"/>
-                <a:gd name="connsiteY0" fmla="*/ 96630 h 1215167"/>
-                <a:gd name="connsiteX1" fmla="*/ 50752 w 413579"/>
-                <a:gd name="connsiteY1" fmla="*/ 0 h 1215167"/>
-                <a:gd name="connsiteX2" fmla="*/ 344648 w 413579"/>
-                <a:gd name="connsiteY2" fmla="*/ 27699 h 1215167"/>
-                <a:gd name="connsiteX3" fmla="*/ 413579 w 413579"/>
-                <a:gd name="connsiteY3" fmla="*/ 96630 h 1215167"/>
-                <a:gd name="connsiteX4" fmla="*/ 413579 w 413579"/>
-                <a:gd name="connsiteY4" fmla="*/ 1146236 h 1215167"/>
-                <a:gd name="connsiteX5" fmla="*/ 344648 w 413579"/>
-                <a:gd name="connsiteY5" fmla="*/ 1215167 h 1215167"/>
-                <a:gd name="connsiteX6" fmla="*/ 68931 w 413579"/>
-                <a:gd name="connsiteY6" fmla="*/ 1215167 h 1215167"/>
-                <a:gd name="connsiteX7" fmla="*/ 0 w 413579"/>
-                <a:gd name="connsiteY7" fmla="*/ 1146236 h 1215167"/>
-                <a:gd name="connsiteX8" fmla="*/ 0 w 413579"/>
-                <a:gd name="connsiteY8" fmla="*/ 96630 h 1215167"/>
-              </a:gdLst>
-              <a:ahLst/>
-              <a:cxnLst>
-                <a:cxn ang="0">
-                  <a:pos x="connsiteX0" y="connsiteY0"/>
-                </a:cxn>
-                <a:cxn ang="0">
-                  <a:pos x="connsiteX1" y="connsiteY1"/>
-                </a:cxn>
-                <a:cxn ang="0">
-                  <a:pos x="connsiteX2" y="connsiteY2"/>
-                </a:cxn>
-                <a:cxn ang="0">
-                  <a:pos x="connsiteX3" y="connsiteY3"/>
-                </a:cxn>
-                <a:cxn ang="0">
-                  <a:pos x="connsiteX4" y="connsiteY4"/>
-                </a:cxn>
-                <a:cxn ang="0">
-                  <a:pos x="connsiteX5" y="connsiteY5"/>
-                </a:cxn>
-                <a:cxn ang="0">
-                  <a:pos x="connsiteX6" y="connsiteY6"/>
-                </a:cxn>
-                <a:cxn ang="0">
-                  <a:pos x="connsiteX7" y="connsiteY7"/>
-                </a:cxn>
-                <a:cxn ang="0">
-                  <a:pos x="connsiteX8" y="connsiteY8"/>
-                </a:cxn>
-              </a:cxnLst>
-              <a:rect l="l" t="t" r="r" b="b"/>
-              <a:pathLst>
-                <a:path w="413579" h="1215167">
-                  <a:moveTo>
-                    <a:pt x="0" y="96630"/>
-                  </a:moveTo>
-                  <a:cubicBezTo>
-                    <a:pt x="0" y="58560"/>
-                    <a:pt x="12682" y="0"/>
-                    <a:pt x="50752" y="0"/>
-                  </a:cubicBezTo>
-                  <a:cubicBezTo>
-                    <a:pt x="142658" y="0"/>
-                    <a:pt x="252742" y="27699"/>
-                    <a:pt x="344648" y="27699"/>
-                  </a:cubicBezTo>
-                  <a:cubicBezTo>
-                    <a:pt x="382718" y="27699"/>
-                    <a:pt x="413579" y="58560"/>
-                    <a:pt x="413579" y="96630"/>
-                  </a:cubicBezTo>
-                  <a:lnTo>
-                    <a:pt x="413579" y="1146236"/>
-                  </a:lnTo>
-                  <a:cubicBezTo>
-                    <a:pt x="413579" y="1184306"/>
-                    <a:pt x="382718" y="1215167"/>
-                    <a:pt x="344648" y="1215167"/>
-                  </a:cubicBezTo>
-                  <a:lnTo>
-                    <a:pt x="68931" y="1215167"/>
-                  </a:lnTo>
-                  <a:cubicBezTo>
-                    <a:pt x="30861" y="1215167"/>
-                    <a:pt x="0" y="1184306"/>
-                    <a:pt x="0" y="1146236"/>
-                  </a:cubicBezTo>
-                  <a:lnTo>
-                    <a:pt x="0" y="96630"/>
-                  </a:lnTo>
-                  <a:close/>
-                </a:path>
-              </a:pathLst>
-            </a:custGeom>
-            <a:solidFill>
-              <a:schemeClr val="accent5">
-                <a:lumMod val="50000"/>
-              </a:schemeClr>
-            </a:solidFill>
-            <a:ln>
-              <a:noFill/>
-            </a:ln>
-            <a:effectLst>
-              <a:innerShdw blurRad="63500" dist="50800" dir="8100000">
-                <a:prstClr val="black">
-                  <a:alpha val="50000"/>
-                </a:prstClr>
-              </a:innerShdw>
-            </a:effectLst>
-          </p:spPr>
-          <p:style>
-            <a:lnRef idx="1">
-              <a:schemeClr val="accent1"/>
-            </a:lnRef>
-            <a:fillRef idx="3">
-              <a:schemeClr val="accent1"/>
-            </a:fillRef>
-            <a:effectRef idx="2">
-              <a:schemeClr val="accent1"/>
-            </a:effectRef>
-            <a:fontRef idx="minor">
-              <a:schemeClr val="lt1"/>
-            </a:fontRef>
-          </p:style>
-          <p:txBody>
-            <a:bodyPr rtlCol="0" anchor="ctr"/>
-            <a:lstStyle/>
-            <a:p>
-              <a:pPr algn="ctr"/>
-              <a:endParaRPr lang="en-US">
-                <a:solidFill>
-                  <a:srgbClr val="FAC090"/>
-                </a:solidFill>
-              </a:endParaRPr>
-            </a:p>
-          </p:txBody>
-        </p:sp>
         <p:grpSp>
           <p:nvGrpSpPr>
-            <p:cNvPr id="42" name="Group 41"/>
+            <p:cNvPr id="53" name="Group 52"/>
             <p:cNvGrpSpPr/>
             <p:nvPr/>
           </p:nvGrpSpPr>
           <p:grpSpPr>
             <a:xfrm>
-              <a:off x="3571990" y="194834"/>
-              <a:ext cx="1709362" cy="2142433"/>
-              <a:chOff x="4093461" y="1998870"/>
-              <a:chExt cx="1709362" cy="2142433"/>
+              <a:off x="2551082" y="0"/>
+              <a:ext cx="3364031" cy="5845947"/>
+              <a:chOff x="2876216" y="194834"/>
+              <a:chExt cx="3364031" cy="5845947"/>
             </a:xfrm>
           </p:grpSpPr>
           <p:sp>
             <p:nvSpPr>
-              <p:cNvPr id="36" name="Oval 35"/>
+              <p:cNvPr id="48" name="Rounded Rectangle 47"/>
               <p:cNvSpPr/>
               <p:nvPr/>
             </p:nvSpPr>
             <p:spPr>
-              <a:xfrm>
-                <a:off x="5508104" y="2708920"/>
-                <a:ext cx="294719" cy="247914"/>
-              </a:xfrm>
-              <a:prstGeom prst="ellipse">
-                <a:avLst/>
-              </a:prstGeom>
-              <a:solidFill>
-                <a:schemeClr val="tx1"/>
-              </a:solidFill>
-              <a:ln>
-                <a:noFill/>
-              </a:ln>
-            </p:spPr>
-            <p:style>
-              <a:lnRef idx="1">
-                <a:schemeClr val="accent1"/>
-              </a:lnRef>
-              <a:fillRef idx="3">
-                <a:schemeClr val="accent1"/>
-              </a:fillRef>
-              <a:effectRef idx="2">
-                <a:schemeClr val="accent1"/>
-              </a:effectRef>
-              <a:fontRef idx="minor">
-                <a:schemeClr val="lt1"/>
-              </a:fontRef>
-            </p:style>
-            <p:txBody>
-              <a:bodyPr rtlCol="0" anchor="ctr"/>
-              <a:lstStyle/>
-              <a:p>
-                <a:pPr algn="ctr"/>
-                <a:endParaRPr lang="en-US" dirty="0"/>
-              </a:p>
-            </p:txBody>
-          </p:sp>
-          <p:grpSp>
-            <p:nvGrpSpPr>
-              <p:cNvPr id="25" name="Group 24"/>
-              <p:cNvGrpSpPr/>
-              <p:nvPr/>
-            </p:nvGrpSpPr>
-            <p:grpSpPr>
-              <a:xfrm rot="16200000">
-                <a:off x="5387690" y="2915476"/>
-                <a:ext cx="419652" cy="408609"/>
-                <a:chOff x="2847009" y="2672520"/>
-                <a:chExt cx="419652" cy="408609"/>
-              </a:xfrm>
-            </p:grpSpPr>
-            <p:sp>
-              <p:nvSpPr>
-                <p:cNvPr id="20" name="Oval 19"/>
-                <p:cNvSpPr/>
-                <p:nvPr/>
-              </p:nvSpPr>
-              <p:spPr>
-                <a:xfrm>
-                  <a:off x="2847009" y="2672520"/>
-                  <a:ext cx="419652" cy="408609"/>
-                </a:xfrm>
-                <a:prstGeom prst="ellipse">
-                  <a:avLst/>
-                </a:prstGeom>
-                <a:solidFill>
-                  <a:schemeClr val="accent6">
-                    <a:lumMod val="60000"/>
-                    <a:lumOff val="40000"/>
-                  </a:schemeClr>
-                </a:solidFill>
-                <a:ln>
-                  <a:noFill/>
-                </a:ln>
-              </p:spPr>
-              <p:style>
-                <a:lnRef idx="1">
-                  <a:schemeClr val="accent1"/>
-                </a:lnRef>
-                <a:fillRef idx="3">
-                  <a:schemeClr val="accent1"/>
-                </a:fillRef>
-                <a:effectRef idx="2">
-                  <a:schemeClr val="accent1"/>
-                </a:effectRef>
-                <a:fontRef idx="minor">
-                  <a:schemeClr val="lt1"/>
-                </a:fontRef>
-              </p:style>
-              <p:txBody>
-                <a:bodyPr rtlCol="0" anchor="ctr"/>
-                <a:lstStyle/>
-                <a:p>
-                  <a:pPr algn="ctr"/>
-                  <a:endParaRPr lang="en-US">
-                    <a:solidFill>
-                      <a:srgbClr val="FAC090"/>
-                    </a:solidFill>
-                  </a:endParaRPr>
-                </a:p>
-              </p:txBody>
-            </p:sp>
-            <p:sp>
-              <p:nvSpPr>
-                <p:cNvPr id="23" name="Oval 22"/>
-                <p:cNvSpPr/>
-                <p:nvPr/>
-              </p:nvSpPr>
-              <p:spPr>
-                <a:xfrm>
-                  <a:off x="2976220" y="2800625"/>
-                  <a:ext cx="209826" cy="207616"/>
-                </a:xfrm>
-                <a:prstGeom prst="ellipse">
-                  <a:avLst/>
-                </a:prstGeom>
-                <a:solidFill>
-                  <a:schemeClr val="accent6">
-                    <a:lumMod val="75000"/>
-                  </a:schemeClr>
-                </a:solidFill>
-                <a:ln>
-                  <a:noFill/>
-                </a:ln>
-              </p:spPr>
-              <p:style>
-                <a:lnRef idx="1">
-                  <a:schemeClr val="accent1"/>
-                </a:lnRef>
-                <a:fillRef idx="3">
-                  <a:schemeClr val="accent1"/>
-                </a:fillRef>
-                <a:effectRef idx="2">
-                  <a:schemeClr val="accent1"/>
-                </a:effectRef>
-                <a:fontRef idx="minor">
-                  <a:schemeClr val="lt1"/>
-                </a:fontRef>
-              </p:style>
-              <p:txBody>
-                <a:bodyPr rtlCol="0" anchor="ctr"/>
-                <a:lstStyle/>
-                <a:p>
-                  <a:pPr algn="ctr"/>
-                  <a:endParaRPr lang="en-US">
-                    <a:solidFill>
-                      <a:srgbClr val="FAC090"/>
-                    </a:solidFill>
-                  </a:endParaRPr>
-                </a:p>
-              </p:txBody>
-            </p:sp>
-          </p:grpSp>
-          <p:grpSp>
-            <p:nvGrpSpPr>
-              <p:cNvPr id="24" name="Group 23"/>
-              <p:cNvGrpSpPr/>
-              <p:nvPr/>
-            </p:nvGrpSpPr>
-            <p:grpSpPr>
-              <a:xfrm rot="5400000">
-                <a:off x="4130261" y="2864044"/>
-                <a:ext cx="419652" cy="408609"/>
-                <a:chOff x="2292627" y="2650433"/>
-                <a:chExt cx="419652" cy="408609"/>
-              </a:xfrm>
-            </p:grpSpPr>
-            <p:sp>
-              <p:nvSpPr>
-                <p:cNvPr id="21" name="Oval 20"/>
-                <p:cNvSpPr/>
-                <p:nvPr/>
-              </p:nvSpPr>
-              <p:spPr>
-                <a:xfrm>
-                  <a:off x="2292627" y="2650433"/>
-                  <a:ext cx="419652" cy="408609"/>
-                </a:xfrm>
-                <a:prstGeom prst="ellipse">
-                  <a:avLst/>
-                </a:prstGeom>
-                <a:solidFill>
-                  <a:schemeClr val="accent6">
-                    <a:lumMod val="60000"/>
-                    <a:lumOff val="40000"/>
-                  </a:schemeClr>
-                </a:solidFill>
-                <a:ln>
-                  <a:noFill/>
-                </a:ln>
-              </p:spPr>
-              <p:style>
-                <a:lnRef idx="1">
-                  <a:schemeClr val="accent1"/>
-                </a:lnRef>
-                <a:fillRef idx="3">
-                  <a:schemeClr val="accent1"/>
-                </a:fillRef>
-                <a:effectRef idx="2">
-                  <a:schemeClr val="accent1"/>
-                </a:effectRef>
-                <a:fontRef idx="minor">
-                  <a:schemeClr val="lt1"/>
-                </a:fontRef>
-              </p:style>
-              <p:txBody>
-                <a:bodyPr rtlCol="0" anchor="ctr"/>
-                <a:lstStyle/>
-                <a:p>
-                  <a:pPr algn="ctr"/>
-                  <a:endParaRPr lang="en-US">
-                    <a:solidFill>
-                      <a:srgbClr val="FAC090"/>
-                    </a:solidFill>
-                  </a:endParaRPr>
-                </a:p>
-              </p:txBody>
-            </p:sp>
-            <p:sp>
-              <p:nvSpPr>
-                <p:cNvPr id="22" name="Oval 21"/>
-                <p:cNvSpPr/>
-                <p:nvPr/>
-              </p:nvSpPr>
-              <p:spPr>
-                <a:xfrm>
-                  <a:off x="2393124" y="2793097"/>
-                  <a:ext cx="209826" cy="207616"/>
-                </a:xfrm>
-                <a:prstGeom prst="ellipse">
-                  <a:avLst/>
-                </a:prstGeom>
-                <a:solidFill>
-                  <a:schemeClr val="accent6">
-                    <a:lumMod val="75000"/>
-                  </a:schemeClr>
-                </a:solidFill>
-                <a:ln>
-                  <a:noFill/>
-                </a:ln>
-              </p:spPr>
-              <p:style>
-                <a:lnRef idx="1">
-                  <a:schemeClr val="accent1"/>
-                </a:lnRef>
-                <a:fillRef idx="3">
-                  <a:schemeClr val="accent1"/>
-                </a:fillRef>
-                <a:effectRef idx="2">
-                  <a:schemeClr val="accent1"/>
-                </a:effectRef>
-                <a:fontRef idx="minor">
-                  <a:schemeClr val="lt1"/>
-                </a:fontRef>
-              </p:style>
-              <p:txBody>
-                <a:bodyPr rtlCol="0" anchor="ctr"/>
-                <a:lstStyle/>
-                <a:p>
-                  <a:pPr algn="ctr"/>
-                  <a:endParaRPr lang="en-US">
-                    <a:solidFill>
-                      <a:srgbClr val="FAC090"/>
-                    </a:solidFill>
-                  </a:endParaRPr>
-                </a:p>
-              </p:txBody>
-            </p:sp>
-          </p:grpSp>
-          <p:grpSp>
-            <p:nvGrpSpPr>
-              <p:cNvPr id="18" name="Group 17"/>
-              <p:cNvGrpSpPr/>
-              <p:nvPr/>
-            </p:nvGrpSpPr>
-            <p:grpSpPr>
-              <a:xfrm>
-                <a:off x="4340088" y="2395818"/>
-                <a:ext cx="1266731" cy="1745485"/>
-                <a:chOff x="4340088" y="2395818"/>
-                <a:chExt cx="1266731" cy="1745485"/>
-              </a:xfrm>
-            </p:grpSpPr>
-            <p:sp>
-              <p:nvSpPr>
-                <p:cNvPr id="4" name="Rounded Rectangle 3"/>
-                <p:cNvSpPr/>
-                <p:nvPr/>
-              </p:nvSpPr>
-              <p:spPr>
-                <a:xfrm>
-                  <a:off x="4340088" y="2395818"/>
-                  <a:ext cx="1257428" cy="1745485"/>
-                </a:xfrm>
-                <a:prstGeom prst="roundRect">
-                  <a:avLst/>
-                </a:prstGeom>
-                <a:solidFill>
-                  <a:schemeClr val="accent6">
-                    <a:lumMod val="60000"/>
-                    <a:lumOff val="40000"/>
-                  </a:schemeClr>
-                </a:solidFill>
-                <a:ln>
-                  <a:noFill/>
-                </a:ln>
-              </p:spPr>
-              <p:style>
-                <a:lnRef idx="1">
-                  <a:schemeClr val="accent1"/>
-                </a:lnRef>
-                <a:fillRef idx="3">
-                  <a:schemeClr val="accent1"/>
-                </a:fillRef>
-                <a:effectRef idx="2">
-                  <a:schemeClr val="accent1"/>
-                </a:effectRef>
-                <a:fontRef idx="minor">
-                  <a:schemeClr val="lt1"/>
-                </a:fontRef>
-              </p:style>
-              <p:txBody>
-                <a:bodyPr rtlCol="0" anchor="ctr"/>
-                <a:lstStyle/>
-                <a:p>
-                  <a:pPr algn="ctr"/>
-                  <a:endParaRPr lang="en-US">
-                    <a:solidFill>
-                      <a:schemeClr val="accent6">
-                        <a:lumMod val="60000"/>
-                        <a:lumOff val="40000"/>
-                      </a:schemeClr>
-                    </a:solidFill>
-                  </a:endParaRPr>
-                </a:p>
-              </p:txBody>
-            </p:sp>
-            <p:grpSp>
-              <p:nvGrpSpPr>
-                <p:cNvPr id="3" name="Group 2"/>
-                <p:cNvGrpSpPr/>
-                <p:nvPr/>
-              </p:nvGrpSpPr>
-              <p:grpSpPr>
-                <a:xfrm>
-                  <a:off x="4340088" y="2672521"/>
-                  <a:ext cx="629478" cy="688024"/>
-                  <a:chOff x="1778000" y="2153478"/>
-                  <a:chExt cx="629478" cy="688024"/>
-                </a:xfrm>
-              </p:grpSpPr>
-              <p:sp>
-                <p:nvSpPr>
-                  <p:cNvPr id="6" name="Oval 5"/>
-                  <p:cNvSpPr/>
-                  <p:nvPr/>
-                </p:nvSpPr>
-                <p:spPr>
-                  <a:xfrm>
-                    <a:off x="1778000" y="2153478"/>
-                    <a:ext cx="629478" cy="688024"/>
-                  </a:xfrm>
-                  <a:prstGeom prst="ellipse">
-                    <a:avLst/>
-                  </a:prstGeom>
-                  <a:solidFill>
-                    <a:schemeClr val="tx1"/>
-                  </a:solidFill>
-                  <a:ln>
-                    <a:noFill/>
-                  </a:ln>
-                </p:spPr>
-                <p:style>
-                  <a:lnRef idx="1">
-                    <a:schemeClr val="accent1"/>
-                  </a:lnRef>
-                  <a:fillRef idx="3">
-                    <a:schemeClr val="accent1"/>
-                  </a:fillRef>
-                  <a:effectRef idx="2">
-                    <a:schemeClr val="accent1"/>
-                  </a:effectRef>
-                  <a:fontRef idx="minor">
-                    <a:schemeClr val="lt1"/>
-                  </a:fontRef>
-                </p:style>
-                <p:txBody>
-                  <a:bodyPr rtlCol="0" anchor="ctr"/>
-                  <a:lstStyle/>
-                  <a:p>
-                    <a:pPr algn="ctr"/>
-                    <a:endParaRPr lang="en-US"/>
-                  </a:p>
-                </p:txBody>
-              </p:sp>
-              <p:grpSp>
-                <p:nvGrpSpPr>
-                  <p:cNvPr id="2" name="Group 1"/>
-                  <p:cNvGrpSpPr/>
-                  <p:nvPr/>
-                </p:nvGrpSpPr>
-                <p:grpSpPr>
-                  <a:xfrm>
-                    <a:off x="1877391" y="2274054"/>
-                    <a:ext cx="430696" cy="485077"/>
-                    <a:chOff x="2705652" y="2771912"/>
-                    <a:chExt cx="352377" cy="334121"/>
-                  </a:xfrm>
-                </p:grpSpPr>
-                <p:sp>
-                  <p:nvSpPr>
-                    <p:cNvPr id="5" name="Oval 4"/>
-                    <p:cNvSpPr/>
-                    <p:nvPr/>
-                  </p:nvSpPr>
-                  <p:spPr>
-                    <a:xfrm>
-                      <a:off x="2705652" y="2771912"/>
-                      <a:ext cx="352377" cy="334121"/>
-                    </a:xfrm>
-                    <a:prstGeom prst="ellipse">
-                      <a:avLst/>
-                    </a:prstGeom>
-                    <a:solidFill>
-                      <a:schemeClr val="accent5">
-                        <a:lumMod val="60000"/>
-                        <a:lumOff val="40000"/>
-                      </a:schemeClr>
-                    </a:solidFill>
-                    <a:ln>
-                      <a:noFill/>
-                    </a:ln>
-                  </p:spPr>
-                  <p:style>
-                    <a:lnRef idx="1">
-                      <a:schemeClr val="accent1"/>
-                    </a:lnRef>
-                    <a:fillRef idx="3">
-                      <a:schemeClr val="accent1"/>
-                    </a:fillRef>
-                    <a:effectRef idx="2">
-                      <a:schemeClr val="accent1"/>
-                    </a:effectRef>
-                    <a:fontRef idx="minor">
-                      <a:schemeClr val="lt1"/>
-                    </a:fontRef>
-                  </p:style>
-                  <p:txBody>
-                    <a:bodyPr rtlCol="0" anchor="ctr"/>
-                    <a:lstStyle/>
-                    <a:p>
-                      <a:pPr algn="ctr"/>
-                      <a:endParaRPr lang="en-US"/>
-                    </a:p>
-                  </p:txBody>
-                </p:sp>
-                <p:sp>
-                  <p:nvSpPr>
-                    <p:cNvPr id="7" name="Oval 6"/>
-                    <p:cNvSpPr/>
-                    <p:nvPr/>
-                  </p:nvSpPr>
-                  <p:spPr>
-                    <a:xfrm>
-                      <a:off x="2705652" y="2786283"/>
-                      <a:ext cx="339895" cy="319750"/>
-                    </a:xfrm>
-                    <a:custGeom>
-                      <a:avLst/>
-                      <a:gdLst/>
-                      <a:ahLst/>
-                      <a:cxnLst/>
-                      <a:rect l="l" t="t" r="r" b="b"/>
-                      <a:pathLst>
-                        <a:path w="339895" h="319750">
-                          <a:moveTo>
-                            <a:pt x="1297" y="212203"/>
-                          </a:moveTo>
-                          <a:lnTo>
-                            <a:pt x="137988" y="319750"/>
-                          </a:lnTo>
-                          <a:lnTo>
-                            <a:pt x="97666" y="312054"/>
-                          </a:lnTo>
-                          <a:cubicBezTo>
-                            <a:pt x="55387" y="295146"/>
-                            <a:pt x="21516" y="263122"/>
-                            <a:pt x="3634" y="223149"/>
-                          </a:cubicBezTo>
-                          <a:close/>
-                          <a:moveTo>
-                            <a:pt x="21128" y="68561"/>
-                          </a:moveTo>
-                          <a:lnTo>
-                            <a:pt x="287915" y="278464"/>
-                          </a:lnTo>
-                          <a:lnTo>
-                            <a:pt x="247070" y="304501"/>
-                          </a:lnTo>
-                          <a:lnTo>
-                            <a:pt x="0" y="110111"/>
-                          </a:lnTo>
-                          <a:lnTo>
-                            <a:pt x="3634" y="93094"/>
-                          </a:lnTo>
-                          <a:close/>
-                          <a:moveTo>
-                            <a:pt x="119608" y="0"/>
-                          </a:moveTo>
-                          <a:lnTo>
-                            <a:pt x="339895" y="173319"/>
-                          </a:lnTo>
-                          <a:lnTo>
-                            <a:pt x="329260" y="223125"/>
-                          </a:lnTo>
-                          <a:lnTo>
-                            <a:pt x="71883" y="20624"/>
-                          </a:lnTo>
-                          <a:lnTo>
-                            <a:pt x="97666" y="4189"/>
-                          </a:lnTo>
-                          <a:close/>
-                        </a:path>
-                      </a:pathLst>
-                    </a:custGeom>
-                    <a:solidFill>
-                      <a:schemeClr val="accent5">
-                        <a:lumMod val="60000"/>
-                        <a:lumOff val="40000"/>
-                      </a:schemeClr>
-                    </a:solidFill>
-                    <a:ln>
-                      <a:noFill/>
-                    </a:ln>
-                  </p:spPr>
-                  <p:style>
-                    <a:lnRef idx="1">
-                      <a:schemeClr val="accent1"/>
-                    </a:lnRef>
-                    <a:fillRef idx="3">
-                      <a:schemeClr val="accent1"/>
-                    </a:fillRef>
-                    <a:effectRef idx="2">
-                      <a:schemeClr val="accent1"/>
-                    </a:effectRef>
-                    <a:fontRef idx="minor">
-                      <a:schemeClr val="lt1"/>
-                    </a:fontRef>
-                  </p:style>
-                  <p:txBody>
-                    <a:bodyPr rtlCol="0" anchor="ctr"/>
-                    <a:lstStyle/>
-                    <a:p>
-                      <a:pPr algn="ctr"/>
-                      <a:endParaRPr lang="en-US"/>
-                    </a:p>
-                  </p:txBody>
-                </p:sp>
-              </p:grpSp>
-            </p:grpSp>
-            <p:grpSp>
-              <p:nvGrpSpPr>
-                <p:cNvPr id="12" name="Group 11"/>
-                <p:cNvGrpSpPr/>
-                <p:nvPr/>
-              </p:nvGrpSpPr>
-              <p:grpSpPr>
-                <a:xfrm>
-                  <a:off x="4977341" y="2672521"/>
-                  <a:ext cx="629478" cy="688024"/>
-                  <a:chOff x="1778000" y="2153478"/>
-                  <a:chExt cx="629478" cy="688024"/>
-                </a:xfrm>
-              </p:grpSpPr>
-              <p:sp>
-                <p:nvSpPr>
-                  <p:cNvPr id="13" name="Oval 12"/>
-                  <p:cNvSpPr/>
-                  <p:nvPr/>
-                </p:nvSpPr>
-                <p:spPr>
-                  <a:xfrm>
-                    <a:off x="1778000" y="2153478"/>
-                    <a:ext cx="629478" cy="688024"/>
-                  </a:xfrm>
-                  <a:prstGeom prst="ellipse">
-                    <a:avLst/>
-                  </a:prstGeom>
-                  <a:solidFill>
-                    <a:schemeClr val="tx1"/>
-                  </a:solidFill>
-                  <a:ln>
-                    <a:noFill/>
-                  </a:ln>
-                </p:spPr>
-                <p:style>
-                  <a:lnRef idx="1">
-                    <a:schemeClr val="accent1"/>
-                  </a:lnRef>
-                  <a:fillRef idx="3">
-                    <a:schemeClr val="accent1"/>
-                  </a:fillRef>
-                  <a:effectRef idx="2">
-                    <a:schemeClr val="accent1"/>
-                  </a:effectRef>
-                  <a:fontRef idx="minor">
-                    <a:schemeClr val="lt1"/>
-                  </a:fontRef>
-                </p:style>
-                <p:txBody>
-                  <a:bodyPr rtlCol="0" anchor="ctr"/>
-                  <a:lstStyle/>
-                  <a:p>
-                    <a:pPr algn="ctr"/>
-                    <a:endParaRPr lang="en-US"/>
-                  </a:p>
-                </p:txBody>
-              </p:sp>
-              <p:grpSp>
-                <p:nvGrpSpPr>
-                  <p:cNvPr id="14" name="Group 13"/>
-                  <p:cNvGrpSpPr/>
-                  <p:nvPr/>
-                </p:nvGrpSpPr>
-                <p:grpSpPr>
-                  <a:xfrm>
-                    <a:off x="1877391" y="2274054"/>
-                    <a:ext cx="430696" cy="485077"/>
-                    <a:chOff x="2705652" y="2771912"/>
-                    <a:chExt cx="352377" cy="334121"/>
-                  </a:xfrm>
-                </p:grpSpPr>
-                <p:sp>
-                  <p:nvSpPr>
-                    <p:cNvPr id="15" name="Oval 14"/>
-                    <p:cNvSpPr/>
-                    <p:nvPr/>
-                  </p:nvSpPr>
-                  <p:spPr>
-                    <a:xfrm>
-                      <a:off x="2705652" y="2771912"/>
-                      <a:ext cx="352377" cy="334121"/>
-                    </a:xfrm>
-                    <a:prstGeom prst="ellipse">
-                      <a:avLst/>
-                    </a:prstGeom>
-                    <a:solidFill>
-                      <a:schemeClr val="accent5">
-                        <a:lumMod val="60000"/>
-                        <a:lumOff val="40000"/>
-                      </a:schemeClr>
-                    </a:solidFill>
-                    <a:ln>
-                      <a:noFill/>
-                    </a:ln>
-                  </p:spPr>
-                  <p:style>
-                    <a:lnRef idx="1">
-                      <a:schemeClr val="accent1"/>
-                    </a:lnRef>
-                    <a:fillRef idx="3">
-                      <a:schemeClr val="accent1"/>
-                    </a:fillRef>
-                    <a:effectRef idx="2">
-                      <a:schemeClr val="accent1"/>
-                    </a:effectRef>
-                    <a:fontRef idx="minor">
-                      <a:schemeClr val="lt1"/>
-                    </a:fontRef>
-                  </p:style>
-                  <p:txBody>
-                    <a:bodyPr rtlCol="0" anchor="ctr"/>
-                    <a:lstStyle/>
-                    <a:p>
-                      <a:pPr algn="ctr"/>
-                      <a:endParaRPr lang="en-US"/>
-                    </a:p>
-                  </p:txBody>
-                </p:sp>
-                <p:sp>
-                  <p:nvSpPr>
-                    <p:cNvPr id="16" name="Oval 6"/>
-                    <p:cNvSpPr/>
-                    <p:nvPr/>
-                  </p:nvSpPr>
-                  <p:spPr>
-                    <a:xfrm>
-                      <a:off x="2705652" y="2786283"/>
-                      <a:ext cx="339895" cy="319750"/>
-                    </a:xfrm>
-                    <a:custGeom>
-                      <a:avLst/>
-                      <a:gdLst/>
-                      <a:ahLst/>
-                      <a:cxnLst/>
-                      <a:rect l="l" t="t" r="r" b="b"/>
-                      <a:pathLst>
-                        <a:path w="339895" h="319750">
-                          <a:moveTo>
-                            <a:pt x="1297" y="212203"/>
-                          </a:moveTo>
-                          <a:lnTo>
-                            <a:pt x="137988" y="319750"/>
-                          </a:lnTo>
-                          <a:lnTo>
-                            <a:pt x="97666" y="312054"/>
-                          </a:lnTo>
-                          <a:cubicBezTo>
-                            <a:pt x="55387" y="295146"/>
-                            <a:pt x="21516" y="263122"/>
-                            <a:pt x="3634" y="223149"/>
-                          </a:cubicBezTo>
-                          <a:close/>
-                          <a:moveTo>
-                            <a:pt x="21128" y="68561"/>
-                          </a:moveTo>
-                          <a:lnTo>
-                            <a:pt x="287915" y="278464"/>
-                          </a:lnTo>
-                          <a:lnTo>
-                            <a:pt x="247070" y="304501"/>
-                          </a:lnTo>
-                          <a:lnTo>
-                            <a:pt x="0" y="110111"/>
-                          </a:lnTo>
-                          <a:lnTo>
-                            <a:pt x="3634" y="93094"/>
-                          </a:lnTo>
-                          <a:close/>
-                          <a:moveTo>
-                            <a:pt x="119608" y="0"/>
-                          </a:moveTo>
-                          <a:lnTo>
-                            <a:pt x="339895" y="173319"/>
-                          </a:lnTo>
-                          <a:lnTo>
-                            <a:pt x="329260" y="223125"/>
-                          </a:lnTo>
-                          <a:lnTo>
-                            <a:pt x="71883" y="20624"/>
-                          </a:lnTo>
-                          <a:lnTo>
-                            <a:pt x="97666" y="4189"/>
-                          </a:lnTo>
-                          <a:close/>
-                        </a:path>
-                      </a:pathLst>
-                    </a:custGeom>
-                    <a:solidFill>
-                      <a:schemeClr val="accent5">
-                        <a:lumMod val="60000"/>
-                        <a:lumOff val="40000"/>
-                      </a:schemeClr>
-                    </a:solidFill>
-                    <a:ln>
-                      <a:noFill/>
-                    </a:ln>
-                  </p:spPr>
-                  <p:style>
-                    <a:lnRef idx="1">
-                      <a:schemeClr val="accent1"/>
-                    </a:lnRef>
-                    <a:fillRef idx="3">
-                      <a:schemeClr val="accent1"/>
-                    </a:fillRef>
-                    <a:effectRef idx="2">
-                      <a:schemeClr val="accent1"/>
-                    </a:effectRef>
-                    <a:fontRef idx="minor">
-                      <a:schemeClr val="lt1"/>
-                    </a:fontRef>
-                  </p:style>
-                  <p:txBody>
-                    <a:bodyPr rtlCol="0" anchor="ctr"/>
-                    <a:lstStyle/>
-                    <a:p>
-                      <a:pPr algn="ctr"/>
-                      <a:endParaRPr lang="en-US"/>
-                    </a:p>
-                  </p:txBody>
-                </p:sp>
-              </p:grpSp>
-            </p:grpSp>
-            <p:sp>
-              <p:nvSpPr>
-                <p:cNvPr id="17" name="Rectangle 16"/>
-                <p:cNvSpPr/>
-                <p:nvPr/>
-              </p:nvSpPr>
-              <p:spPr>
-                <a:xfrm flipV="1">
-                  <a:off x="4870175" y="2813960"/>
-                  <a:ext cx="206557" cy="79431"/>
-                </a:xfrm>
-                <a:prstGeom prst="rect">
-                  <a:avLst/>
-                </a:prstGeom>
-                <a:solidFill>
-                  <a:schemeClr val="tx1"/>
-                </a:solidFill>
-                <a:ln>
-                  <a:noFill/>
-                </a:ln>
-              </p:spPr>
-              <p:style>
-                <a:lnRef idx="1">
-                  <a:schemeClr val="accent1"/>
-                </a:lnRef>
-                <a:fillRef idx="3">
-                  <a:schemeClr val="accent1"/>
-                </a:fillRef>
-                <a:effectRef idx="2">
-                  <a:schemeClr val="accent1"/>
-                </a:effectRef>
-                <a:fontRef idx="minor">
-                  <a:schemeClr val="lt1"/>
-                </a:fontRef>
-              </p:style>
-              <p:txBody>
-                <a:bodyPr rtlCol="0" anchor="ctr"/>
-                <a:lstStyle/>
-                <a:p>
-                  <a:pPr algn="ctr"/>
-                  <a:endParaRPr lang="en-US"/>
-                </a:p>
-              </p:txBody>
-            </p:sp>
-          </p:grpSp>
-          <p:grpSp>
-            <p:nvGrpSpPr>
-              <p:cNvPr id="28" name="Group 27"/>
-              <p:cNvGrpSpPr/>
-              <p:nvPr/>
-            </p:nvGrpSpPr>
-            <p:grpSpPr>
-              <a:xfrm flipV="1">
-                <a:off x="4832441" y="3499237"/>
-                <a:ext cx="232857" cy="45719"/>
-                <a:chOff x="2007478" y="3360545"/>
-                <a:chExt cx="535356" cy="216000"/>
-              </a:xfrm>
-            </p:grpSpPr>
-            <p:sp>
-              <p:nvSpPr>
-                <p:cNvPr id="26" name="Oval 25"/>
-                <p:cNvSpPr/>
-                <p:nvPr/>
-              </p:nvSpPr>
-              <p:spPr>
-                <a:xfrm>
-                  <a:off x="2007478" y="3360545"/>
-                  <a:ext cx="216000" cy="216000"/>
-                </a:xfrm>
-                <a:prstGeom prst="ellipse">
-                  <a:avLst/>
-                </a:prstGeom>
-                <a:solidFill>
-                  <a:schemeClr val="accent6">
-                    <a:lumMod val="50000"/>
-                  </a:schemeClr>
-                </a:solidFill>
-                <a:ln>
-                  <a:noFill/>
-                </a:ln>
-              </p:spPr>
-              <p:style>
-                <a:lnRef idx="1">
-                  <a:schemeClr val="accent1"/>
-                </a:lnRef>
-                <a:fillRef idx="3">
-                  <a:schemeClr val="accent1"/>
-                </a:fillRef>
-                <a:effectRef idx="2">
-                  <a:schemeClr val="accent1"/>
-                </a:effectRef>
-                <a:fontRef idx="minor">
-                  <a:schemeClr val="lt1"/>
-                </a:fontRef>
-              </p:style>
-              <p:txBody>
-                <a:bodyPr rtlCol="0" anchor="ctr"/>
-                <a:lstStyle/>
-                <a:p>
-                  <a:pPr algn="ctr"/>
-                  <a:endParaRPr lang="en-US"/>
-                </a:p>
-              </p:txBody>
-            </p:sp>
-            <p:sp>
-              <p:nvSpPr>
-                <p:cNvPr id="27" name="Oval 26"/>
-                <p:cNvSpPr/>
-                <p:nvPr/>
-              </p:nvSpPr>
-              <p:spPr>
-                <a:xfrm>
-                  <a:off x="2326834" y="3360545"/>
-                  <a:ext cx="216000" cy="216000"/>
-                </a:xfrm>
-                <a:prstGeom prst="ellipse">
-                  <a:avLst/>
-                </a:prstGeom>
-                <a:solidFill>
-                  <a:schemeClr val="accent6">
-                    <a:lumMod val="50000"/>
-                  </a:schemeClr>
-                </a:solidFill>
-                <a:ln>
-                  <a:noFill/>
-                </a:ln>
-              </p:spPr>
-              <p:style>
-                <a:lnRef idx="1">
-                  <a:schemeClr val="accent1"/>
-                </a:lnRef>
-                <a:fillRef idx="3">
-                  <a:schemeClr val="accent1"/>
-                </a:fillRef>
-                <a:effectRef idx="2">
-                  <a:schemeClr val="accent1"/>
-                </a:effectRef>
-                <a:fontRef idx="minor">
-                  <a:schemeClr val="lt1"/>
-                </a:fontRef>
-              </p:style>
-              <p:txBody>
-                <a:bodyPr rtlCol="0" anchor="ctr"/>
-                <a:lstStyle/>
-                <a:p>
-                  <a:pPr algn="ctr"/>
-                  <a:endParaRPr lang="en-US"/>
-                </a:p>
-              </p:txBody>
-            </p:sp>
-          </p:grpSp>
-          <p:sp>
-            <p:nvSpPr>
-              <p:cNvPr id="29" name="Oval 28"/>
-              <p:cNvSpPr/>
-              <p:nvPr/>
-            </p:nvSpPr>
-            <p:spPr>
-              <a:xfrm>
-                <a:off x="4544392" y="1998870"/>
-                <a:ext cx="696659" cy="673651"/>
-              </a:xfrm>
-              <a:prstGeom prst="ellipse">
-                <a:avLst/>
-              </a:prstGeom>
-              <a:solidFill>
-                <a:schemeClr val="tx1"/>
-              </a:solidFill>
-              <a:ln>
-                <a:noFill/>
-              </a:ln>
-            </p:spPr>
-            <p:style>
-              <a:lnRef idx="1">
-                <a:schemeClr val="accent1"/>
-              </a:lnRef>
-              <a:fillRef idx="3">
-                <a:schemeClr val="accent1"/>
-              </a:fillRef>
-              <a:effectRef idx="2">
-                <a:schemeClr val="accent1"/>
-              </a:effectRef>
-              <a:fontRef idx="minor">
-                <a:schemeClr val="lt1"/>
-              </a:fontRef>
-            </p:style>
-            <p:txBody>
-              <a:bodyPr rtlCol="0" anchor="ctr"/>
-              <a:lstStyle/>
-              <a:p>
-                <a:pPr algn="ctr"/>
-                <a:endParaRPr lang="en-US" dirty="0"/>
-              </a:p>
-            </p:txBody>
-          </p:sp>
-          <p:sp>
-            <p:nvSpPr>
-              <p:cNvPr id="30" name="Oval 29"/>
-              <p:cNvSpPr/>
-              <p:nvPr/>
-            </p:nvSpPr>
-            <p:spPr>
-              <a:xfrm>
-                <a:off x="4194112" y="2109304"/>
-                <a:ext cx="590259" cy="502538"/>
-              </a:xfrm>
-              <a:prstGeom prst="ellipse">
-                <a:avLst/>
-              </a:prstGeom>
-              <a:solidFill>
-                <a:schemeClr val="tx1"/>
-              </a:solidFill>
-              <a:ln>
-                <a:noFill/>
-              </a:ln>
-            </p:spPr>
-            <p:style>
-              <a:lnRef idx="1">
-                <a:schemeClr val="accent1"/>
-              </a:lnRef>
-              <a:fillRef idx="3">
-                <a:schemeClr val="accent1"/>
-              </a:fillRef>
-              <a:effectRef idx="2">
-                <a:schemeClr val="accent1"/>
-              </a:effectRef>
-              <a:fontRef idx="minor">
-                <a:schemeClr val="lt1"/>
-              </a:fontRef>
-            </p:style>
-            <p:txBody>
-              <a:bodyPr rtlCol="0" anchor="ctr"/>
-              <a:lstStyle/>
-              <a:p>
-                <a:pPr algn="ctr"/>
-                <a:endParaRPr lang="en-US" dirty="0"/>
-              </a:p>
-            </p:txBody>
-          </p:sp>
-          <p:sp>
-            <p:nvSpPr>
-              <p:cNvPr id="31" name="Oval 30"/>
-              <p:cNvSpPr/>
-              <p:nvPr/>
-            </p:nvSpPr>
-            <p:spPr>
-              <a:xfrm>
-                <a:off x="5102055" y="2395818"/>
-                <a:ext cx="294719" cy="247914"/>
-              </a:xfrm>
-              <a:prstGeom prst="ellipse">
-                <a:avLst/>
-              </a:prstGeom>
-              <a:solidFill>
-                <a:schemeClr val="tx1"/>
-              </a:solidFill>
-              <a:ln>
-                <a:noFill/>
-              </a:ln>
-            </p:spPr>
-            <p:style>
-              <a:lnRef idx="1">
-                <a:schemeClr val="accent1"/>
-              </a:lnRef>
-              <a:fillRef idx="3">
-                <a:schemeClr val="accent1"/>
-              </a:fillRef>
-              <a:effectRef idx="2">
-                <a:schemeClr val="accent1"/>
-              </a:effectRef>
-              <a:fontRef idx="minor">
-                <a:schemeClr val="lt1"/>
-              </a:fontRef>
-            </p:style>
-            <p:txBody>
-              <a:bodyPr rtlCol="0" anchor="ctr"/>
-              <a:lstStyle/>
-              <a:p>
-                <a:pPr algn="ctr"/>
-                <a:endParaRPr lang="en-US" dirty="0"/>
-              </a:p>
-            </p:txBody>
-          </p:sp>
-          <p:sp>
-            <p:nvSpPr>
-              <p:cNvPr id="32" name="Oval 31"/>
-              <p:cNvSpPr/>
-              <p:nvPr/>
-            </p:nvSpPr>
-            <p:spPr>
-              <a:xfrm>
-                <a:off x="4093461" y="2372544"/>
-                <a:ext cx="412280" cy="429793"/>
-              </a:xfrm>
-              <a:prstGeom prst="ellipse">
-                <a:avLst/>
-              </a:prstGeom>
-              <a:solidFill>
-                <a:schemeClr val="tx1"/>
-              </a:solidFill>
-              <a:ln>
-                <a:noFill/>
-              </a:ln>
-            </p:spPr>
-            <p:style>
-              <a:lnRef idx="1">
-                <a:schemeClr val="accent1"/>
-              </a:lnRef>
-              <a:fillRef idx="3">
-                <a:schemeClr val="accent1"/>
-              </a:fillRef>
-              <a:effectRef idx="2">
-                <a:schemeClr val="accent1"/>
-              </a:effectRef>
-              <a:fontRef idx="minor">
-                <a:schemeClr val="lt1"/>
-              </a:fontRef>
-            </p:style>
-            <p:txBody>
-              <a:bodyPr rtlCol="0" anchor="ctr"/>
-              <a:lstStyle/>
-              <a:p>
-                <a:pPr algn="ctr"/>
-                <a:endParaRPr lang="en-US" dirty="0"/>
-              </a:p>
-            </p:txBody>
-          </p:sp>
-          <p:sp>
-            <p:nvSpPr>
-              <p:cNvPr id="33" name="Oval 32"/>
-              <p:cNvSpPr/>
-              <p:nvPr/>
-            </p:nvSpPr>
-            <p:spPr>
-              <a:xfrm>
-                <a:off x="5065298" y="2186608"/>
-                <a:ext cx="449493" cy="338177"/>
-              </a:xfrm>
-              <a:prstGeom prst="ellipse">
-                <a:avLst/>
-              </a:prstGeom>
-              <a:solidFill>
-                <a:schemeClr val="tx1"/>
-              </a:solidFill>
-              <a:ln>
-                <a:noFill/>
-              </a:ln>
-            </p:spPr>
-            <p:style>
-              <a:lnRef idx="1">
-                <a:schemeClr val="accent1"/>
-              </a:lnRef>
-              <a:fillRef idx="3">
-                <a:schemeClr val="accent1"/>
-              </a:fillRef>
-              <a:effectRef idx="2">
-                <a:schemeClr val="accent1"/>
-              </a:effectRef>
-              <a:fontRef idx="minor">
-                <a:schemeClr val="lt1"/>
-              </a:fontRef>
-            </p:style>
-            <p:txBody>
-              <a:bodyPr rtlCol="0" anchor="ctr"/>
-              <a:lstStyle/>
-              <a:p>
-                <a:pPr algn="ctr"/>
-                <a:endParaRPr lang="en-US" dirty="0"/>
-              </a:p>
-            </p:txBody>
-          </p:sp>
-          <p:sp>
-            <p:nvSpPr>
-              <p:cNvPr id="34" name="Oval 33"/>
-              <p:cNvSpPr/>
-              <p:nvPr/>
-            </p:nvSpPr>
-            <p:spPr>
-              <a:xfrm>
-                <a:off x="5364088" y="2263913"/>
-                <a:ext cx="294719" cy="332881"/>
-              </a:xfrm>
-              <a:prstGeom prst="ellipse">
-                <a:avLst/>
-              </a:prstGeom>
-              <a:solidFill>
-                <a:schemeClr val="tx1"/>
-              </a:solidFill>
-              <a:ln>
-                <a:noFill/>
-              </a:ln>
-            </p:spPr>
-            <p:style>
-              <a:lnRef idx="1">
-                <a:schemeClr val="accent1"/>
-              </a:lnRef>
-              <a:fillRef idx="3">
-                <a:schemeClr val="accent1"/>
-              </a:fillRef>
-              <a:effectRef idx="2">
-                <a:schemeClr val="accent1"/>
-              </a:effectRef>
-              <a:fontRef idx="minor">
-                <a:schemeClr val="lt1"/>
-              </a:fontRef>
-            </p:style>
-            <p:txBody>
-              <a:bodyPr rtlCol="0" anchor="ctr"/>
-              <a:lstStyle/>
-              <a:p>
-                <a:pPr algn="ctr"/>
-                <a:endParaRPr lang="en-US" dirty="0"/>
-              </a:p>
-            </p:txBody>
-          </p:sp>
-          <p:sp>
-            <p:nvSpPr>
-              <p:cNvPr id="35" name="Oval 34"/>
-              <p:cNvSpPr/>
-              <p:nvPr/>
-            </p:nvSpPr>
-            <p:spPr>
-              <a:xfrm>
-                <a:off x="5436096" y="2492896"/>
-                <a:ext cx="294719" cy="247914"/>
-              </a:xfrm>
-              <a:prstGeom prst="ellipse">
-                <a:avLst/>
-              </a:prstGeom>
-              <a:solidFill>
-                <a:schemeClr val="tx1"/>
-              </a:solidFill>
-              <a:ln>
-                <a:noFill/>
-              </a:ln>
-            </p:spPr>
-            <p:style>
-              <a:lnRef idx="1">
-                <a:schemeClr val="accent1"/>
-              </a:lnRef>
-              <a:fillRef idx="3">
-                <a:schemeClr val="accent1"/>
-              </a:fillRef>
-              <a:effectRef idx="2">
-                <a:schemeClr val="accent1"/>
-              </a:effectRef>
-              <a:fontRef idx="minor">
-                <a:schemeClr val="lt1"/>
-              </a:fontRef>
-            </p:style>
-            <p:txBody>
-              <a:bodyPr rtlCol="0" anchor="ctr"/>
-              <a:lstStyle/>
-              <a:p>
-                <a:pPr algn="ctr"/>
-                <a:endParaRPr lang="en-US" dirty="0"/>
-              </a:p>
-            </p:txBody>
-          </p:sp>
-          <p:sp>
-            <p:nvSpPr>
-              <p:cNvPr id="41" name="Freeform 40"/>
-              <p:cNvSpPr/>
-              <p:nvPr/>
-            </p:nvSpPr>
-            <p:spPr>
-              <a:xfrm>
-                <a:off x="4754153" y="3589129"/>
-                <a:ext cx="574261" cy="329603"/>
-              </a:xfrm>
-              <a:custGeom>
-                <a:avLst/>
-                <a:gdLst>
-                  <a:gd name="connsiteX0" fmla="*/ 0 w 905565"/>
-                  <a:gd name="connsiteY0" fmla="*/ 254000 h 376538"/>
-                  <a:gd name="connsiteX1" fmla="*/ 353391 w 905565"/>
-                  <a:gd name="connsiteY1" fmla="*/ 364434 h 376538"/>
-                  <a:gd name="connsiteX2" fmla="*/ 905565 w 905565"/>
-                  <a:gd name="connsiteY2" fmla="*/ 0 h 376538"/>
-                  <a:gd name="connsiteX0" fmla="*/ 0 w 771957"/>
-                  <a:gd name="connsiteY0" fmla="*/ 209826 h 329603"/>
-                  <a:gd name="connsiteX1" fmla="*/ 353391 w 771957"/>
-                  <a:gd name="connsiteY1" fmla="*/ 320260 h 329603"/>
-                  <a:gd name="connsiteX2" fmla="*/ 771957 w 771957"/>
-                  <a:gd name="connsiteY2" fmla="*/ 0 h 329603"/>
-                </a:gdLst>
-                <a:ahLst/>
-                <a:cxnLst>
-                  <a:cxn ang="0">
-                    <a:pos x="connsiteX0" y="connsiteY0"/>
-                  </a:cxn>
-                  <a:cxn ang="0">
-                    <a:pos x="connsiteX1" y="connsiteY1"/>
-                  </a:cxn>
-                  <a:cxn ang="0">
-                    <a:pos x="connsiteX2" y="connsiteY2"/>
-                  </a:cxn>
-                </a:cxnLst>
-                <a:rect l="l" t="t" r="r" b="b"/>
-                <a:pathLst>
-                  <a:path w="771957" h="329603">
-                    <a:moveTo>
-                      <a:pt x="0" y="209826"/>
-                    </a:moveTo>
-                    <a:cubicBezTo>
-                      <a:pt x="101231" y="286209"/>
-                      <a:pt x="224732" y="355231"/>
-                      <a:pt x="353391" y="320260"/>
-                    </a:cubicBezTo>
-                    <a:cubicBezTo>
-                      <a:pt x="482051" y="285289"/>
-                      <a:pt x="771957" y="0"/>
-                      <a:pt x="771957" y="0"/>
-                    </a:cubicBezTo>
-                  </a:path>
-                </a:pathLst>
-              </a:custGeom>
-              <a:solidFill>
-                <a:srgbClr val="953735"/>
-              </a:solidFill>
-              <a:ln>
-                <a:solidFill>
-                  <a:schemeClr val="accent2">
-                    <a:lumMod val="75000"/>
-                  </a:schemeClr>
-                </a:solidFill>
-              </a:ln>
-              <a:effectLst/>
-            </p:spPr>
-            <p:style>
-              <a:lnRef idx="2">
-                <a:schemeClr val="accent1"/>
-              </a:lnRef>
-              <a:fillRef idx="0">
-                <a:schemeClr val="accent1"/>
-              </a:fillRef>
-              <a:effectRef idx="1">
-                <a:schemeClr val="accent1"/>
-              </a:effectRef>
-              <a:fontRef idx="minor">
-                <a:schemeClr val="tx1"/>
-              </a:fontRef>
-            </p:style>
-            <p:txBody>
-              <a:bodyPr rtlCol="0" anchor="ctr"/>
-              <a:lstStyle/>
-              <a:p>
-                <a:pPr algn="ctr"/>
-                <a:endParaRPr lang="en-US"/>
-              </a:p>
-            </p:txBody>
-          </p:sp>
-        </p:grpSp>
-        <p:sp>
-          <p:nvSpPr>
-            <p:cNvPr id="43" name="Rounded Rectangle 42"/>
-            <p:cNvSpPr/>
-            <p:nvPr/>
-          </p:nvSpPr>
-          <p:spPr>
-            <a:xfrm>
-              <a:off x="3641052" y="2337267"/>
-              <a:ext cx="1569277" cy="2288214"/>
-            </a:xfrm>
-            <a:prstGeom prst="roundRect">
-              <a:avLst/>
-            </a:prstGeom>
-            <a:solidFill>
-              <a:schemeClr val="accent5">
-                <a:lumMod val="50000"/>
-              </a:schemeClr>
-            </a:solidFill>
-            <a:ln>
-              <a:noFill/>
-            </a:ln>
-            <a:effectLst/>
-          </p:spPr>
-          <p:style>
-            <a:lnRef idx="1">
-              <a:schemeClr val="accent1"/>
-            </a:lnRef>
-            <a:fillRef idx="3">
-              <a:schemeClr val="accent1"/>
-            </a:fillRef>
-            <a:effectRef idx="2">
-              <a:schemeClr val="accent1"/>
-            </a:effectRef>
-            <a:fontRef idx="minor">
-              <a:schemeClr val="lt1"/>
-            </a:fontRef>
-          </p:style>
-          <p:txBody>
-            <a:bodyPr rtlCol="0" anchor="ctr"/>
-            <a:lstStyle/>
-            <a:p>
-              <a:pPr algn="ctr"/>
-              <a:endParaRPr lang="en-US">
-                <a:solidFill>
-                  <a:srgbClr val="FAC090"/>
-                </a:solidFill>
-              </a:endParaRPr>
-            </a:p>
-          </p:txBody>
-        </p:sp>
-        <p:sp>
-          <p:nvSpPr>
-            <p:cNvPr id="44" name="Rectangle 43"/>
-            <p:cNvSpPr/>
-            <p:nvPr/>
-          </p:nvSpPr>
-          <p:spPr>
-            <a:xfrm>
-              <a:off x="3641053" y="4625479"/>
-              <a:ext cx="638329" cy="1415302"/>
-            </a:xfrm>
-            <a:prstGeom prst="rect">
-              <a:avLst/>
-            </a:prstGeom>
-            <a:solidFill>
-              <a:schemeClr val="tx1"/>
-            </a:solidFill>
-            <a:ln>
-              <a:solidFill>
-                <a:schemeClr val="tx1"/>
-              </a:solidFill>
-            </a:ln>
-          </p:spPr>
-          <p:style>
-            <a:lnRef idx="1">
-              <a:schemeClr val="accent1"/>
-            </a:lnRef>
-            <a:fillRef idx="3">
-              <a:schemeClr val="accent1"/>
-            </a:fillRef>
-            <a:effectRef idx="2">
-              <a:schemeClr val="accent1"/>
-            </a:effectRef>
-            <a:fontRef idx="minor">
-              <a:schemeClr val="lt1"/>
-            </a:fontRef>
-          </p:style>
-          <p:txBody>
-            <a:bodyPr rtlCol="0" anchor="ctr"/>
-            <a:lstStyle/>
-            <a:p>
-              <a:pPr algn="ctr"/>
-              <a:endParaRPr lang="en-US"/>
-            </a:p>
-          </p:txBody>
-        </p:sp>
-        <p:sp>
-          <p:nvSpPr>
-            <p:cNvPr id="45" name="Rectangle 44"/>
-            <p:cNvSpPr/>
-            <p:nvPr/>
-          </p:nvSpPr>
-          <p:spPr>
-            <a:xfrm>
-              <a:off x="4565915" y="4625479"/>
-              <a:ext cx="638329" cy="1415302"/>
-            </a:xfrm>
-            <a:custGeom>
-              <a:avLst/>
-              <a:gdLst>
-                <a:gd name="connsiteX0" fmla="*/ 0 w 638329"/>
-                <a:gd name="connsiteY0" fmla="*/ 0 h 1415302"/>
-                <a:gd name="connsiteX1" fmla="*/ 638329 w 638329"/>
-                <a:gd name="connsiteY1" fmla="*/ 0 h 1415302"/>
-                <a:gd name="connsiteX2" fmla="*/ 638329 w 638329"/>
-                <a:gd name="connsiteY2" fmla="*/ 1415302 h 1415302"/>
-                <a:gd name="connsiteX3" fmla="*/ 0 w 638329"/>
-                <a:gd name="connsiteY3" fmla="*/ 1415302 h 1415302"/>
-                <a:gd name="connsiteX4" fmla="*/ 0 w 638329"/>
-                <a:gd name="connsiteY4" fmla="*/ 0 h 1415302"/>
-                <a:gd name="connsiteX0" fmla="*/ 0 w 660416"/>
-                <a:gd name="connsiteY0" fmla="*/ 0 h 1415302"/>
-                <a:gd name="connsiteX1" fmla="*/ 660416 w 660416"/>
-                <a:gd name="connsiteY1" fmla="*/ 0 h 1415302"/>
-                <a:gd name="connsiteX2" fmla="*/ 638329 w 660416"/>
-                <a:gd name="connsiteY2" fmla="*/ 1415302 h 1415302"/>
-                <a:gd name="connsiteX3" fmla="*/ 0 w 660416"/>
-                <a:gd name="connsiteY3" fmla="*/ 1415302 h 1415302"/>
-                <a:gd name="connsiteX4" fmla="*/ 0 w 660416"/>
-                <a:gd name="connsiteY4" fmla="*/ 0 h 1415302"/>
-                <a:gd name="connsiteX0" fmla="*/ 0 w 660416"/>
-                <a:gd name="connsiteY0" fmla="*/ 0 h 1415302"/>
-                <a:gd name="connsiteX1" fmla="*/ 660416 w 660416"/>
-                <a:gd name="connsiteY1" fmla="*/ 0 h 1415302"/>
-                <a:gd name="connsiteX2" fmla="*/ 660416 w 660416"/>
-                <a:gd name="connsiteY2" fmla="*/ 1415302 h 1415302"/>
-                <a:gd name="connsiteX3" fmla="*/ 0 w 660416"/>
-                <a:gd name="connsiteY3" fmla="*/ 1415302 h 1415302"/>
-                <a:gd name="connsiteX4" fmla="*/ 0 w 660416"/>
-                <a:gd name="connsiteY4" fmla="*/ 0 h 1415302"/>
-                <a:gd name="connsiteX0" fmla="*/ 33131 w 660416"/>
-                <a:gd name="connsiteY0" fmla="*/ 0 h 1415302"/>
-                <a:gd name="connsiteX1" fmla="*/ 660416 w 660416"/>
-                <a:gd name="connsiteY1" fmla="*/ 0 h 1415302"/>
-                <a:gd name="connsiteX2" fmla="*/ 660416 w 660416"/>
-                <a:gd name="connsiteY2" fmla="*/ 1415302 h 1415302"/>
-                <a:gd name="connsiteX3" fmla="*/ 0 w 660416"/>
-                <a:gd name="connsiteY3" fmla="*/ 1415302 h 1415302"/>
-                <a:gd name="connsiteX4" fmla="*/ 33131 w 660416"/>
-                <a:gd name="connsiteY4" fmla="*/ 0 h 1415302"/>
-                <a:gd name="connsiteX0" fmla="*/ 11044 w 638329"/>
-                <a:gd name="connsiteY0" fmla="*/ 0 h 1415302"/>
-                <a:gd name="connsiteX1" fmla="*/ 638329 w 638329"/>
-                <a:gd name="connsiteY1" fmla="*/ 0 h 1415302"/>
-                <a:gd name="connsiteX2" fmla="*/ 638329 w 638329"/>
-                <a:gd name="connsiteY2" fmla="*/ 1415302 h 1415302"/>
-                <a:gd name="connsiteX3" fmla="*/ 0 w 638329"/>
-                <a:gd name="connsiteY3" fmla="*/ 1415302 h 1415302"/>
-                <a:gd name="connsiteX4" fmla="*/ 11044 w 638329"/>
-                <a:gd name="connsiteY4" fmla="*/ 0 h 1415302"/>
-              </a:gdLst>
-              <a:ahLst/>
-              <a:cxnLst>
-                <a:cxn ang="0">
-                  <a:pos x="connsiteX0" y="connsiteY0"/>
-                </a:cxn>
-                <a:cxn ang="0">
-                  <a:pos x="connsiteX1" y="connsiteY1"/>
-                </a:cxn>
-                <a:cxn ang="0">
-                  <a:pos x="connsiteX2" y="connsiteY2"/>
-                </a:cxn>
-                <a:cxn ang="0">
-                  <a:pos x="connsiteX3" y="connsiteY3"/>
-                </a:cxn>
-                <a:cxn ang="0">
-                  <a:pos x="connsiteX4" y="connsiteY4"/>
-                </a:cxn>
-              </a:cxnLst>
-              <a:rect l="l" t="t" r="r" b="b"/>
-              <a:pathLst>
-                <a:path w="638329" h="1415302">
-                  <a:moveTo>
-                    <a:pt x="11044" y="0"/>
-                  </a:moveTo>
-                  <a:lnTo>
-                    <a:pt x="638329" y="0"/>
-                  </a:lnTo>
-                  <a:lnTo>
-                    <a:pt x="638329" y="1415302"/>
-                  </a:lnTo>
-                  <a:lnTo>
-                    <a:pt x="0" y="1415302"/>
-                  </a:lnTo>
-                  <a:cubicBezTo>
-                    <a:pt x="3681" y="943535"/>
-                    <a:pt x="7363" y="471767"/>
-                    <a:pt x="11044" y="0"/>
-                  </a:cubicBezTo>
-                  <a:close/>
-                </a:path>
-              </a:pathLst>
-            </a:custGeom>
-            <a:solidFill>
-              <a:schemeClr val="tx1"/>
-            </a:solidFill>
-            <a:ln>
-              <a:solidFill>
-                <a:schemeClr val="tx1"/>
-              </a:solidFill>
-            </a:ln>
-          </p:spPr>
-          <p:style>
-            <a:lnRef idx="1">
-              <a:schemeClr val="accent1"/>
-            </a:lnRef>
-            <a:fillRef idx="3">
-              <a:schemeClr val="accent1"/>
-            </a:fillRef>
-            <a:effectRef idx="2">
-              <a:schemeClr val="accent1"/>
-            </a:effectRef>
-            <a:fontRef idx="minor">
-              <a:schemeClr val="lt1"/>
-            </a:fontRef>
-          </p:style>
-          <p:txBody>
-            <a:bodyPr rtlCol="0" anchor="ctr"/>
-            <a:lstStyle/>
-            <a:p>
-              <a:pPr algn="ctr"/>
-              <a:endParaRPr lang="en-US"/>
-            </a:p>
-          </p:txBody>
-        </p:sp>
-        <p:sp>
-          <p:nvSpPr>
-            <p:cNvPr id="46" name="Rectangle 45"/>
-            <p:cNvSpPr/>
-            <p:nvPr/>
-          </p:nvSpPr>
-          <p:spPr>
-            <a:xfrm rot="16200000">
-              <a:off x="4105094" y="3523109"/>
-              <a:ext cx="638329" cy="1566410"/>
-            </a:xfrm>
-            <a:prstGeom prst="rect">
-              <a:avLst/>
-            </a:prstGeom>
-            <a:solidFill>
-              <a:schemeClr val="tx1"/>
-            </a:solidFill>
-            <a:ln>
-              <a:solidFill>
-                <a:schemeClr val="tx1"/>
-              </a:solidFill>
-            </a:ln>
-          </p:spPr>
-          <p:style>
-            <a:lnRef idx="1">
-              <a:schemeClr val="accent1"/>
-            </a:lnRef>
-            <a:fillRef idx="3">
-              <a:schemeClr val="accent1"/>
-            </a:fillRef>
-            <a:effectRef idx="2">
-              <a:schemeClr val="accent1"/>
-            </a:effectRef>
-            <a:fontRef idx="minor">
-              <a:schemeClr val="lt1"/>
-            </a:fontRef>
-          </p:style>
-          <p:txBody>
-            <a:bodyPr rtlCol="0" anchor="ctr"/>
-            <a:lstStyle/>
-            <a:p>
-              <a:pPr algn="ctr"/>
-              <a:endParaRPr lang="en-US"/>
-            </a:p>
-          </p:txBody>
-        </p:sp>
-        <p:sp>
-          <p:nvSpPr>
-            <p:cNvPr id="47" name="Chord 46"/>
-            <p:cNvSpPr/>
-            <p:nvPr/>
-          </p:nvSpPr>
-          <p:spPr>
-            <a:xfrm rot="17502090">
-              <a:off x="4094595" y="4271800"/>
-              <a:ext cx="477707" cy="607391"/>
-            </a:xfrm>
-            <a:prstGeom prst="chord">
-              <a:avLst/>
-            </a:prstGeom>
-            <a:solidFill>
-              <a:schemeClr val="tx1"/>
-            </a:solidFill>
-            <a:ln>
-              <a:solidFill>
-                <a:schemeClr val="tx1"/>
-              </a:solidFill>
-            </a:ln>
-          </p:spPr>
-          <p:style>
-            <a:lnRef idx="1">
-              <a:schemeClr val="accent1"/>
-            </a:lnRef>
-            <a:fillRef idx="3">
-              <a:schemeClr val="accent1"/>
-            </a:fillRef>
-            <a:effectRef idx="2">
-              <a:schemeClr val="accent1"/>
-            </a:effectRef>
-            <a:fontRef idx="minor">
-              <a:schemeClr val="lt1"/>
-            </a:fontRef>
-          </p:style>
-          <p:txBody>
-            <a:bodyPr rtlCol="0" anchor="ctr"/>
-            <a:lstStyle/>
-            <a:p>
-              <a:pPr algn="ctr"/>
-              <a:endParaRPr lang="en-US"/>
-            </a:p>
-          </p:txBody>
-        </p:sp>
-        <p:grpSp>
-          <p:nvGrpSpPr>
-            <p:cNvPr id="52" name="Group 51"/>
-            <p:cNvGrpSpPr/>
-            <p:nvPr/>
-          </p:nvGrpSpPr>
-          <p:grpSpPr>
-            <a:xfrm rot="13738101">
-              <a:off x="5047155" y="1896561"/>
-              <a:ext cx="1113455" cy="1272729"/>
-              <a:chOff x="5193424" y="2389704"/>
-              <a:chExt cx="1113455" cy="1272729"/>
-            </a:xfrm>
-          </p:grpSpPr>
-          <p:sp>
-            <p:nvSpPr>
-              <p:cNvPr id="50" name="Rounded Rectangle 49"/>
-              <p:cNvSpPr/>
-              <p:nvPr/>
-            </p:nvSpPr>
-            <p:spPr>
-              <a:xfrm rot="2391216">
-                <a:off x="5575051" y="2389704"/>
-                <a:ext cx="413579" cy="1069684"/>
-              </a:xfrm>
-              <a:prstGeom prst="roundRect">
-                <a:avLst/>
-              </a:prstGeom>
-              <a:solidFill>
-                <a:schemeClr val="accent5">
-                  <a:lumMod val="50000"/>
-                </a:schemeClr>
-              </a:solidFill>
-              <a:ln>
-                <a:noFill/>
-              </a:ln>
-              <a:effectLst/>
-            </p:spPr>
-            <p:style>
-              <a:lnRef idx="1">
-                <a:schemeClr val="accent1"/>
-              </a:lnRef>
-              <a:fillRef idx="3">
-                <a:schemeClr val="accent1"/>
-              </a:fillRef>
-              <a:effectRef idx="2">
-                <a:schemeClr val="accent1"/>
-              </a:effectRef>
-              <a:fontRef idx="minor">
-                <a:schemeClr val="lt1"/>
-              </a:fontRef>
-            </p:style>
-            <p:txBody>
-              <a:bodyPr rtlCol="0" anchor="ctr"/>
-              <a:lstStyle/>
-              <a:p>
-                <a:pPr algn="ctr"/>
-                <a:endParaRPr lang="en-US">
-                  <a:solidFill>
-                    <a:srgbClr val="FAC090"/>
-                  </a:solidFill>
-                </a:endParaRPr>
-              </a:p>
-            </p:txBody>
-          </p:sp>
-          <p:sp>
-            <p:nvSpPr>
-              <p:cNvPr id="51" name="Rounded Rectangle 50"/>
-              <p:cNvSpPr/>
-              <p:nvPr/>
-            </p:nvSpPr>
-            <p:spPr>
-              <a:xfrm rot="18196753">
-                <a:off x="5543362" y="2898916"/>
-                <a:ext cx="413579" cy="1113455"/>
+              <a:xfrm rot="2967531">
+                <a:off x="3279954" y="2257246"/>
+                <a:ext cx="437696" cy="1245171"/>
               </a:xfrm>
               <a:custGeom>
                 <a:avLst/>
@@ -5566,23 +3439,77 @@
                   <a:gd name="connsiteX8" fmla="*/ 0 w 413579"/>
                   <a:gd name="connsiteY8" fmla="*/ 68931 h 1069684"/>
                   <a:gd name="connsiteX0" fmla="*/ 0 w 413579"/>
-                  <a:gd name="connsiteY0" fmla="*/ 112702 h 1113455"/>
-                  <a:gd name="connsiteX1" fmla="*/ 74890 w 413579"/>
-                  <a:gd name="connsiteY1" fmla="*/ 0 h 1113455"/>
+                  <a:gd name="connsiteY0" fmla="*/ 68931 h 1069742"/>
+                  <a:gd name="connsiteX1" fmla="*/ 68931 w 413579"/>
+                  <a:gd name="connsiteY1" fmla="*/ 0 h 1069742"/>
                   <a:gd name="connsiteX2" fmla="*/ 344648 w 413579"/>
-                  <a:gd name="connsiteY2" fmla="*/ 43771 h 1113455"/>
+                  <a:gd name="connsiteY2" fmla="*/ 0 h 1069742"/>
                   <a:gd name="connsiteX3" fmla="*/ 413579 w 413579"/>
-                  <a:gd name="connsiteY3" fmla="*/ 112702 h 1113455"/>
+                  <a:gd name="connsiteY3" fmla="*/ 68931 h 1069742"/>
                   <a:gd name="connsiteX4" fmla="*/ 413579 w 413579"/>
-                  <a:gd name="connsiteY4" fmla="*/ 1044524 h 1113455"/>
+                  <a:gd name="connsiteY4" fmla="*/ 1000753 h 1069742"/>
                   <a:gd name="connsiteX5" fmla="*/ 344648 w 413579"/>
-                  <a:gd name="connsiteY5" fmla="*/ 1113455 h 1113455"/>
+                  <a:gd name="connsiteY5" fmla="*/ 1069684 h 1069742"/>
                   <a:gd name="connsiteX6" fmla="*/ 68931 w 413579"/>
-                  <a:gd name="connsiteY6" fmla="*/ 1113455 h 1113455"/>
-                  <a:gd name="connsiteX7" fmla="*/ 0 w 413579"/>
-                  <a:gd name="connsiteY7" fmla="*/ 1044524 h 1113455"/>
+                  <a:gd name="connsiteY6" fmla="*/ 1069684 h 1069742"/>
+                  <a:gd name="connsiteX7" fmla="*/ 28307 w 413579"/>
+                  <a:gd name="connsiteY7" fmla="*/ 1034665 h 1069742"/>
                   <a:gd name="connsiteX8" fmla="*/ 0 w 413579"/>
-                  <a:gd name="connsiteY8" fmla="*/ 112702 h 1113455"/>
+                  <a:gd name="connsiteY8" fmla="*/ 68931 h 1069742"/>
+                  <a:gd name="connsiteX0" fmla="*/ 4022 w 417601"/>
+                  <a:gd name="connsiteY0" fmla="*/ 68931 h 1069742"/>
+                  <a:gd name="connsiteX1" fmla="*/ 72953 w 417601"/>
+                  <a:gd name="connsiteY1" fmla="*/ 0 h 1069742"/>
+                  <a:gd name="connsiteX2" fmla="*/ 348670 w 417601"/>
+                  <a:gd name="connsiteY2" fmla="*/ 0 h 1069742"/>
+                  <a:gd name="connsiteX3" fmla="*/ 417601 w 417601"/>
+                  <a:gd name="connsiteY3" fmla="*/ 68931 h 1069742"/>
+                  <a:gd name="connsiteX4" fmla="*/ 417601 w 417601"/>
+                  <a:gd name="connsiteY4" fmla="*/ 1000753 h 1069742"/>
+                  <a:gd name="connsiteX5" fmla="*/ 348670 w 417601"/>
+                  <a:gd name="connsiteY5" fmla="*/ 1069684 h 1069742"/>
+                  <a:gd name="connsiteX6" fmla="*/ 72953 w 417601"/>
+                  <a:gd name="connsiteY6" fmla="*/ 1069684 h 1069742"/>
+                  <a:gd name="connsiteX7" fmla="*/ 32329 w 417601"/>
+                  <a:gd name="connsiteY7" fmla="*/ 1034665 h 1069742"/>
+                  <a:gd name="connsiteX8" fmla="*/ 4022 w 417601"/>
+                  <a:gd name="connsiteY8" fmla="*/ 68931 h 1069742"/>
+                  <a:gd name="connsiteX0" fmla="*/ 5062 w 418641"/>
+                  <a:gd name="connsiteY0" fmla="*/ 68931 h 1109463"/>
+                  <a:gd name="connsiteX1" fmla="*/ 73993 w 418641"/>
+                  <a:gd name="connsiteY1" fmla="*/ 0 h 1109463"/>
+                  <a:gd name="connsiteX2" fmla="*/ 349710 w 418641"/>
+                  <a:gd name="connsiteY2" fmla="*/ 0 h 1109463"/>
+                  <a:gd name="connsiteX3" fmla="*/ 418641 w 418641"/>
+                  <a:gd name="connsiteY3" fmla="*/ 68931 h 1109463"/>
+                  <a:gd name="connsiteX4" fmla="*/ 418641 w 418641"/>
+                  <a:gd name="connsiteY4" fmla="*/ 1000753 h 1109463"/>
+                  <a:gd name="connsiteX5" fmla="*/ 349710 w 418641"/>
+                  <a:gd name="connsiteY5" fmla="*/ 1069684 h 1109463"/>
+                  <a:gd name="connsiteX6" fmla="*/ 73993 w 418641"/>
+                  <a:gd name="connsiteY6" fmla="*/ 1069684 h 1109463"/>
+                  <a:gd name="connsiteX7" fmla="*/ 31047 w 418641"/>
+                  <a:gd name="connsiteY7" fmla="*/ 1097637 h 1109463"/>
+                  <a:gd name="connsiteX8" fmla="*/ 5062 w 418641"/>
+                  <a:gd name="connsiteY8" fmla="*/ 68931 h 1109463"/>
+                  <a:gd name="connsiteX0" fmla="*/ 24117 w 437696"/>
+                  <a:gd name="connsiteY0" fmla="*/ 68931 h 1109463"/>
+                  <a:gd name="connsiteX1" fmla="*/ 93048 w 437696"/>
+                  <a:gd name="connsiteY1" fmla="*/ 0 h 1109463"/>
+                  <a:gd name="connsiteX2" fmla="*/ 368765 w 437696"/>
+                  <a:gd name="connsiteY2" fmla="*/ 0 h 1109463"/>
+                  <a:gd name="connsiteX3" fmla="*/ 437696 w 437696"/>
+                  <a:gd name="connsiteY3" fmla="*/ 68931 h 1109463"/>
+                  <a:gd name="connsiteX4" fmla="*/ 437696 w 437696"/>
+                  <a:gd name="connsiteY4" fmla="*/ 1000753 h 1109463"/>
+                  <a:gd name="connsiteX5" fmla="*/ 368765 w 437696"/>
+                  <a:gd name="connsiteY5" fmla="*/ 1069684 h 1109463"/>
+                  <a:gd name="connsiteX6" fmla="*/ 93048 w 437696"/>
+                  <a:gd name="connsiteY6" fmla="*/ 1069684 h 1109463"/>
+                  <a:gd name="connsiteX7" fmla="*/ 50102 w 437696"/>
+                  <a:gd name="connsiteY7" fmla="*/ 1097637 h 1109463"/>
+                  <a:gd name="connsiteX8" fmla="*/ 24117 w 437696"/>
+                  <a:gd name="connsiteY8" fmla="*/ 68931 h 1109463"/>
                 </a:gdLst>
                 <a:ahLst/>
                 <a:cxnLst>
@@ -5616,52 +3543,216 @@
                 </a:cxnLst>
                 <a:rect l="l" t="t" r="r" b="b"/>
                 <a:pathLst>
-                  <a:path w="413579" h="1113455">
+                  <a:path w="437696" h="1109463">
                     <a:moveTo>
-                      <a:pt x="0" y="112702"/>
+                      <a:pt x="24117" y="68931"/>
                     </a:moveTo>
                     <a:cubicBezTo>
-                      <a:pt x="0" y="74632"/>
-                      <a:pt x="36820" y="0"/>
-                      <a:pt x="74890" y="0"/>
+                      <a:pt x="24117" y="30861"/>
+                      <a:pt x="54978" y="0"/>
+                      <a:pt x="93048" y="0"/>
+                    </a:cubicBezTo>
+                    <a:lnTo>
+                      <a:pt x="368765" y="0"/>
+                    </a:lnTo>
+                    <a:cubicBezTo>
+                      <a:pt x="406835" y="0"/>
+                      <a:pt x="437696" y="30861"/>
+                      <a:pt x="437696" y="68931"/>
+                    </a:cubicBezTo>
+                    <a:lnTo>
+                      <a:pt x="437696" y="1000753"/>
+                    </a:lnTo>
+                    <a:cubicBezTo>
+                      <a:pt x="437696" y="1038823"/>
+                      <a:pt x="406835" y="1069684"/>
+                      <a:pt x="368765" y="1069684"/>
+                    </a:cubicBezTo>
+                    <a:lnTo>
+                      <a:pt x="93048" y="1069684"/>
+                    </a:lnTo>
+                    <a:cubicBezTo>
+                      <a:pt x="54978" y="1069684"/>
+                      <a:pt x="50102" y="1135707"/>
+                      <a:pt x="50102" y="1097637"/>
                     </a:cubicBezTo>
                     <a:cubicBezTo>
-                      <a:pt x="166796" y="0"/>
-                      <a:pt x="252742" y="43771"/>
-                      <a:pt x="344648" y="43771"/>
+                      <a:pt x="-44674" y="801626"/>
+                      <a:pt x="24117" y="379538"/>
+                      <a:pt x="24117" y="68931"/>
+                    </a:cubicBezTo>
+                    <a:close/>
+                  </a:path>
+                </a:pathLst>
+              </a:custGeom>
+              <a:solidFill>
+                <a:srgbClr val="3366FF"/>
+              </a:solidFill>
+              <a:ln>
+                <a:noFill/>
+              </a:ln>
+              <a:effectLst>
+                <a:innerShdw blurRad="63500" dist="50800">
+                  <a:prstClr val="black">
+                    <a:alpha val="50000"/>
+                  </a:prstClr>
+                </a:innerShdw>
+              </a:effectLst>
+            </p:spPr>
+            <p:style>
+              <a:lnRef idx="1">
+                <a:schemeClr val="accent1"/>
+              </a:lnRef>
+              <a:fillRef idx="3">
+                <a:schemeClr val="accent1"/>
+              </a:fillRef>
+              <a:effectRef idx="2">
+                <a:schemeClr val="accent1"/>
+              </a:effectRef>
+              <a:fontRef idx="minor">
+                <a:schemeClr val="lt1"/>
+              </a:fontRef>
+            </p:style>
+            <p:txBody>
+              <a:bodyPr rtlCol="0" anchor="ctr"/>
+              <a:lstStyle/>
+              <a:p>
+                <a:pPr algn="ctr"/>
+                <a:endParaRPr lang="en-US">
+                  <a:solidFill>
+                    <a:srgbClr val="FAC090"/>
+                  </a:solidFill>
+                </a:endParaRPr>
+              </a:p>
+            </p:txBody>
+          </p:sp>
+          <p:sp>
+            <p:nvSpPr>
+              <p:cNvPr id="49" name="Rounded Rectangle 48"/>
+              <p:cNvSpPr/>
+              <p:nvPr/>
+            </p:nvSpPr>
+            <p:spPr>
+              <a:xfrm rot="18196753">
+                <a:off x="3304388" y="2775980"/>
+                <a:ext cx="413579" cy="1215167"/>
+              </a:xfrm>
+              <a:custGeom>
+                <a:avLst/>
+                <a:gdLst>
+                  <a:gd name="connsiteX0" fmla="*/ 0 w 413579"/>
+                  <a:gd name="connsiteY0" fmla="*/ 68931 h 1187468"/>
+                  <a:gd name="connsiteX1" fmla="*/ 68931 w 413579"/>
+                  <a:gd name="connsiteY1" fmla="*/ 0 h 1187468"/>
+                  <a:gd name="connsiteX2" fmla="*/ 344648 w 413579"/>
+                  <a:gd name="connsiteY2" fmla="*/ 0 h 1187468"/>
+                  <a:gd name="connsiteX3" fmla="*/ 413579 w 413579"/>
+                  <a:gd name="connsiteY3" fmla="*/ 68931 h 1187468"/>
+                  <a:gd name="connsiteX4" fmla="*/ 413579 w 413579"/>
+                  <a:gd name="connsiteY4" fmla="*/ 1118537 h 1187468"/>
+                  <a:gd name="connsiteX5" fmla="*/ 344648 w 413579"/>
+                  <a:gd name="connsiteY5" fmla="*/ 1187468 h 1187468"/>
+                  <a:gd name="connsiteX6" fmla="*/ 68931 w 413579"/>
+                  <a:gd name="connsiteY6" fmla="*/ 1187468 h 1187468"/>
+                  <a:gd name="connsiteX7" fmla="*/ 0 w 413579"/>
+                  <a:gd name="connsiteY7" fmla="*/ 1118537 h 1187468"/>
+                  <a:gd name="connsiteX8" fmla="*/ 0 w 413579"/>
+                  <a:gd name="connsiteY8" fmla="*/ 68931 h 1187468"/>
+                  <a:gd name="connsiteX0" fmla="*/ 0 w 413579"/>
+                  <a:gd name="connsiteY0" fmla="*/ 96630 h 1215167"/>
+                  <a:gd name="connsiteX1" fmla="*/ 50752 w 413579"/>
+                  <a:gd name="connsiteY1" fmla="*/ 0 h 1215167"/>
+                  <a:gd name="connsiteX2" fmla="*/ 344648 w 413579"/>
+                  <a:gd name="connsiteY2" fmla="*/ 27699 h 1215167"/>
+                  <a:gd name="connsiteX3" fmla="*/ 413579 w 413579"/>
+                  <a:gd name="connsiteY3" fmla="*/ 96630 h 1215167"/>
+                  <a:gd name="connsiteX4" fmla="*/ 413579 w 413579"/>
+                  <a:gd name="connsiteY4" fmla="*/ 1146236 h 1215167"/>
+                  <a:gd name="connsiteX5" fmla="*/ 344648 w 413579"/>
+                  <a:gd name="connsiteY5" fmla="*/ 1215167 h 1215167"/>
+                  <a:gd name="connsiteX6" fmla="*/ 68931 w 413579"/>
+                  <a:gd name="connsiteY6" fmla="*/ 1215167 h 1215167"/>
+                  <a:gd name="connsiteX7" fmla="*/ 0 w 413579"/>
+                  <a:gd name="connsiteY7" fmla="*/ 1146236 h 1215167"/>
+                  <a:gd name="connsiteX8" fmla="*/ 0 w 413579"/>
+                  <a:gd name="connsiteY8" fmla="*/ 96630 h 1215167"/>
+                </a:gdLst>
+                <a:ahLst/>
+                <a:cxnLst>
+                  <a:cxn ang="0">
+                    <a:pos x="connsiteX0" y="connsiteY0"/>
+                  </a:cxn>
+                  <a:cxn ang="0">
+                    <a:pos x="connsiteX1" y="connsiteY1"/>
+                  </a:cxn>
+                  <a:cxn ang="0">
+                    <a:pos x="connsiteX2" y="connsiteY2"/>
+                  </a:cxn>
+                  <a:cxn ang="0">
+                    <a:pos x="connsiteX3" y="connsiteY3"/>
+                  </a:cxn>
+                  <a:cxn ang="0">
+                    <a:pos x="connsiteX4" y="connsiteY4"/>
+                  </a:cxn>
+                  <a:cxn ang="0">
+                    <a:pos x="connsiteX5" y="connsiteY5"/>
+                  </a:cxn>
+                  <a:cxn ang="0">
+                    <a:pos x="connsiteX6" y="connsiteY6"/>
+                  </a:cxn>
+                  <a:cxn ang="0">
+                    <a:pos x="connsiteX7" y="connsiteY7"/>
+                  </a:cxn>
+                  <a:cxn ang="0">
+                    <a:pos x="connsiteX8" y="connsiteY8"/>
+                  </a:cxn>
+                </a:cxnLst>
+                <a:rect l="l" t="t" r="r" b="b"/>
+                <a:pathLst>
+                  <a:path w="413579" h="1215167">
+                    <a:moveTo>
+                      <a:pt x="0" y="96630"/>
+                    </a:moveTo>
+                    <a:cubicBezTo>
+                      <a:pt x="0" y="58560"/>
+                      <a:pt x="12682" y="0"/>
+                      <a:pt x="50752" y="0"/>
                     </a:cubicBezTo>
                     <a:cubicBezTo>
-                      <a:pt x="382718" y="43771"/>
-                      <a:pt x="413579" y="74632"/>
-                      <a:pt x="413579" y="112702"/>
+                      <a:pt x="142658" y="0"/>
+                      <a:pt x="252742" y="27699"/>
+                      <a:pt x="344648" y="27699"/>
+                    </a:cubicBezTo>
+                    <a:cubicBezTo>
+                      <a:pt x="382718" y="27699"/>
+                      <a:pt x="413579" y="58560"/>
+                      <a:pt x="413579" y="96630"/>
                     </a:cubicBezTo>
                     <a:lnTo>
-                      <a:pt x="413579" y="1044524"/>
+                      <a:pt x="413579" y="1146236"/>
                     </a:lnTo>
                     <a:cubicBezTo>
-                      <a:pt x="413579" y="1082594"/>
-                      <a:pt x="382718" y="1113455"/>
-                      <a:pt x="344648" y="1113455"/>
+                      <a:pt x="413579" y="1184306"/>
+                      <a:pt x="382718" y="1215167"/>
+                      <a:pt x="344648" y="1215167"/>
                     </a:cubicBezTo>
                     <a:lnTo>
-                      <a:pt x="68931" y="1113455"/>
+                      <a:pt x="68931" y="1215167"/>
                     </a:lnTo>
                     <a:cubicBezTo>
-                      <a:pt x="30861" y="1113455"/>
-                      <a:pt x="0" y="1082594"/>
-                      <a:pt x="0" y="1044524"/>
+                      <a:pt x="30861" y="1215167"/>
+                      <a:pt x="0" y="1184306"/>
+                      <a:pt x="0" y="1146236"/>
                     </a:cubicBezTo>
                     <a:lnTo>
-                      <a:pt x="0" y="112702"/>
+                      <a:pt x="0" y="96630"/>
                     </a:lnTo>
                     <a:close/>
                   </a:path>
                 </a:pathLst>
               </a:custGeom>
               <a:solidFill>
-                <a:schemeClr val="accent5">
-                  <a:lumMod val="50000"/>
-                </a:schemeClr>
+                <a:srgbClr val="3366FF"/>
               </a:solidFill>
               <a:ln>
                 <a:noFill/>
@@ -5701,246 +3792,2167 @@
               </a:p>
             </p:txBody>
           </p:sp>
+          <p:grpSp>
+            <p:nvGrpSpPr>
+              <p:cNvPr id="42" name="Group 41"/>
+              <p:cNvGrpSpPr/>
+              <p:nvPr/>
+            </p:nvGrpSpPr>
+            <p:grpSpPr>
+              <a:xfrm>
+                <a:off x="3571990" y="194834"/>
+                <a:ext cx="1709362" cy="2142433"/>
+                <a:chOff x="4093461" y="1998870"/>
+                <a:chExt cx="1709362" cy="2142433"/>
+              </a:xfrm>
+            </p:grpSpPr>
+            <p:sp>
+              <p:nvSpPr>
+                <p:cNvPr id="36" name="Oval 35"/>
+                <p:cNvSpPr/>
+                <p:nvPr/>
+              </p:nvSpPr>
+              <p:spPr>
+                <a:xfrm>
+                  <a:off x="5508104" y="2708920"/>
+                  <a:ext cx="294719" cy="247914"/>
+                </a:xfrm>
+                <a:prstGeom prst="ellipse">
+                  <a:avLst/>
+                </a:prstGeom>
+                <a:solidFill>
+                  <a:schemeClr val="tx1"/>
+                </a:solidFill>
+                <a:ln>
+                  <a:noFill/>
+                </a:ln>
+              </p:spPr>
+              <p:style>
+                <a:lnRef idx="1">
+                  <a:schemeClr val="accent1"/>
+                </a:lnRef>
+                <a:fillRef idx="3">
+                  <a:schemeClr val="accent1"/>
+                </a:fillRef>
+                <a:effectRef idx="2">
+                  <a:schemeClr val="accent1"/>
+                </a:effectRef>
+                <a:fontRef idx="minor">
+                  <a:schemeClr val="lt1"/>
+                </a:fontRef>
+              </p:style>
+              <p:txBody>
+                <a:bodyPr rtlCol="0" anchor="ctr"/>
+                <a:lstStyle/>
+                <a:p>
+                  <a:pPr algn="ctr"/>
+                  <a:endParaRPr lang="en-US" dirty="0"/>
+                </a:p>
+              </p:txBody>
+            </p:sp>
+            <p:grpSp>
+              <p:nvGrpSpPr>
+                <p:cNvPr id="25" name="Group 24"/>
+                <p:cNvGrpSpPr/>
+                <p:nvPr/>
+              </p:nvGrpSpPr>
+              <p:grpSpPr>
+                <a:xfrm rot="16200000">
+                  <a:off x="5387690" y="2915476"/>
+                  <a:ext cx="419652" cy="408609"/>
+                  <a:chOff x="2847009" y="2672520"/>
+                  <a:chExt cx="419652" cy="408609"/>
+                </a:xfrm>
+              </p:grpSpPr>
+              <p:sp>
+                <p:nvSpPr>
+                  <p:cNvPr id="20" name="Oval 19"/>
+                  <p:cNvSpPr/>
+                  <p:nvPr/>
+                </p:nvSpPr>
+                <p:spPr>
+                  <a:xfrm>
+                    <a:off x="2847009" y="2672520"/>
+                    <a:ext cx="419652" cy="408609"/>
+                  </a:xfrm>
+                  <a:prstGeom prst="ellipse">
+                    <a:avLst/>
+                  </a:prstGeom>
+                  <a:solidFill>
+                    <a:schemeClr val="accent6">
+                      <a:lumMod val="60000"/>
+                      <a:lumOff val="40000"/>
+                    </a:schemeClr>
+                  </a:solidFill>
+                  <a:ln>
+                    <a:noFill/>
+                  </a:ln>
+                </p:spPr>
+                <p:style>
+                  <a:lnRef idx="1">
+                    <a:schemeClr val="accent1"/>
+                  </a:lnRef>
+                  <a:fillRef idx="3">
+                    <a:schemeClr val="accent1"/>
+                  </a:fillRef>
+                  <a:effectRef idx="2">
+                    <a:schemeClr val="accent1"/>
+                  </a:effectRef>
+                  <a:fontRef idx="minor">
+                    <a:schemeClr val="lt1"/>
+                  </a:fontRef>
+                </p:style>
+                <p:txBody>
+                  <a:bodyPr rtlCol="0" anchor="ctr"/>
+                  <a:lstStyle/>
+                  <a:p>
+                    <a:pPr algn="ctr"/>
+                    <a:endParaRPr lang="en-US">
+                      <a:solidFill>
+                        <a:srgbClr val="FAC090"/>
+                      </a:solidFill>
+                    </a:endParaRPr>
+                  </a:p>
+                </p:txBody>
+              </p:sp>
+              <p:sp>
+                <p:nvSpPr>
+                  <p:cNvPr id="23" name="Oval 22"/>
+                  <p:cNvSpPr/>
+                  <p:nvPr/>
+                </p:nvSpPr>
+                <p:spPr>
+                  <a:xfrm>
+                    <a:off x="2976220" y="2800625"/>
+                    <a:ext cx="209826" cy="207616"/>
+                  </a:xfrm>
+                  <a:prstGeom prst="ellipse">
+                    <a:avLst/>
+                  </a:prstGeom>
+                  <a:solidFill>
+                    <a:schemeClr val="accent6">
+                      <a:lumMod val="75000"/>
+                    </a:schemeClr>
+                  </a:solidFill>
+                  <a:ln>
+                    <a:noFill/>
+                  </a:ln>
+                </p:spPr>
+                <p:style>
+                  <a:lnRef idx="1">
+                    <a:schemeClr val="accent1"/>
+                  </a:lnRef>
+                  <a:fillRef idx="3">
+                    <a:schemeClr val="accent1"/>
+                  </a:fillRef>
+                  <a:effectRef idx="2">
+                    <a:schemeClr val="accent1"/>
+                  </a:effectRef>
+                  <a:fontRef idx="minor">
+                    <a:schemeClr val="lt1"/>
+                  </a:fontRef>
+                </p:style>
+                <p:txBody>
+                  <a:bodyPr rtlCol="0" anchor="ctr"/>
+                  <a:lstStyle/>
+                  <a:p>
+                    <a:pPr algn="ctr"/>
+                    <a:endParaRPr lang="en-US">
+                      <a:solidFill>
+                        <a:srgbClr val="FAC090"/>
+                      </a:solidFill>
+                    </a:endParaRPr>
+                  </a:p>
+                </p:txBody>
+              </p:sp>
+            </p:grpSp>
+            <p:grpSp>
+              <p:nvGrpSpPr>
+                <p:cNvPr id="24" name="Group 23"/>
+                <p:cNvGrpSpPr/>
+                <p:nvPr/>
+              </p:nvGrpSpPr>
+              <p:grpSpPr>
+                <a:xfrm rot="5400000">
+                  <a:off x="4130261" y="2864044"/>
+                  <a:ext cx="419652" cy="408609"/>
+                  <a:chOff x="2292627" y="2650433"/>
+                  <a:chExt cx="419652" cy="408609"/>
+                </a:xfrm>
+              </p:grpSpPr>
+              <p:sp>
+                <p:nvSpPr>
+                  <p:cNvPr id="21" name="Oval 20"/>
+                  <p:cNvSpPr/>
+                  <p:nvPr/>
+                </p:nvSpPr>
+                <p:spPr>
+                  <a:xfrm>
+                    <a:off x="2292627" y="2650433"/>
+                    <a:ext cx="419652" cy="408609"/>
+                  </a:xfrm>
+                  <a:prstGeom prst="ellipse">
+                    <a:avLst/>
+                  </a:prstGeom>
+                  <a:solidFill>
+                    <a:schemeClr val="accent6">
+                      <a:lumMod val="60000"/>
+                      <a:lumOff val="40000"/>
+                    </a:schemeClr>
+                  </a:solidFill>
+                  <a:ln>
+                    <a:noFill/>
+                  </a:ln>
+                </p:spPr>
+                <p:style>
+                  <a:lnRef idx="1">
+                    <a:schemeClr val="accent1"/>
+                  </a:lnRef>
+                  <a:fillRef idx="3">
+                    <a:schemeClr val="accent1"/>
+                  </a:fillRef>
+                  <a:effectRef idx="2">
+                    <a:schemeClr val="accent1"/>
+                  </a:effectRef>
+                  <a:fontRef idx="minor">
+                    <a:schemeClr val="lt1"/>
+                  </a:fontRef>
+                </p:style>
+                <p:txBody>
+                  <a:bodyPr rtlCol="0" anchor="ctr"/>
+                  <a:lstStyle/>
+                  <a:p>
+                    <a:pPr algn="ctr"/>
+                    <a:endParaRPr lang="en-US">
+                      <a:solidFill>
+                        <a:srgbClr val="FAC090"/>
+                      </a:solidFill>
+                    </a:endParaRPr>
+                  </a:p>
+                </p:txBody>
+              </p:sp>
+              <p:sp>
+                <p:nvSpPr>
+                  <p:cNvPr id="22" name="Oval 21"/>
+                  <p:cNvSpPr/>
+                  <p:nvPr/>
+                </p:nvSpPr>
+                <p:spPr>
+                  <a:xfrm>
+                    <a:off x="2393124" y="2793097"/>
+                    <a:ext cx="209826" cy="207616"/>
+                  </a:xfrm>
+                  <a:prstGeom prst="ellipse">
+                    <a:avLst/>
+                  </a:prstGeom>
+                  <a:solidFill>
+                    <a:schemeClr val="accent6">
+                      <a:lumMod val="75000"/>
+                    </a:schemeClr>
+                  </a:solidFill>
+                  <a:ln>
+                    <a:noFill/>
+                  </a:ln>
+                </p:spPr>
+                <p:style>
+                  <a:lnRef idx="1">
+                    <a:schemeClr val="accent1"/>
+                  </a:lnRef>
+                  <a:fillRef idx="3">
+                    <a:schemeClr val="accent1"/>
+                  </a:fillRef>
+                  <a:effectRef idx="2">
+                    <a:schemeClr val="accent1"/>
+                  </a:effectRef>
+                  <a:fontRef idx="minor">
+                    <a:schemeClr val="lt1"/>
+                  </a:fontRef>
+                </p:style>
+                <p:txBody>
+                  <a:bodyPr rtlCol="0" anchor="ctr"/>
+                  <a:lstStyle/>
+                  <a:p>
+                    <a:pPr algn="ctr"/>
+                    <a:endParaRPr lang="en-US">
+                      <a:solidFill>
+                        <a:srgbClr val="FAC090"/>
+                      </a:solidFill>
+                    </a:endParaRPr>
+                  </a:p>
+                </p:txBody>
+              </p:sp>
+            </p:grpSp>
+            <p:grpSp>
+              <p:nvGrpSpPr>
+                <p:cNvPr id="18" name="Group 17"/>
+                <p:cNvGrpSpPr/>
+                <p:nvPr/>
+              </p:nvGrpSpPr>
+              <p:grpSpPr>
+                <a:xfrm>
+                  <a:off x="4340088" y="2395818"/>
+                  <a:ext cx="1266731" cy="1745485"/>
+                  <a:chOff x="4340088" y="2395818"/>
+                  <a:chExt cx="1266731" cy="1745485"/>
+                </a:xfrm>
+              </p:grpSpPr>
+              <p:sp>
+                <p:nvSpPr>
+                  <p:cNvPr id="4" name="Rounded Rectangle 3"/>
+                  <p:cNvSpPr/>
+                  <p:nvPr/>
+                </p:nvSpPr>
+                <p:spPr>
+                  <a:xfrm>
+                    <a:off x="4340088" y="2395818"/>
+                    <a:ext cx="1257428" cy="1745485"/>
+                  </a:xfrm>
+                  <a:prstGeom prst="roundRect">
+                    <a:avLst/>
+                  </a:prstGeom>
+                  <a:solidFill>
+                    <a:schemeClr val="accent6">
+                      <a:lumMod val="60000"/>
+                      <a:lumOff val="40000"/>
+                    </a:schemeClr>
+                  </a:solidFill>
+                  <a:ln>
+                    <a:noFill/>
+                  </a:ln>
+                </p:spPr>
+                <p:style>
+                  <a:lnRef idx="1">
+                    <a:schemeClr val="accent1"/>
+                  </a:lnRef>
+                  <a:fillRef idx="3">
+                    <a:schemeClr val="accent1"/>
+                  </a:fillRef>
+                  <a:effectRef idx="2">
+                    <a:schemeClr val="accent1"/>
+                  </a:effectRef>
+                  <a:fontRef idx="minor">
+                    <a:schemeClr val="lt1"/>
+                  </a:fontRef>
+                </p:style>
+                <p:txBody>
+                  <a:bodyPr rtlCol="0" anchor="ctr"/>
+                  <a:lstStyle/>
+                  <a:p>
+                    <a:pPr algn="ctr"/>
+                    <a:endParaRPr lang="en-US">
+                      <a:solidFill>
+                        <a:schemeClr val="accent6">
+                          <a:lumMod val="60000"/>
+                          <a:lumOff val="40000"/>
+                        </a:schemeClr>
+                      </a:solidFill>
+                    </a:endParaRPr>
+                  </a:p>
+                </p:txBody>
+              </p:sp>
+              <p:grpSp>
+                <p:nvGrpSpPr>
+                  <p:cNvPr id="3" name="Group 2"/>
+                  <p:cNvGrpSpPr/>
+                  <p:nvPr/>
+                </p:nvGrpSpPr>
+                <p:grpSpPr>
+                  <a:xfrm>
+                    <a:off x="4340088" y="2672521"/>
+                    <a:ext cx="629478" cy="688024"/>
+                    <a:chOff x="1778000" y="2153478"/>
+                    <a:chExt cx="629478" cy="688024"/>
+                  </a:xfrm>
+                </p:grpSpPr>
+                <p:sp>
+                  <p:nvSpPr>
+                    <p:cNvPr id="6" name="Oval 5"/>
+                    <p:cNvSpPr/>
+                    <p:nvPr/>
+                  </p:nvSpPr>
+                  <p:spPr>
+                    <a:xfrm>
+                      <a:off x="1778000" y="2153478"/>
+                      <a:ext cx="629478" cy="688024"/>
+                    </a:xfrm>
+                    <a:prstGeom prst="ellipse">
+                      <a:avLst/>
+                    </a:prstGeom>
+                    <a:solidFill>
+                      <a:schemeClr val="tx1"/>
+                    </a:solidFill>
+                    <a:ln>
+                      <a:noFill/>
+                    </a:ln>
+                  </p:spPr>
+                  <p:style>
+                    <a:lnRef idx="1">
+                      <a:schemeClr val="accent1"/>
+                    </a:lnRef>
+                    <a:fillRef idx="3">
+                      <a:schemeClr val="accent1"/>
+                    </a:fillRef>
+                    <a:effectRef idx="2">
+                      <a:schemeClr val="accent1"/>
+                    </a:effectRef>
+                    <a:fontRef idx="minor">
+                      <a:schemeClr val="lt1"/>
+                    </a:fontRef>
+                  </p:style>
+                  <p:txBody>
+                    <a:bodyPr rtlCol="0" anchor="ctr"/>
+                    <a:lstStyle/>
+                    <a:p>
+                      <a:pPr algn="ctr"/>
+                      <a:endParaRPr lang="en-US"/>
+                    </a:p>
+                  </p:txBody>
+                </p:sp>
+                <p:grpSp>
+                  <p:nvGrpSpPr>
+                    <p:cNvPr id="2" name="Group 1"/>
+                    <p:cNvGrpSpPr/>
+                    <p:nvPr/>
+                  </p:nvGrpSpPr>
+                  <p:grpSpPr>
+                    <a:xfrm>
+                      <a:off x="1877391" y="2274054"/>
+                      <a:ext cx="430696" cy="485077"/>
+                      <a:chOff x="2705652" y="2771912"/>
+                      <a:chExt cx="352377" cy="334121"/>
+                    </a:xfrm>
+                  </p:grpSpPr>
+                  <p:sp>
+                    <p:nvSpPr>
+                      <p:cNvPr id="5" name="Oval 4"/>
+                      <p:cNvSpPr/>
+                      <p:nvPr/>
+                    </p:nvSpPr>
+                    <p:spPr>
+                      <a:xfrm>
+                        <a:off x="2705652" y="2771912"/>
+                        <a:ext cx="352377" cy="334121"/>
+                      </a:xfrm>
+                      <a:prstGeom prst="ellipse">
+                        <a:avLst/>
+                      </a:prstGeom>
+                      <a:solidFill>
+                        <a:schemeClr val="accent5">
+                          <a:lumMod val="60000"/>
+                          <a:lumOff val="40000"/>
+                        </a:schemeClr>
+                      </a:solidFill>
+                      <a:ln>
+                        <a:noFill/>
+                      </a:ln>
+                    </p:spPr>
+                    <p:style>
+                      <a:lnRef idx="1">
+                        <a:schemeClr val="accent1"/>
+                      </a:lnRef>
+                      <a:fillRef idx="3">
+                        <a:schemeClr val="accent1"/>
+                      </a:fillRef>
+                      <a:effectRef idx="2">
+                        <a:schemeClr val="accent1"/>
+                      </a:effectRef>
+                      <a:fontRef idx="minor">
+                        <a:schemeClr val="lt1"/>
+                      </a:fontRef>
+                    </p:style>
+                    <p:txBody>
+                      <a:bodyPr rtlCol="0" anchor="ctr"/>
+                      <a:lstStyle/>
+                      <a:p>
+                        <a:pPr algn="ctr"/>
+                        <a:endParaRPr lang="en-US"/>
+                      </a:p>
+                    </p:txBody>
+                  </p:sp>
+                  <p:sp>
+                    <p:nvSpPr>
+                      <p:cNvPr id="7" name="Oval 6"/>
+                      <p:cNvSpPr/>
+                      <p:nvPr/>
+                    </p:nvSpPr>
+                    <p:spPr>
+                      <a:xfrm>
+                        <a:off x="2705652" y="2786283"/>
+                        <a:ext cx="339895" cy="319750"/>
+                      </a:xfrm>
+                      <a:custGeom>
+                        <a:avLst/>
+                        <a:gdLst/>
+                        <a:ahLst/>
+                        <a:cxnLst/>
+                        <a:rect l="l" t="t" r="r" b="b"/>
+                        <a:pathLst>
+                          <a:path w="339895" h="319750">
+                            <a:moveTo>
+                              <a:pt x="1297" y="212203"/>
+                            </a:moveTo>
+                            <a:lnTo>
+                              <a:pt x="137988" y="319750"/>
+                            </a:lnTo>
+                            <a:lnTo>
+                              <a:pt x="97666" y="312054"/>
+                            </a:lnTo>
+                            <a:cubicBezTo>
+                              <a:pt x="55387" y="295146"/>
+                              <a:pt x="21516" y="263122"/>
+                              <a:pt x="3634" y="223149"/>
+                            </a:cubicBezTo>
+                            <a:close/>
+                            <a:moveTo>
+                              <a:pt x="21128" y="68561"/>
+                            </a:moveTo>
+                            <a:lnTo>
+                              <a:pt x="287915" y="278464"/>
+                            </a:lnTo>
+                            <a:lnTo>
+                              <a:pt x="247070" y="304501"/>
+                            </a:lnTo>
+                            <a:lnTo>
+                              <a:pt x="0" y="110111"/>
+                            </a:lnTo>
+                            <a:lnTo>
+                              <a:pt x="3634" y="93094"/>
+                            </a:lnTo>
+                            <a:close/>
+                            <a:moveTo>
+                              <a:pt x="119608" y="0"/>
+                            </a:moveTo>
+                            <a:lnTo>
+                              <a:pt x="339895" y="173319"/>
+                            </a:lnTo>
+                            <a:lnTo>
+                              <a:pt x="329260" y="223125"/>
+                            </a:lnTo>
+                            <a:lnTo>
+                              <a:pt x="71883" y="20624"/>
+                            </a:lnTo>
+                            <a:lnTo>
+                              <a:pt x="97666" y="4189"/>
+                            </a:lnTo>
+                            <a:close/>
+                          </a:path>
+                        </a:pathLst>
+                      </a:custGeom>
+                      <a:solidFill>
+                        <a:schemeClr val="accent5">
+                          <a:lumMod val="60000"/>
+                          <a:lumOff val="40000"/>
+                        </a:schemeClr>
+                      </a:solidFill>
+                      <a:ln>
+                        <a:noFill/>
+                      </a:ln>
+                    </p:spPr>
+                    <p:style>
+                      <a:lnRef idx="1">
+                        <a:schemeClr val="accent1"/>
+                      </a:lnRef>
+                      <a:fillRef idx="3">
+                        <a:schemeClr val="accent1"/>
+                      </a:fillRef>
+                      <a:effectRef idx="2">
+                        <a:schemeClr val="accent1"/>
+                      </a:effectRef>
+                      <a:fontRef idx="minor">
+                        <a:schemeClr val="lt1"/>
+                      </a:fontRef>
+                    </p:style>
+                    <p:txBody>
+                      <a:bodyPr rtlCol="0" anchor="ctr"/>
+                      <a:lstStyle/>
+                      <a:p>
+                        <a:pPr algn="ctr"/>
+                        <a:endParaRPr lang="en-US" dirty="0"/>
+                      </a:p>
+                    </p:txBody>
+                  </p:sp>
+                </p:grpSp>
+              </p:grpSp>
+              <p:grpSp>
+                <p:nvGrpSpPr>
+                  <p:cNvPr id="12" name="Group 11"/>
+                  <p:cNvGrpSpPr/>
+                  <p:nvPr/>
+                </p:nvGrpSpPr>
+                <p:grpSpPr>
+                  <a:xfrm>
+                    <a:off x="4977341" y="2672521"/>
+                    <a:ext cx="629478" cy="688024"/>
+                    <a:chOff x="1778000" y="2153478"/>
+                    <a:chExt cx="629478" cy="688024"/>
+                  </a:xfrm>
+                </p:grpSpPr>
+                <p:sp>
+                  <p:nvSpPr>
+                    <p:cNvPr id="13" name="Oval 12"/>
+                    <p:cNvSpPr/>
+                    <p:nvPr/>
+                  </p:nvSpPr>
+                  <p:spPr>
+                    <a:xfrm>
+                      <a:off x="1778000" y="2153478"/>
+                      <a:ext cx="629478" cy="688024"/>
+                    </a:xfrm>
+                    <a:prstGeom prst="ellipse">
+                      <a:avLst/>
+                    </a:prstGeom>
+                    <a:solidFill>
+                      <a:schemeClr val="tx1"/>
+                    </a:solidFill>
+                    <a:ln>
+                      <a:noFill/>
+                    </a:ln>
+                  </p:spPr>
+                  <p:style>
+                    <a:lnRef idx="1">
+                      <a:schemeClr val="accent1"/>
+                    </a:lnRef>
+                    <a:fillRef idx="3">
+                      <a:schemeClr val="accent1"/>
+                    </a:fillRef>
+                    <a:effectRef idx="2">
+                      <a:schemeClr val="accent1"/>
+                    </a:effectRef>
+                    <a:fontRef idx="minor">
+                      <a:schemeClr val="lt1"/>
+                    </a:fontRef>
+                  </p:style>
+                  <p:txBody>
+                    <a:bodyPr rtlCol="0" anchor="ctr"/>
+                    <a:lstStyle/>
+                    <a:p>
+                      <a:pPr algn="ctr"/>
+                      <a:endParaRPr lang="en-US"/>
+                    </a:p>
+                  </p:txBody>
+                </p:sp>
+                <p:grpSp>
+                  <p:nvGrpSpPr>
+                    <p:cNvPr id="14" name="Group 13"/>
+                    <p:cNvGrpSpPr/>
+                    <p:nvPr/>
+                  </p:nvGrpSpPr>
+                  <p:grpSpPr>
+                    <a:xfrm>
+                      <a:off x="1877391" y="2274054"/>
+                      <a:ext cx="430696" cy="485077"/>
+                      <a:chOff x="2705652" y="2771912"/>
+                      <a:chExt cx="352377" cy="334121"/>
+                    </a:xfrm>
+                  </p:grpSpPr>
+                  <p:sp>
+                    <p:nvSpPr>
+                      <p:cNvPr id="15" name="Oval 14"/>
+                      <p:cNvSpPr/>
+                      <p:nvPr/>
+                    </p:nvSpPr>
+                    <p:spPr>
+                      <a:xfrm>
+                        <a:off x="2705652" y="2771912"/>
+                        <a:ext cx="352377" cy="334121"/>
+                      </a:xfrm>
+                      <a:prstGeom prst="ellipse">
+                        <a:avLst/>
+                      </a:prstGeom>
+                      <a:solidFill>
+                        <a:schemeClr val="accent5">
+                          <a:lumMod val="60000"/>
+                          <a:lumOff val="40000"/>
+                        </a:schemeClr>
+                      </a:solidFill>
+                      <a:ln>
+                        <a:noFill/>
+                      </a:ln>
+                    </p:spPr>
+                    <p:style>
+                      <a:lnRef idx="1">
+                        <a:schemeClr val="accent1"/>
+                      </a:lnRef>
+                      <a:fillRef idx="3">
+                        <a:schemeClr val="accent1"/>
+                      </a:fillRef>
+                      <a:effectRef idx="2">
+                        <a:schemeClr val="accent1"/>
+                      </a:effectRef>
+                      <a:fontRef idx="minor">
+                        <a:schemeClr val="lt1"/>
+                      </a:fontRef>
+                    </p:style>
+                    <p:txBody>
+                      <a:bodyPr rtlCol="0" anchor="ctr"/>
+                      <a:lstStyle/>
+                      <a:p>
+                        <a:pPr algn="ctr"/>
+                        <a:endParaRPr lang="en-US" dirty="0"/>
+                      </a:p>
+                    </p:txBody>
+                  </p:sp>
+                  <p:sp>
+                    <p:nvSpPr>
+                      <p:cNvPr id="16" name="Oval 6"/>
+                      <p:cNvSpPr/>
+                      <p:nvPr/>
+                    </p:nvSpPr>
+                    <p:spPr>
+                      <a:xfrm>
+                        <a:off x="2705652" y="2786283"/>
+                        <a:ext cx="339895" cy="319750"/>
+                      </a:xfrm>
+                      <a:custGeom>
+                        <a:avLst/>
+                        <a:gdLst/>
+                        <a:ahLst/>
+                        <a:cxnLst/>
+                        <a:rect l="l" t="t" r="r" b="b"/>
+                        <a:pathLst>
+                          <a:path w="339895" h="319750">
+                            <a:moveTo>
+                              <a:pt x="1297" y="212203"/>
+                            </a:moveTo>
+                            <a:lnTo>
+                              <a:pt x="137988" y="319750"/>
+                            </a:lnTo>
+                            <a:lnTo>
+                              <a:pt x="97666" y="312054"/>
+                            </a:lnTo>
+                            <a:cubicBezTo>
+                              <a:pt x="55387" y="295146"/>
+                              <a:pt x="21516" y="263122"/>
+                              <a:pt x="3634" y="223149"/>
+                            </a:cubicBezTo>
+                            <a:close/>
+                            <a:moveTo>
+                              <a:pt x="21128" y="68561"/>
+                            </a:moveTo>
+                            <a:lnTo>
+                              <a:pt x="287915" y="278464"/>
+                            </a:lnTo>
+                            <a:lnTo>
+                              <a:pt x="247070" y="304501"/>
+                            </a:lnTo>
+                            <a:lnTo>
+                              <a:pt x="0" y="110111"/>
+                            </a:lnTo>
+                            <a:lnTo>
+                              <a:pt x="3634" y="93094"/>
+                            </a:lnTo>
+                            <a:close/>
+                            <a:moveTo>
+                              <a:pt x="119608" y="0"/>
+                            </a:moveTo>
+                            <a:lnTo>
+                              <a:pt x="339895" y="173319"/>
+                            </a:lnTo>
+                            <a:lnTo>
+                              <a:pt x="329260" y="223125"/>
+                            </a:lnTo>
+                            <a:lnTo>
+                              <a:pt x="71883" y="20624"/>
+                            </a:lnTo>
+                            <a:lnTo>
+                              <a:pt x="97666" y="4189"/>
+                            </a:lnTo>
+                            <a:close/>
+                          </a:path>
+                        </a:pathLst>
+                      </a:custGeom>
+                      <a:solidFill>
+                        <a:schemeClr val="accent5">
+                          <a:lumMod val="60000"/>
+                          <a:lumOff val="40000"/>
+                        </a:schemeClr>
+                      </a:solidFill>
+                      <a:ln>
+                        <a:noFill/>
+                      </a:ln>
+                    </p:spPr>
+                    <p:style>
+                      <a:lnRef idx="1">
+                        <a:schemeClr val="accent1"/>
+                      </a:lnRef>
+                      <a:fillRef idx="3">
+                        <a:schemeClr val="accent1"/>
+                      </a:fillRef>
+                      <a:effectRef idx="2">
+                        <a:schemeClr val="accent1"/>
+                      </a:effectRef>
+                      <a:fontRef idx="minor">
+                        <a:schemeClr val="lt1"/>
+                      </a:fontRef>
+                    </p:style>
+                    <p:txBody>
+                      <a:bodyPr rtlCol="0" anchor="ctr"/>
+                      <a:lstStyle/>
+                      <a:p>
+                        <a:pPr algn="ctr"/>
+                        <a:endParaRPr lang="en-US" dirty="0"/>
+                      </a:p>
+                    </p:txBody>
+                  </p:sp>
+                </p:grpSp>
+              </p:grpSp>
+              <p:sp>
+                <p:nvSpPr>
+                  <p:cNvPr id="17" name="Rectangle 16"/>
+                  <p:cNvSpPr/>
+                  <p:nvPr/>
+                </p:nvSpPr>
+                <p:spPr>
+                  <a:xfrm flipV="1">
+                    <a:off x="4870175" y="2813960"/>
+                    <a:ext cx="206557" cy="79431"/>
+                  </a:xfrm>
+                  <a:prstGeom prst="rect">
+                    <a:avLst/>
+                  </a:prstGeom>
+                  <a:solidFill>
+                    <a:schemeClr val="tx1"/>
+                  </a:solidFill>
+                  <a:ln>
+                    <a:noFill/>
+                  </a:ln>
+                </p:spPr>
+                <p:style>
+                  <a:lnRef idx="1">
+                    <a:schemeClr val="accent1"/>
+                  </a:lnRef>
+                  <a:fillRef idx="3">
+                    <a:schemeClr val="accent1"/>
+                  </a:fillRef>
+                  <a:effectRef idx="2">
+                    <a:schemeClr val="accent1"/>
+                  </a:effectRef>
+                  <a:fontRef idx="minor">
+                    <a:schemeClr val="lt1"/>
+                  </a:fontRef>
+                </p:style>
+                <p:txBody>
+                  <a:bodyPr rtlCol="0" anchor="ctr"/>
+                  <a:lstStyle/>
+                  <a:p>
+                    <a:pPr algn="ctr"/>
+                    <a:endParaRPr lang="en-US"/>
+                  </a:p>
+                </p:txBody>
+              </p:sp>
+            </p:grpSp>
+            <p:grpSp>
+              <p:nvGrpSpPr>
+                <p:cNvPr id="28" name="Group 27"/>
+                <p:cNvGrpSpPr/>
+                <p:nvPr/>
+              </p:nvGrpSpPr>
+              <p:grpSpPr>
+                <a:xfrm flipV="1">
+                  <a:off x="4832441" y="3499237"/>
+                  <a:ext cx="232857" cy="45719"/>
+                  <a:chOff x="2007478" y="3360545"/>
+                  <a:chExt cx="535356" cy="216000"/>
+                </a:xfrm>
+              </p:grpSpPr>
+              <p:sp>
+                <p:nvSpPr>
+                  <p:cNvPr id="26" name="Oval 25"/>
+                  <p:cNvSpPr/>
+                  <p:nvPr/>
+                </p:nvSpPr>
+                <p:spPr>
+                  <a:xfrm>
+                    <a:off x="2007478" y="3360545"/>
+                    <a:ext cx="216000" cy="216000"/>
+                  </a:xfrm>
+                  <a:prstGeom prst="ellipse">
+                    <a:avLst/>
+                  </a:prstGeom>
+                  <a:solidFill>
+                    <a:schemeClr val="accent6">
+                      <a:lumMod val="50000"/>
+                    </a:schemeClr>
+                  </a:solidFill>
+                  <a:ln>
+                    <a:noFill/>
+                  </a:ln>
+                </p:spPr>
+                <p:style>
+                  <a:lnRef idx="1">
+                    <a:schemeClr val="accent1"/>
+                  </a:lnRef>
+                  <a:fillRef idx="3">
+                    <a:schemeClr val="accent1"/>
+                  </a:fillRef>
+                  <a:effectRef idx="2">
+                    <a:schemeClr val="accent1"/>
+                  </a:effectRef>
+                  <a:fontRef idx="minor">
+                    <a:schemeClr val="lt1"/>
+                  </a:fontRef>
+                </p:style>
+                <p:txBody>
+                  <a:bodyPr rtlCol="0" anchor="ctr"/>
+                  <a:lstStyle/>
+                  <a:p>
+                    <a:pPr algn="ctr"/>
+                    <a:endParaRPr lang="en-US"/>
+                  </a:p>
+                </p:txBody>
+              </p:sp>
+              <p:sp>
+                <p:nvSpPr>
+                  <p:cNvPr id="27" name="Oval 26"/>
+                  <p:cNvSpPr/>
+                  <p:nvPr/>
+                </p:nvSpPr>
+                <p:spPr>
+                  <a:xfrm>
+                    <a:off x="2326834" y="3360545"/>
+                    <a:ext cx="216000" cy="216000"/>
+                  </a:xfrm>
+                  <a:prstGeom prst="ellipse">
+                    <a:avLst/>
+                  </a:prstGeom>
+                  <a:solidFill>
+                    <a:schemeClr val="accent6">
+                      <a:lumMod val="50000"/>
+                    </a:schemeClr>
+                  </a:solidFill>
+                  <a:ln>
+                    <a:noFill/>
+                  </a:ln>
+                </p:spPr>
+                <p:style>
+                  <a:lnRef idx="1">
+                    <a:schemeClr val="accent1"/>
+                  </a:lnRef>
+                  <a:fillRef idx="3">
+                    <a:schemeClr val="accent1"/>
+                  </a:fillRef>
+                  <a:effectRef idx="2">
+                    <a:schemeClr val="accent1"/>
+                  </a:effectRef>
+                  <a:fontRef idx="minor">
+                    <a:schemeClr val="lt1"/>
+                  </a:fontRef>
+                </p:style>
+                <p:txBody>
+                  <a:bodyPr rtlCol="0" anchor="ctr"/>
+                  <a:lstStyle/>
+                  <a:p>
+                    <a:pPr algn="ctr"/>
+                    <a:endParaRPr lang="en-US"/>
+                  </a:p>
+                </p:txBody>
+              </p:sp>
+            </p:grpSp>
+            <p:sp>
+              <p:nvSpPr>
+                <p:cNvPr id="29" name="Oval 28"/>
+                <p:cNvSpPr/>
+                <p:nvPr/>
+              </p:nvSpPr>
+              <p:spPr>
+                <a:xfrm>
+                  <a:off x="4544392" y="1998870"/>
+                  <a:ext cx="696659" cy="673651"/>
+                </a:xfrm>
+                <a:prstGeom prst="ellipse">
+                  <a:avLst/>
+                </a:prstGeom>
+                <a:solidFill>
+                  <a:schemeClr val="tx1"/>
+                </a:solidFill>
+                <a:ln>
+                  <a:noFill/>
+                </a:ln>
+              </p:spPr>
+              <p:style>
+                <a:lnRef idx="1">
+                  <a:schemeClr val="accent1"/>
+                </a:lnRef>
+                <a:fillRef idx="3">
+                  <a:schemeClr val="accent1"/>
+                </a:fillRef>
+                <a:effectRef idx="2">
+                  <a:schemeClr val="accent1"/>
+                </a:effectRef>
+                <a:fontRef idx="minor">
+                  <a:schemeClr val="lt1"/>
+                </a:fontRef>
+              </p:style>
+              <p:txBody>
+                <a:bodyPr rtlCol="0" anchor="ctr"/>
+                <a:lstStyle/>
+                <a:p>
+                  <a:pPr algn="ctr"/>
+                  <a:endParaRPr lang="en-US" dirty="0"/>
+                </a:p>
+              </p:txBody>
+            </p:sp>
+            <p:sp>
+              <p:nvSpPr>
+                <p:cNvPr id="30" name="Oval 29"/>
+                <p:cNvSpPr/>
+                <p:nvPr/>
+              </p:nvSpPr>
+              <p:spPr>
+                <a:xfrm>
+                  <a:off x="4194112" y="2109304"/>
+                  <a:ext cx="590259" cy="502538"/>
+                </a:xfrm>
+                <a:prstGeom prst="ellipse">
+                  <a:avLst/>
+                </a:prstGeom>
+                <a:solidFill>
+                  <a:schemeClr val="tx1"/>
+                </a:solidFill>
+                <a:ln>
+                  <a:noFill/>
+                </a:ln>
+              </p:spPr>
+              <p:style>
+                <a:lnRef idx="1">
+                  <a:schemeClr val="accent1"/>
+                </a:lnRef>
+                <a:fillRef idx="3">
+                  <a:schemeClr val="accent1"/>
+                </a:fillRef>
+                <a:effectRef idx="2">
+                  <a:schemeClr val="accent1"/>
+                </a:effectRef>
+                <a:fontRef idx="minor">
+                  <a:schemeClr val="lt1"/>
+                </a:fontRef>
+              </p:style>
+              <p:txBody>
+                <a:bodyPr rtlCol="0" anchor="ctr"/>
+                <a:lstStyle/>
+                <a:p>
+                  <a:pPr algn="ctr"/>
+                  <a:endParaRPr lang="en-US" dirty="0"/>
+                </a:p>
+              </p:txBody>
+            </p:sp>
+            <p:sp>
+              <p:nvSpPr>
+                <p:cNvPr id="31" name="Oval 30"/>
+                <p:cNvSpPr/>
+                <p:nvPr/>
+              </p:nvSpPr>
+              <p:spPr>
+                <a:xfrm>
+                  <a:off x="5102055" y="2395818"/>
+                  <a:ext cx="294719" cy="247914"/>
+                </a:xfrm>
+                <a:prstGeom prst="ellipse">
+                  <a:avLst/>
+                </a:prstGeom>
+                <a:solidFill>
+                  <a:schemeClr val="tx1"/>
+                </a:solidFill>
+                <a:ln>
+                  <a:noFill/>
+                </a:ln>
+              </p:spPr>
+              <p:style>
+                <a:lnRef idx="1">
+                  <a:schemeClr val="accent1"/>
+                </a:lnRef>
+                <a:fillRef idx="3">
+                  <a:schemeClr val="accent1"/>
+                </a:fillRef>
+                <a:effectRef idx="2">
+                  <a:schemeClr val="accent1"/>
+                </a:effectRef>
+                <a:fontRef idx="minor">
+                  <a:schemeClr val="lt1"/>
+                </a:fontRef>
+              </p:style>
+              <p:txBody>
+                <a:bodyPr rtlCol="0" anchor="ctr"/>
+                <a:lstStyle/>
+                <a:p>
+                  <a:pPr algn="ctr"/>
+                  <a:endParaRPr lang="en-US" dirty="0"/>
+                </a:p>
+              </p:txBody>
+            </p:sp>
+            <p:sp>
+              <p:nvSpPr>
+                <p:cNvPr id="32" name="Oval 31"/>
+                <p:cNvSpPr/>
+                <p:nvPr/>
+              </p:nvSpPr>
+              <p:spPr>
+                <a:xfrm>
+                  <a:off x="4093461" y="2372544"/>
+                  <a:ext cx="412280" cy="429793"/>
+                </a:xfrm>
+                <a:prstGeom prst="ellipse">
+                  <a:avLst/>
+                </a:prstGeom>
+                <a:solidFill>
+                  <a:schemeClr val="tx1"/>
+                </a:solidFill>
+                <a:ln>
+                  <a:noFill/>
+                </a:ln>
+              </p:spPr>
+              <p:style>
+                <a:lnRef idx="1">
+                  <a:schemeClr val="accent1"/>
+                </a:lnRef>
+                <a:fillRef idx="3">
+                  <a:schemeClr val="accent1"/>
+                </a:fillRef>
+                <a:effectRef idx="2">
+                  <a:schemeClr val="accent1"/>
+                </a:effectRef>
+                <a:fontRef idx="minor">
+                  <a:schemeClr val="lt1"/>
+                </a:fontRef>
+              </p:style>
+              <p:txBody>
+                <a:bodyPr rtlCol="0" anchor="ctr"/>
+                <a:lstStyle/>
+                <a:p>
+                  <a:pPr algn="ctr"/>
+                  <a:endParaRPr lang="en-US" dirty="0"/>
+                </a:p>
+              </p:txBody>
+            </p:sp>
+            <p:sp>
+              <p:nvSpPr>
+                <p:cNvPr id="33" name="Oval 32"/>
+                <p:cNvSpPr/>
+                <p:nvPr/>
+              </p:nvSpPr>
+              <p:spPr>
+                <a:xfrm>
+                  <a:off x="5065298" y="2186608"/>
+                  <a:ext cx="449493" cy="338177"/>
+                </a:xfrm>
+                <a:prstGeom prst="ellipse">
+                  <a:avLst/>
+                </a:prstGeom>
+                <a:solidFill>
+                  <a:schemeClr val="tx1"/>
+                </a:solidFill>
+                <a:ln>
+                  <a:noFill/>
+                </a:ln>
+              </p:spPr>
+              <p:style>
+                <a:lnRef idx="1">
+                  <a:schemeClr val="accent1"/>
+                </a:lnRef>
+                <a:fillRef idx="3">
+                  <a:schemeClr val="accent1"/>
+                </a:fillRef>
+                <a:effectRef idx="2">
+                  <a:schemeClr val="accent1"/>
+                </a:effectRef>
+                <a:fontRef idx="minor">
+                  <a:schemeClr val="lt1"/>
+                </a:fontRef>
+              </p:style>
+              <p:txBody>
+                <a:bodyPr rtlCol="0" anchor="ctr"/>
+                <a:lstStyle/>
+                <a:p>
+                  <a:pPr algn="ctr"/>
+                  <a:endParaRPr lang="en-US" dirty="0"/>
+                </a:p>
+              </p:txBody>
+            </p:sp>
+            <p:sp>
+              <p:nvSpPr>
+                <p:cNvPr id="34" name="Oval 33"/>
+                <p:cNvSpPr/>
+                <p:nvPr/>
+              </p:nvSpPr>
+              <p:spPr>
+                <a:xfrm>
+                  <a:off x="5364088" y="2263913"/>
+                  <a:ext cx="294719" cy="332881"/>
+                </a:xfrm>
+                <a:prstGeom prst="ellipse">
+                  <a:avLst/>
+                </a:prstGeom>
+                <a:solidFill>
+                  <a:schemeClr val="tx1"/>
+                </a:solidFill>
+                <a:ln>
+                  <a:noFill/>
+                </a:ln>
+              </p:spPr>
+              <p:style>
+                <a:lnRef idx="1">
+                  <a:schemeClr val="accent1"/>
+                </a:lnRef>
+                <a:fillRef idx="3">
+                  <a:schemeClr val="accent1"/>
+                </a:fillRef>
+                <a:effectRef idx="2">
+                  <a:schemeClr val="accent1"/>
+                </a:effectRef>
+                <a:fontRef idx="minor">
+                  <a:schemeClr val="lt1"/>
+                </a:fontRef>
+              </p:style>
+              <p:txBody>
+                <a:bodyPr rtlCol="0" anchor="ctr"/>
+                <a:lstStyle/>
+                <a:p>
+                  <a:pPr algn="ctr"/>
+                  <a:endParaRPr lang="en-US" dirty="0"/>
+                </a:p>
+              </p:txBody>
+            </p:sp>
+            <p:sp>
+              <p:nvSpPr>
+                <p:cNvPr id="35" name="Oval 34"/>
+                <p:cNvSpPr/>
+                <p:nvPr/>
+              </p:nvSpPr>
+              <p:spPr>
+                <a:xfrm>
+                  <a:off x="5436096" y="2492896"/>
+                  <a:ext cx="294719" cy="247914"/>
+                </a:xfrm>
+                <a:prstGeom prst="ellipse">
+                  <a:avLst/>
+                </a:prstGeom>
+                <a:solidFill>
+                  <a:schemeClr val="tx1"/>
+                </a:solidFill>
+                <a:ln>
+                  <a:noFill/>
+                </a:ln>
+              </p:spPr>
+              <p:style>
+                <a:lnRef idx="1">
+                  <a:schemeClr val="accent1"/>
+                </a:lnRef>
+                <a:fillRef idx="3">
+                  <a:schemeClr val="accent1"/>
+                </a:fillRef>
+                <a:effectRef idx="2">
+                  <a:schemeClr val="accent1"/>
+                </a:effectRef>
+                <a:fontRef idx="minor">
+                  <a:schemeClr val="lt1"/>
+                </a:fontRef>
+              </p:style>
+              <p:txBody>
+                <a:bodyPr rtlCol="0" anchor="ctr"/>
+                <a:lstStyle/>
+                <a:p>
+                  <a:pPr algn="ctr"/>
+                  <a:endParaRPr lang="en-US" dirty="0"/>
+                </a:p>
+              </p:txBody>
+            </p:sp>
+            <p:sp>
+              <p:nvSpPr>
+                <p:cNvPr id="41" name="Freeform 40"/>
+                <p:cNvSpPr/>
+                <p:nvPr/>
+              </p:nvSpPr>
+              <p:spPr>
+                <a:xfrm>
+                  <a:off x="4754153" y="3589129"/>
+                  <a:ext cx="574261" cy="329603"/>
+                </a:xfrm>
+                <a:custGeom>
+                  <a:avLst/>
+                  <a:gdLst>
+                    <a:gd name="connsiteX0" fmla="*/ 0 w 905565"/>
+                    <a:gd name="connsiteY0" fmla="*/ 254000 h 376538"/>
+                    <a:gd name="connsiteX1" fmla="*/ 353391 w 905565"/>
+                    <a:gd name="connsiteY1" fmla="*/ 364434 h 376538"/>
+                    <a:gd name="connsiteX2" fmla="*/ 905565 w 905565"/>
+                    <a:gd name="connsiteY2" fmla="*/ 0 h 376538"/>
+                    <a:gd name="connsiteX0" fmla="*/ 0 w 771957"/>
+                    <a:gd name="connsiteY0" fmla="*/ 209826 h 329603"/>
+                    <a:gd name="connsiteX1" fmla="*/ 353391 w 771957"/>
+                    <a:gd name="connsiteY1" fmla="*/ 320260 h 329603"/>
+                    <a:gd name="connsiteX2" fmla="*/ 771957 w 771957"/>
+                    <a:gd name="connsiteY2" fmla="*/ 0 h 329603"/>
+                  </a:gdLst>
+                  <a:ahLst/>
+                  <a:cxnLst>
+                    <a:cxn ang="0">
+                      <a:pos x="connsiteX0" y="connsiteY0"/>
+                    </a:cxn>
+                    <a:cxn ang="0">
+                      <a:pos x="connsiteX1" y="connsiteY1"/>
+                    </a:cxn>
+                    <a:cxn ang="0">
+                      <a:pos x="connsiteX2" y="connsiteY2"/>
+                    </a:cxn>
+                  </a:cxnLst>
+                  <a:rect l="l" t="t" r="r" b="b"/>
+                  <a:pathLst>
+                    <a:path w="771957" h="329603">
+                      <a:moveTo>
+                        <a:pt x="0" y="209826"/>
+                      </a:moveTo>
+                      <a:cubicBezTo>
+                        <a:pt x="101231" y="286209"/>
+                        <a:pt x="224732" y="355231"/>
+                        <a:pt x="353391" y="320260"/>
+                      </a:cubicBezTo>
+                      <a:cubicBezTo>
+                        <a:pt x="482051" y="285289"/>
+                        <a:pt x="771957" y="0"/>
+                        <a:pt x="771957" y="0"/>
+                      </a:cubicBezTo>
+                    </a:path>
+                  </a:pathLst>
+                </a:custGeom>
+                <a:solidFill>
+                  <a:srgbClr val="953735"/>
+                </a:solidFill>
+                <a:ln>
+                  <a:solidFill>
+                    <a:schemeClr val="accent2">
+                      <a:lumMod val="75000"/>
+                    </a:schemeClr>
+                  </a:solidFill>
+                </a:ln>
+                <a:effectLst/>
+              </p:spPr>
+              <p:style>
+                <a:lnRef idx="2">
+                  <a:schemeClr val="accent1"/>
+                </a:lnRef>
+                <a:fillRef idx="0">
+                  <a:schemeClr val="accent1"/>
+                </a:fillRef>
+                <a:effectRef idx="1">
+                  <a:schemeClr val="accent1"/>
+                </a:effectRef>
+                <a:fontRef idx="minor">
+                  <a:schemeClr val="tx1"/>
+                </a:fontRef>
+              </p:style>
+              <p:txBody>
+                <a:bodyPr rtlCol="0" anchor="ctr"/>
+                <a:lstStyle/>
+                <a:p>
+                  <a:pPr algn="ctr"/>
+                  <a:endParaRPr lang="en-US"/>
+                </a:p>
+              </p:txBody>
+            </p:sp>
+          </p:grpSp>
+          <p:sp>
+            <p:nvSpPr>
+              <p:cNvPr id="43" name="Rounded Rectangle 42"/>
+              <p:cNvSpPr/>
+              <p:nvPr/>
+            </p:nvSpPr>
+            <p:spPr>
+              <a:xfrm>
+                <a:off x="3641052" y="2337267"/>
+                <a:ext cx="1569277" cy="2288214"/>
+              </a:xfrm>
+              <a:prstGeom prst="roundRect">
+                <a:avLst/>
+              </a:prstGeom>
+              <a:solidFill>
+                <a:srgbClr val="3366FF"/>
+              </a:solidFill>
+              <a:ln>
+                <a:noFill/>
+              </a:ln>
+              <a:effectLst/>
+            </p:spPr>
+            <p:style>
+              <a:lnRef idx="1">
+                <a:schemeClr val="accent1"/>
+              </a:lnRef>
+              <a:fillRef idx="3">
+                <a:schemeClr val="accent1"/>
+              </a:fillRef>
+              <a:effectRef idx="2">
+                <a:schemeClr val="accent1"/>
+              </a:effectRef>
+              <a:fontRef idx="minor">
+                <a:schemeClr val="lt1"/>
+              </a:fontRef>
+            </p:style>
+            <p:txBody>
+              <a:bodyPr rtlCol="0" anchor="ctr"/>
+              <a:lstStyle/>
+              <a:p>
+                <a:pPr algn="ctr"/>
+                <a:endParaRPr lang="en-US">
+                  <a:solidFill>
+                    <a:srgbClr val="FAC090"/>
+                  </a:solidFill>
+                </a:endParaRPr>
+              </a:p>
+            </p:txBody>
+          </p:sp>
+          <p:sp>
+            <p:nvSpPr>
+              <p:cNvPr id="44" name="Rectangle 43"/>
+              <p:cNvSpPr/>
+              <p:nvPr/>
+            </p:nvSpPr>
+            <p:spPr>
+              <a:xfrm>
+                <a:off x="3641053" y="4625479"/>
+                <a:ext cx="638329" cy="1415302"/>
+              </a:xfrm>
+              <a:prstGeom prst="rect">
+                <a:avLst/>
+              </a:prstGeom>
+              <a:solidFill>
+                <a:schemeClr val="tx1"/>
+              </a:solidFill>
+              <a:ln>
+                <a:solidFill>
+                  <a:schemeClr val="tx1"/>
+                </a:solidFill>
+              </a:ln>
+            </p:spPr>
+            <p:style>
+              <a:lnRef idx="1">
+                <a:schemeClr val="accent1"/>
+              </a:lnRef>
+              <a:fillRef idx="3">
+                <a:schemeClr val="accent1"/>
+              </a:fillRef>
+              <a:effectRef idx="2">
+                <a:schemeClr val="accent1"/>
+              </a:effectRef>
+              <a:fontRef idx="minor">
+                <a:schemeClr val="lt1"/>
+              </a:fontRef>
+            </p:style>
+            <p:txBody>
+              <a:bodyPr rtlCol="0" anchor="ctr"/>
+              <a:lstStyle/>
+              <a:p>
+                <a:pPr algn="ctr"/>
+                <a:endParaRPr lang="en-US"/>
+              </a:p>
+            </p:txBody>
+          </p:sp>
+          <p:sp>
+            <p:nvSpPr>
+              <p:cNvPr id="45" name="Rectangle 44"/>
+              <p:cNvSpPr/>
+              <p:nvPr/>
+            </p:nvSpPr>
+            <p:spPr>
+              <a:xfrm>
+                <a:off x="4565915" y="4625479"/>
+                <a:ext cx="638329" cy="1415302"/>
+              </a:xfrm>
+              <a:custGeom>
+                <a:avLst/>
+                <a:gdLst>
+                  <a:gd name="connsiteX0" fmla="*/ 0 w 638329"/>
+                  <a:gd name="connsiteY0" fmla="*/ 0 h 1415302"/>
+                  <a:gd name="connsiteX1" fmla="*/ 638329 w 638329"/>
+                  <a:gd name="connsiteY1" fmla="*/ 0 h 1415302"/>
+                  <a:gd name="connsiteX2" fmla="*/ 638329 w 638329"/>
+                  <a:gd name="connsiteY2" fmla="*/ 1415302 h 1415302"/>
+                  <a:gd name="connsiteX3" fmla="*/ 0 w 638329"/>
+                  <a:gd name="connsiteY3" fmla="*/ 1415302 h 1415302"/>
+                  <a:gd name="connsiteX4" fmla="*/ 0 w 638329"/>
+                  <a:gd name="connsiteY4" fmla="*/ 0 h 1415302"/>
+                  <a:gd name="connsiteX0" fmla="*/ 0 w 660416"/>
+                  <a:gd name="connsiteY0" fmla="*/ 0 h 1415302"/>
+                  <a:gd name="connsiteX1" fmla="*/ 660416 w 660416"/>
+                  <a:gd name="connsiteY1" fmla="*/ 0 h 1415302"/>
+                  <a:gd name="connsiteX2" fmla="*/ 638329 w 660416"/>
+                  <a:gd name="connsiteY2" fmla="*/ 1415302 h 1415302"/>
+                  <a:gd name="connsiteX3" fmla="*/ 0 w 660416"/>
+                  <a:gd name="connsiteY3" fmla="*/ 1415302 h 1415302"/>
+                  <a:gd name="connsiteX4" fmla="*/ 0 w 660416"/>
+                  <a:gd name="connsiteY4" fmla="*/ 0 h 1415302"/>
+                  <a:gd name="connsiteX0" fmla="*/ 0 w 660416"/>
+                  <a:gd name="connsiteY0" fmla="*/ 0 h 1415302"/>
+                  <a:gd name="connsiteX1" fmla="*/ 660416 w 660416"/>
+                  <a:gd name="connsiteY1" fmla="*/ 0 h 1415302"/>
+                  <a:gd name="connsiteX2" fmla="*/ 660416 w 660416"/>
+                  <a:gd name="connsiteY2" fmla="*/ 1415302 h 1415302"/>
+                  <a:gd name="connsiteX3" fmla="*/ 0 w 660416"/>
+                  <a:gd name="connsiteY3" fmla="*/ 1415302 h 1415302"/>
+                  <a:gd name="connsiteX4" fmla="*/ 0 w 660416"/>
+                  <a:gd name="connsiteY4" fmla="*/ 0 h 1415302"/>
+                  <a:gd name="connsiteX0" fmla="*/ 33131 w 660416"/>
+                  <a:gd name="connsiteY0" fmla="*/ 0 h 1415302"/>
+                  <a:gd name="connsiteX1" fmla="*/ 660416 w 660416"/>
+                  <a:gd name="connsiteY1" fmla="*/ 0 h 1415302"/>
+                  <a:gd name="connsiteX2" fmla="*/ 660416 w 660416"/>
+                  <a:gd name="connsiteY2" fmla="*/ 1415302 h 1415302"/>
+                  <a:gd name="connsiteX3" fmla="*/ 0 w 660416"/>
+                  <a:gd name="connsiteY3" fmla="*/ 1415302 h 1415302"/>
+                  <a:gd name="connsiteX4" fmla="*/ 33131 w 660416"/>
+                  <a:gd name="connsiteY4" fmla="*/ 0 h 1415302"/>
+                  <a:gd name="connsiteX0" fmla="*/ 11044 w 638329"/>
+                  <a:gd name="connsiteY0" fmla="*/ 0 h 1415302"/>
+                  <a:gd name="connsiteX1" fmla="*/ 638329 w 638329"/>
+                  <a:gd name="connsiteY1" fmla="*/ 0 h 1415302"/>
+                  <a:gd name="connsiteX2" fmla="*/ 638329 w 638329"/>
+                  <a:gd name="connsiteY2" fmla="*/ 1415302 h 1415302"/>
+                  <a:gd name="connsiteX3" fmla="*/ 0 w 638329"/>
+                  <a:gd name="connsiteY3" fmla="*/ 1415302 h 1415302"/>
+                  <a:gd name="connsiteX4" fmla="*/ 11044 w 638329"/>
+                  <a:gd name="connsiteY4" fmla="*/ 0 h 1415302"/>
+                </a:gdLst>
+                <a:ahLst/>
+                <a:cxnLst>
+                  <a:cxn ang="0">
+                    <a:pos x="connsiteX0" y="connsiteY0"/>
+                  </a:cxn>
+                  <a:cxn ang="0">
+                    <a:pos x="connsiteX1" y="connsiteY1"/>
+                  </a:cxn>
+                  <a:cxn ang="0">
+                    <a:pos x="connsiteX2" y="connsiteY2"/>
+                  </a:cxn>
+                  <a:cxn ang="0">
+                    <a:pos x="connsiteX3" y="connsiteY3"/>
+                  </a:cxn>
+                  <a:cxn ang="0">
+                    <a:pos x="connsiteX4" y="connsiteY4"/>
+                  </a:cxn>
+                </a:cxnLst>
+                <a:rect l="l" t="t" r="r" b="b"/>
+                <a:pathLst>
+                  <a:path w="638329" h="1415302">
+                    <a:moveTo>
+                      <a:pt x="11044" y="0"/>
+                    </a:moveTo>
+                    <a:lnTo>
+                      <a:pt x="638329" y="0"/>
+                    </a:lnTo>
+                    <a:lnTo>
+                      <a:pt x="638329" y="1415302"/>
+                    </a:lnTo>
+                    <a:lnTo>
+                      <a:pt x="0" y="1415302"/>
+                    </a:lnTo>
+                    <a:cubicBezTo>
+                      <a:pt x="3681" y="943535"/>
+                      <a:pt x="7363" y="471767"/>
+                      <a:pt x="11044" y="0"/>
+                    </a:cubicBezTo>
+                    <a:close/>
+                  </a:path>
+                </a:pathLst>
+              </a:custGeom>
+              <a:solidFill>
+                <a:schemeClr val="tx1"/>
+              </a:solidFill>
+              <a:ln>
+                <a:solidFill>
+                  <a:schemeClr val="tx1"/>
+                </a:solidFill>
+              </a:ln>
+            </p:spPr>
+            <p:style>
+              <a:lnRef idx="1">
+                <a:schemeClr val="accent1"/>
+              </a:lnRef>
+              <a:fillRef idx="3">
+                <a:schemeClr val="accent1"/>
+              </a:fillRef>
+              <a:effectRef idx="2">
+                <a:schemeClr val="accent1"/>
+              </a:effectRef>
+              <a:fontRef idx="minor">
+                <a:schemeClr val="lt1"/>
+              </a:fontRef>
+            </p:style>
+            <p:txBody>
+              <a:bodyPr rtlCol="0" anchor="ctr"/>
+              <a:lstStyle/>
+              <a:p>
+                <a:pPr algn="ctr"/>
+                <a:endParaRPr lang="en-US"/>
+              </a:p>
+            </p:txBody>
+          </p:sp>
+          <p:sp>
+            <p:nvSpPr>
+              <p:cNvPr id="46" name="Rectangle 45"/>
+              <p:cNvSpPr/>
+              <p:nvPr/>
+            </p:nvSpPr>
+            <p:spPr>
+              <a:xfrm rot="16200000">
+                <a:off x="4105094" y="3523109"/>
+                <a:ext cx="638329" cy="1566410"/>
+              </a:xfrm>
+              <a:prstGeom prst="rect">
+                <a:avLst/>
+              </a:prstGeom>
+              <a:solidFill>
+                <a:schemeClr val="tx1"/>
+              </a:solidFill>
+              <a:ln>
+                <a:solidFill>
+                  <a:schemeClr val="tx1"/>
+                </a:solidFill>
+              </a:ln>
+            </p:spPr>
+            <p:style>
+              <a:lnRef idx="1">
+                <a:schemeClr val="accent1"/>
+              </a:lnRef>
+              <a:fillRef idx="3">
+                <a:schemeClr val="accent1"/>
+              </a:fillRef>
+              <a:effectRef idx="2">
+                <a:schemeClr val="accent1"/>
+              </a:effectRef>
+              <a:fontRef idx="minor">
+                <a:schemeClr val="lt1"/>
+              </a:fontRef>
+            </p:style>
+            <p:txBody>
+              <a:bodyPr rtlCol="0" anchor="ctr"/>
+              <a:lstStyle/>
+              <a:p>
+                <a:pPr algn="ctr"/>
+                <a:endParaRPr lang="en-US"/>
+              </a:p>
+            </p:txBody>
+          </p:sp>
+          <p:sp>
+            <p:nvSpPr>
+              <p:cNvPr id="47" name="Chord 46"/>
+              <p:cNvSpPr/>
+              <p:nvPr/>
+            </p:nvSpPr>
+            <p:spPr>
+              <a:xfrm rot="17502090">
+                <a:off x="4094595" y="4271800"/>
+                <a:ext cx="477707" cy="607391"/>
+              </a:xfrm>
+              <a:prstGeom prst="chord">
+                <a:avLst/>
+              </a:prstGeom>
+              <a:solidFill>
+                <a:schemeClr val="tx1"/>
+              </a:solidFill>
+              <a:ln>
+                <a:solidFill>
+                  <a:schemeClr val="tx1"/>
+                </a:solidFill>
+              </a:ln>
+            </p:spPr>
+            <p:style>
+              <a:lnRef idx="1">
+                <a:schemeClr val="accent1"/>
+              </a:lnRef>
+              <a:fillRef idx="3">
+                <a:schemeClr val="accent1"/>
+              </a:fillRef>
+              <a:effectRef idx="2">
+                <a:schemeClr val="accent1"/>
+              </a:effectRef>
+              <a:fontRef idx="minor">
+                <a:schemeClr val="lt1"/>
+              </a:fontRef>
+            </p:style>
+            <p:txBody>
+              <a:bodyPr rtlCol="0" anchor="ctr"/>
+              <a:lstStyle/>
+              <a:p>
+                <a:pPr algn="ctr"/>
+                <a:endParaRPr lang="en-US"/>
+              </a:p>
+            </p:txBody>
+          </p:sp>
+          <p:grpSp>
+            <p:nvGrpSpPr>
+              <p:cNvPr id="52" name="Group 51"/>
+              <p:cNvGrpSpPr/>
+              <p:nvPr/>
+            </p:nvGrpSpPr>
+            <p:grpSpPr>
+              <a:xfrm rot="13738101">
+                <a:off x="5047155" y="1896561"/>
+                <a:ext cx="1113455" cy="1272729"/>
+                <a:chOff x="5193424" y="2389704"/>
+                <a:chExt cx="1113455" cy="1272729"/>
+              </a:xfrm>
+            </p:grpSpPr>
+            <p:sp>
+              <p:nvSpPr>
+                <p:cNvPr id="50" name="Rounded Rectangle 49"/>
+                <p:cNvSpPr/>
+                <p:nvPr/>
+              </p:nvSpPr>
+              <p:spPr>
+                <a:xfrm rot="2391216">
+                  <a:off x="5575051" y="2389704"/>
+                  <a:ext cx="413579" cy="1069684"/>
+                </a:xfrm>
+                <a:prstGeom prst="roundRect">
+                  <a:avLst/>
+                </a:prstGeom>
+                <a:solidFill>
+                  <a:srgbClr val="3366FF"/>
+                </a:solidFill>
+                <a:ln>
+                  <a:noFill/>
+                </a:ln>
+                <a:effectLst/>
+              </p:spPr>
+              <p:style>
+                <a:lnRef idx="1">
+                  <a:schemeClr val="accent1"/>
+                </a:lnRef>
+                <a:fillRef idx="3">
+                  <a:schemeClr val="accent1"/>
+                </a:fillRef>
+                <a:effectRef idx="2">
+                  <a:schemeClr val="accent1"/>
+                </a:effectRef>
+                <a:fontRef idx="minor">
+                  <a:schemeClr val="lt1"/>
+                </a:fontRef>
+              </p:style>
+              <p:txBody>
+                <a:bodyPr rtlCol="0" anchor="ctr"/>
+                <a:lstStyle/>
+                <a:p>
+                  <a:pPr algn="ctr"/>
+                  <a:endParaRPr lang="en-US">
+                    <a:solidFill>
+                      <a:srgbClr val="FAC090"/>
+                    </a:solidFill>
+                  </a:endParaRPr>
+                </a:p>
+              </p:txBody>
+            </p:sp>
+            <p:sp>
+              <p:nvSpPr>
+                <p:cNvPr id="51" name="Rounded Rectangle 50"/>
+                <p:cNvSpPr/>
+                <p:nvPr/>
+              </p:nvSpPr>
+              <p:spPr>
+                <a:xfrm rot="18196753">
+                  <a:off x="5543362" y="2898916"/>
+                  <a:ext cx="413579" cy="1113455"/>
+                </a:xfrm>
+                <a:custGeom>
+                  <a:avLst/>
+                  <a:gdLst>
+                    <a:gd name="connsiteX0" fmla="*/ 0 w 413579"/>
+                    <a:gd name="connsiteY0" fmla="*/ 68931 h 1069684"/>
+                    <a:gd name="connsiteX1" fmla="*/ 68931 w 413579"/>
+                    <a:gd name="connsiteY1" fmla="*/ 0 h 1069684"/>
+                    <a:gd name="connsiteX2" fmla="*/ 344648 w 413579"/>
+                    <a:gd name="connsiteY2" fmla="*/ 0 h 1069684"/>
+                    <a:gd name="connsiteX3" fmla="*/ 413579 w 413579"/>
+                    <a:gd name="connsiteY3" fmla="*/ 68931 h 1069684"/>
+                    <a:gd name="connsiteX4" fmla="*/ 413579 w 413579"/>
+                    <a:gd name="connsiteY4" fmla="*/ 1000753 h 1069684"/>
+                    <a:gd name="connsiteX5" fmla="*/ 344648 w 413579"/>
+                    <a:gd name="connsiteY5" fmla="*/ 1069684 h 1069684"/>
+                    <a:gd name="connsiteX6" fmla="*/ 68931 w 413579"/>
+                    <a:gd name="connsiteY6" fmla="*/ 1069684 h 1069684"/>
+                    <a:gd name="connsiteX7" fmla="*/ 0 w 413579"/>
+                    <a:gd name="connsiteY7" fmla="*/ 1000753 h 1069684"/>
+                    <a:gd name="connsiteX8" fmla="*/ 0 w 413579"/>
+                    <a:gd name="connsiteY8" fmla="*/ 68931 h 1069684"/>
+                    <a:gd name="connsiteX0" fmla="*/ 0 w 413579"/>
+                    <a:gd name="connsiteY0" fmla="*/ 112702 h 1113455"/>
+                    <a:gd name="connsiteX1" fmla="*/ 74890 w 413579"/>
+                    <a:gd name="connsiteY1" fmla="*/ 0 h 1113455"/>
+                    <a:gd name="connsiteX2" fmla="*/ 344648 w 413579"/>
+                    <a:gd name="connsiteY2" fmla="*/ 43771 h 1113455"/>
+                    <a:gd name="connsiteX3" fmla="*/ 413579 w 413579"/>
+                    <a:gd name="connsiteY3" fmla="*/ 112702 h 1113455"/>
+                    <a:gd name="connsiteX4" fmla="*/ 413579 w 413579"/>
+                    <a:gd name="connsiteY4" fmla="*/ 1044524 h 1113455"/>
+                    <a:gd name="connsiteX5" fmla="*/ 344648 w 413579"/>
+                    <a:gd name="connsiteY5" fmla="*/ 1113455 h 1113455"/>
+                    <a:gd name="connsiteX6" fmla="*/ 68931 w 413579"/>
+                    <a:gd name="connsiteY6" fmla="*/ 1113455 h 1113455"/>
+                    <a:gd name="connsiteX7" fmla="*/ 0 w 413579"/>
+                    <a:gd name="connsiteY7" fmla="*/ 1044524 h 1113455"/>
+                    <a:gd name="connsiteX8" fmla="*/ 0 w 413579"/>
+                    <a:gd name="connsiteY8" fmla="*/ 112702 h 1113455"/>
+                  </a:gdLst>
+                  <a:ahLst/>
+                  <a:cxnLst>
+                    <a:cxn ang="0">
+                      <a:pos x="connsiteX0" y="connsiteY0"/>
+                    </a:cxn>
+                    <a:cxn ang="0">
+                      <a:pos x="connsiteX1" y="connsiteY1"/>
+                    </a:cxn>
+                    <a:cxn ang="0">
+                      <a:pos x="connsiteX2" y="connsiteY2"/>
+                    </a:cxn>
+                    <a:cxn ang="0">
+                      <a:pos x="connsiteX3" y="connsiteY3"/>
+                    </a:cxn>
+                    <a:cxn ang="0">
+                      <a:pos x="connsiteX4" y="connsiteY4"/>
+                    </a:cxn>
+                    <a:cxn ang="0">
+                      <a:pos x="connsiteX5" y="connsiteY5"/>
+                    </a:cxn>
+                    <a:cxn ang="0">
+                      <a:pos x="connsiteX6" y="connsiteY6"/>
+                    </a:cxn>
+                    <a:cxn ang="0">
+                      <a:pos x="connsiteX7" y="connsiteY7"/>
+                    </a:cxn>
+                    <a:cxn ang="0">
+                      <a:pos x="connsiteX8" y="connsiteY8"/>
+                    </a:cxn>
+                  </a:cxnLst>
+                  <a:rect l="l" t="t" r="r" b="b"/>
+                  <a:pathLst>
+                    <a:path w="413579" h="1113455">
+                      <a:moveTo>
+                        <a:pt x="0" y="112702"/>
+                      </a:moveTo>
+                      <a:cubicBezTo>
+                        <a:pt x="0" y="74632"/>
+                        <a:pt x="36820" y="0"/>
+                        <a:pt x="74890" y="0"/>
+                      </a:cubicBezTo>
+                      <a:cubicBezTo>
+                        <a:pt x="166796" y="0"/>
+                        <a:pt x="252742" y="43771"/>
+                        <a:pt x="344648" y="43771"/>
+                      </a:cubicBezTo>
+                      <a:cubicBezTo>
+                        <a:pt x="382718" y="43771"/>
+                        <a:pt x="413579" y="74632"/>
+                        <a:pt x="413579" y="112702"/>
+                      </a:cubicBezTo>
+                      <a:lnTo>
+                        <a:pt x="413579" y="1044524"/>
+                      </a:lnTo>
+                      <a:cubicBezTo>
+                        <a:pt x="413579" y="1082594"/>
+                        <a:pt x="382718" y="1113455"/>
+                        <a:pt x="344648" y="1113455"/>
+                      </a:cubicBezTo>
+                      <a:lnTo>
+                        <a:pt x="68931" y="1113455"/>
+                      </a:lnTo>
+                      <a:cubicBezTo>
+                        <a:pt x="30861" y="1113455"/>
+                        <a:pt x="0" y="1082594"/>
+                        <a:pt x="0" y="1044524"/>
+                      </a:cubicBezTo>
+                      <a:lnTo>
+                        <a:pt x="0" y="112702"/>
+                      </a:lnTo>
+                      <a:close/>
+                    </a:path>
+                  </a:pathLst>
+                </a:custGeom>
+                <a:solidFill>
+                  <a:srgbClr val="3366FF"/>
+                </a:solidFill>
+                <a:ln>
+                  <a:noFill/>
+                </a:ln>
+                <a:effectLst>
+                  <a:innerShdw blurRad="63500" dist="50800" dir="8100000">
+                    <a:prstClr val="black">
+                      <a:alpha val="50000"/>
+                    </a:prstClr>
+                  </a:innerShdw>
+                </a:effectLst>
+              </p:spPr>
+              <p:style>
+                <a:lnRef idx="1">
+                  <a:schemeClr val="accent1"/>
+                </a:lnRef>
+                <a:fillRef idx="3">
+                  <a:schemeClr val="accent1"/>
+                </a:fillRef>
+                <a:effectRef idx="2">
+                  <a:schemeClr val="accent1"/>
+                </a:effectRef>
+                <a:fontRef idx="minor">
+                  <a:schemeClr val="lt1"/>
+                </a:fontRef>
+              </p:style>
+              <p:txBody>
+                <a:bodyPr rtlCol="0" anchor="ctr"/>
+                <a:lstStyle/>
+                <a:p>
+                  <a:pPr algn="ctr"/>
+                  <a:endParaRPr lang="en-US">
+                    <a:solidFill>
+                      <a:srgbClr val="FAC090"/>
+                    </a:solidFill>
+                  </a:endParaRPr>
+                </a:p>
+              </p:txBody>
+            </p:sp>
+          </p:grpSp>
         </p:grpSp>
+        <p:sp>
+          <p:nvSpPr>
+            <p:cNvPr id="54" name="Oval Callout 53"/>
+            <p:cNvSpPr/>
+            <p:nvPr/>
+          </p:nvSpPr>
+          <p:spPr>
+            <a:xfrm>
+              <a:off x="4874898" y="238037"/>
+              <a:ext cx="1530256" cy="1472381"/>
+            </a:xfrm>
+            <a:custGeom>
+              <a:avLst/>
+              <a:gdLst>
+                <a:gd name="connsiteX0" fmla="*/ 424687 w 1456053"/>
+                <a:gd name="connsiteY0" fmla="*/ 1140510 h 1013787"/>
+                <a:gd name="connsiteX1" fmla="*/ 370252 w 1456053"/>
+                <a:gd name="connsiteY1" fmla="*/ 948355 h 1013787"/>
+                <a:gd name="connsiteX2" fmla="*/ 185463 w 1456053"/>
+                <a:gd name="connsiteY2" fmla="*/ 168905 h 1013787"/>
+                <a:gd name="connsiteX3" fmla="*/ 951165 w 1456053"/>
+                <a:gd name="connsiteY3" fmla="*/ 24395 h 1013787"/>
+                <a:gd name="connsiteX4" fmla="*/ 1389725 w 1456053"/>
+                <a:gd name="connsiteY4" fmla="*/ 718285 h 1013787"/>
+                <a:gd name="connsiteX5" fmla="*/ 633824 w 1456053"/>
+                <a:gd name="connsiteY5" fmla="*/ 1009526 h 1013787"/>
+                <a:gd name="connsiteX6" fmla="*/ 424687 w 1456053"/>
+                <a:gd name="connsiteY6" fmla="*/ 1140510 h 1013787"/>
+                <a:gd name="connsiteX0" fmla="*/ 71392 w 1456442"/>
+                <a:gd name="connsiteY0" fmla="*/ 1162617 h 1162617"/>
+                <a:gd name="connsiteX1" fmla="*/ 370348 w 1456442"/>
+                <a:gd name="connsiteY1" fmla="*/ 948375 h 1162617"/>
+                <a:gd name="connsiteX2" fmla="*/ 185559 w 1456442"/>
+                <a:gd name="connsiteY2" fmla="*/ 168925 h 1162617"/>
+                <a:gd name="connsiteX3" fmla="*/ 951261 w 1456442"/>
+                <a:gd name="connsiteY3" fmla="*/ 24415 h 1162617"/>
+                <a:gd name="connsiteX4" fmla="*/ 1389821 w 1456442"/>
+                <a:gd name="connsiteY4" fmla="*/ 718305 h 1162617"/>
+                <a:gd name="connsiteX5" fmla="*/ 633920 w 1456442"/>
+                <a:gd name="connsiteY5" fmla="*/ 1009546 h 1162617"/>
+                <a:gd name="connsiteX6" fmla="*/ 71392 w 1456442"/>
+                <a:gd name="connsiteY6" fmla="*/ 1162617 h 1162617"/>
+                <a:gd name="connsiteX0" fmla="*/ 712 w 1361005"/>
+                <a:gd name="connsiteY0" fmla="*/ 1230850 h 1230850"/>
+                <a:gd name="connsiteX1" fmla="*/ 299668 w 1361005"/>
+                <a:gd name="connsiteY1" fmla="*/ 1016608 h 1230850"/>
+                <a:gd name="connsiteX2" fmla="*/ 357835 w 1361005"/>
+                <a:gd name="connsiteY2" fmla="*/ 104636 h 1230850"/>
+                <a:gd name="connsiteX3" fmla="*/ 880581 w 1361005"/>
+                <a:gd name="connsiteY3" fmla="*/ 92648 h 1230850"/>
+                <a:gd name="connsiteX4" fmla="*/ 1319141 w 1361005"/>
+                <a:gd name="connsiteY4" fmla="*/ 786538 h 1230850"/>
+                <a:gd name="connsiteX5" fmla="*/ 563240 w 1361005"/>
+                <a:gd name="connsiteY5" fmla="*/ 1077779 h 1230850"/>
+                <a:gd name="connsiteX6" fmla="*/ 712 w 1361005"/>
+                <a:gd name="connsiteY6" fmla="*/ 1230850 h 1230850"/>
+                <a:gd name="connsiteX0" fmla="*/ 712 w 1411059"/>
+                <a:gd name="connsiteY0" fmla="*/ 1297399 h 1297399"/>
+                <a:gd name="connsiteX1" fmla="*/ 299668 w 1411059"/>
+                <a:gd name="connsiteY1" fmla="*/ 1083157 h 1297399"/>
+                <a:gd name="connsiteX2" fmla="*/ 357835 w 1411059"/>
+                <a:gd name="connsiteY2" fmla="*/ 171185 h 1297399"/>
+                <a:gd name="connsiteX3" fmla="*/ 1222929 w 1411059"/>
+                <a:gd name="connsiteY3" fmla="*/ 59806 h 1297399"/>
+                <a:gd name="connsiteX4" fmla="*/ 1319141 w 1411059"/>
+                <a:gd name="connsiteY4" fmla="*/ 853087 h 1297399"/>
+                <a:gd name="connsiteX5" fmla="*/ 563240 w 1411059"/>
+                <a:gd name="connsiteY5" fmla="*/ 1144328 h 1297399"/>
+                <a:gd name="connsiteX6" fmla="*/ 712 w 1411059"/>
+                <a:gd name="connsiteY6" fmla="*/ 1297399 h 1297399"/>
+                <a:gd name="connsiteX0" fmla="*/ 712 w 1460307"/>
+                <a:gd name="connsiteY0" fmla="*/ 1437130 h 1437130"/>
+                <a:gd name="connsiteX1" fmla="*/ 299668 w 1460307"/>
+                <a:gd name="connsiteY1" fmla="*/ 1222888 h 1437130"/>
+                <a:gd name="connsiteX2" fmla="*/ 357835 w 1460307"/>
+                <a:gd name="connsiteY2" fmla="*/ 310916 h 1437130"/>
+                <a:gd name="connsiteX3" fmla="*/ 1344408 w 1460307"/>
+                <a:gd name="connsiteY3" fmla="*/ 33885 h 1437130"/>
+                <a:gd name="connsiteX4" fmla="*/ 1319141 w 1460307"/>
+                <a:gd name="connsiteY4" fmla="*/ 992818 h 1437130"/>
+                <a:gd name="connsiteX5" fmla="*/ 563240 w 1460307"/>
+                <a:gd name="connsiteY5" fmla="*/ 1284059 h 1437130"/>
+                <a:gd name="connsiteX6" fmla="*/ 712 w 1460307"/>
+                <a:gd name="connsiteY6" fmla="*/ 1437130 h 1437130"/>
+                <a:gd name="connsiteX0" fmla="*/ 712 w 1461025"/>
+                <a:gd name="connsiteY0" fmla="*/ 1474013 h 1474013"/>
+                <a:gd name="connsiteX1" fmla="*/ 299668 w 1461025"/>
+                <a:gd name="connsiteY1" fmla="*/ 1259771 h 1474013"/>
+                <a:gd name="connsiteX2" fmla="*/ 346792 w 1461025"/>
+                <a:gd name="connsiteY2" fmla="*/ 204234 h 1474013"/>
+                <a:gd name="connsiteX3" fmla="*/ 1344408 w 1461025"/>
+                <a:gd name="connsiteY3" fmla="*/ 70768 h 1474013"/>
+                <a:gd name="connsiteX4" fmla="*/ 1319141 w 1461025"/>
+                <a:gd name="connsiteY4" fmla="*/ 1029701 h 1474013"/>
+                <a:gd name="connsiteX5" fmla="*/ 563240 w 1461025"/>
+                <a:gd name="connsiteY5" fmla="*/ 1320942 h 1474013"/>
+                <a:gd name="connsiteX6" fmla="*/ 712 w 1461025"/>
+                <a:gd name="connsiteY6" fmla="*/ 1474013 h 1474013"/>
+                <a:gd name="connsiteX0" fmla="*/ 712 w 1530256"/>
+                <a:gd name="connsiteY0" fmla="*/ 1472381 h 1472381"/>
+                <a:gd name="connsiteX1" fmla="*/ 299668 w 1530256"/>
+                <a:gd name="connsiteY1" fmla="*/ 1258139 h 1472381"/>
+                <a:gd name="connsiteX2" fmla="*/ 346792 w 1530256"/>
+                <a:gd name="connsiteY2" fmla="*/ 202602 h 1472381"/>
+                <a:gd name="connsiteX3" fmla="*/ 1344408 w 1530256"/>
+                <a:gd name="connsiteY3" fmla="*/ 69136 h 1472381"/>
+                <a:gd name="connsiteX4" fmla="*/ 1429576 w 1530256"/>
+                <a:gd name="connsiteY4" fmla="*/ 1005982 h 1472381"/>
+                <a:gd name="connsiteX5" fmla="*/ 563240 w 1530256"/>
+                <a:gd name="connsiteY5" fmla="*/ 1319310 h 1472381"/>
+                <a:gd name="connsiteX6" fmla="*/ 712 w 1530256"/>
+                <a:gd name="connsiteY6" fmla="*/ 1472381 h 1472381"/>
+              </a:gdLst>
+              <a:ahLst/>
+              <a:cxnLst>
+                <a:cxn ang="0">
+                  <a:pos x="connsiteX0" y="connsiteY0"/>
+                </a:cxn>
+                <a:cxn ang="0">
+                  <a:pos x="connsiteX1" y="connsiteY1"/>
+                </a:cxn>
+                <a:cxn ang="0">
+                  <a:pos x="connsiteX2" y="connsiteY2"/>
+                </a:cxn>
+                <a:cxn ang="0">
+                  <a:pos x="connsiteX3" y="connsiteY3"/>
+                </a:cxn>
+                <a:cxn ang="0">
+                  <a:pos x="connsiteX4" y="connsiteY4"/>
+                </a:cxn>
+                <a:cxn ang="0">
+                  <a:pos x="connsiteX5" y="connsiteY5"/>
+                </a:cxn>
+                <a:cxn ang="0">
+                  <a:pos x="connsiteX6" y="connsiteY6"/>
+                </a:cxn>
+              </a:cxnLst>
+              <a:rect l="l" t="t" r="r" b="b"/>
+              <a:pathLst>
+                <a:path w="1530256" h="1472381">
+                  <a:moveTo>
+                    <a:pt x="712" y="1472381"/>
+                  </a:moveTo>
+                  <a:cubicBezTo>
+                    <a:pt x="-17433" y="1408329"/>
+                    <a:pt x="317813" y="1322191"/>
+                    <a:pt x="299668" y="1258139"/>
+                  </a:cubicBezTo>
+                  <a:cubicBezTo>
+                    <a:pt x="-105310" y="1099033"/>
+                    <a:pt x="172669" y="400769"/>
+                    <a:pt x="346792" y="202602"/>
+                  </a:cubicBezTo>
+                  <a:cubicBezTo>
+                    <a:pt x="520915" y="4435"/>
+                    <a:pt x="1163944" y="-64761"/>
+                    <a:pt x="1344408" y="69136"/>
+                  </a:cubicBezTo>
+                  <a:cubicBezTo>
+                    <a:pt x="1524872" y="203033"/>
+                    <a:pt x="1611505" y="729915"/>
+                    <a:pt x="1429576" y="1005982"/>
+                  </a:cubicBezTo>
+                  <a:cubicBezTo>
+                    <a:pt x="1296505" y="1207910"/>
+                    <a:pt x="879648" y="1348058"/>
+                    <a:pt x="563240" y="1319310"/>
+                  </a:cubicBezTo>
+                  <a:lnTo>
+                    <a:pt x="712" y="1472381"/>
+                  </a:lnTo>
+                  <a:close/>
+                </a:path>
+              </a:pathLst>
+            </a:custGeom>
+            <a:solidFill>
+              <a:schemeClr val="tx2">
+                <a:lumMod val="20000"/>
+                <a:lumOff val="80000"/>
+              </a:schemeClr>
+            </a:solidFill>
+            <a:ln>
+              <a:noFill/>
+            </a:ln>
+          </p:spPr>
+          <p:style>
+            <a:lnRef idx="1">
+              <a:schemeClr val="accent1"/>
+            </a:lnRef>
+            <a:fillRef idx="3">
+              <a:schemeClr val="accent1"/>
+            </a:fillRef>
+            <a:effectRef idx="2">
+              <a:schemeClr val="accent1"/>
+            </a:effectRef>
+            <a:fontRef idx="minor">
+              <a:schemeClr val="lt1"/>
+            </a:fontRef>
+          </p:style>
+          <p:txBody>
+            <a:bodyPr rtlCol="0" anchor="ctr"/>
+            <a:lstStyle/>
+            <a:p>
+              <a:pPr algn="ctr"/>
+              <a:endParaRPr lang="en-US"/>
+            </a:p>
+          </p:txBody>
+        </p:sp>
+        <p:sp>
+          <p:nvSpPr>
+            <p:cNvPr id="55" name="TextBox 54"/>
+            <p:cNvSpPr txBox="1"/>
+            <p:nvPr/>
+          </p:nvSpPr>
+          <p:spPr>
+            <a:xfrm>
+              <a:off x="5223408" y="571355"/>
+              <a:ext cx="1181746" cy="646331"/>
+            </a:xfrm>
+            <a:prstGeom prst="rect">
+              <a:avLst/>
+            </a:prstGeom>
+            <a:noFill/>
+          </p:spPr>
+          <p:txBody>
+            <a:bodyPr wrap="square" rtlCol="0">
+              <a:spAutoFit/>
+            </a:bodyPr>
+            <a:lstStyle/>
+            <a:p>
+              <a:pPr algn="ctr"/>
+              <a:r>
+                <a:rPr lang="en-US" dirty="0" smtClean="0">
+                  <a:latin typeface="Avenir Black"/>
+                  <a:cs typeface="Avenir Black"/>
+                </a:rPr>
+                <a:t>Find my organs!</a:t>
+              </a:r>
+              <a:endParaRPr lang="en-US" dirty="0">
+                <a:latin typeface="Avenir Black"/>
+                <a:cs typeface="Avenir Black"/>
+              </a:endParaRPr>
+            </a:p>
+          </p:txBody>
+        </p:sp>
       </p:grpSp>
-      <p:sp>
-        <p:nvSpPr>
-          <p:cNvPr id="54" name="Oval Callout 53"/>
-          <p:cNvSpPr/>
-          <p:nvPr/>
-        </p:nvSpPr>
-        <p:spPr>
-          <a:xfrm>
-            <a:off x="4874898" y="238037"/>
-            <a:ext cx="1530256" cy="1472381"/>
-          </a:xfrm>
-          <a:custGeom>
-            <a:avLst/>
-            <a:gdLst>
-              <a:gd name="connsiteX0" fmla="*/ 424687 w 1456053"/>
-              <a:gd name="connsiteY0" fmla="*/ 1140510 h 1013787"/>
-              <a:gd name="connsiteX1" fmla="*/ 370252 w 1456053"/>
-              <a:gd name="connsiteY1" fmla="*/ 948355 h 1013787"/>
-              <a:gd name="connsiteX2" fmla="*/ 185463 w 1456053"/>
-              <a:gd name="connsiteY2" fmla="*/ 168905 h 1013787"/>
-              <a:gd name="connsiteX3" fmla="*/ 951165 w 1456053"/>
-              <a:gd name="connsiteY3" fmla="*/ 24395 h 1013787"/>
-              <a:gd name="connsiteX4" fmla="*/ 1389725 w 1456053"/>
-              <a:gd name="connsiteY4" fmla="*/ 718285 h 1013787"/>
-              <a:gd name="connsiteX5" fmla="*/ 633824 w 1456053"/>
-              <a:gd name="connsiteY5" fmla="*/ 1009526 h 1013787"/>
-              <a:gd name="connsiteX6" fmla="*/ 424687 w 1456053"/>
-              <a:gd name="connsiteY6" fmla="*/ 1140510 h 1013787"/>
-              <a:gd name="connsiteX0" fmla="*/ 71392 w 1456442"/>
-              <a:gd name="connsiteY0" fmla="*/ 1162617 h 1162617"/>
-              <a:gd name="connsiteX1" fmla="*/ 370348 w 1456442"/>
-              <a:gd name="connsiteY1" fmla="*/ 948375 h 1162617"/>
-              <a:gd name="connsiteX2" fmla="*/ 185559 w 1456442"/>
-              <a:gd name="connsiteY2" fmla="*/ 168925 h 1162617"/>
-              <a:gd name="connsiteX3" fmla="*/ 951261 w 1456442"/>
-              <a:gd name="connsiteY3" fmla="*/ 24415 h 1162617"/>
-              <a:gd name="connsiteX4" fmla="*/ 1389821 w 1456442"/>
-              <a:gd name="connsiteY4" fmla="*/ 718305 h 1162617"/>
-              <a:gd name="connsiteX5" fmla="*/ 633920 w 1456442"/>
-              <a:gd name="connsiteY5" fmla="*/ 1009546 h 1162617"/>
-              <a:gd name="connsiteX6" fmla="*/ 71392 w 1456442"/>
-              <a:gd name="connsiteY6" fmla="*/ 1162617 h 1162617"/>
-              <a:gd name="connsiteX0" fmla="*/ 712 w 1361005"/>
-              <a:gd name="connsiteY0" fmla="*/ 1230850 h 1230850"/>
-              <a:gd name="connsiteX1" fmla="*/ 299668 w 1361005"/>
-              <a:gd name="connsiteY1" fmla="*/ 1016608 h 1230850"/>
-              <a:gd name="connsiteX2" fmla="*/ 357835 w 1361005"/>
-              <a:gd name="connsiteY2" fmla="*/ 104636 h 1230850"/>
-              <a:gd name="connsiteX3" fmla="*/ 880581 w 1361005"/>
-              <a:gd name="connsiteY3" fmla="*/ 92648 h 1230850"/>
-              <a:gd name="connsiteX4" fmla="*/ 1319141 w 1361005"/>
-              <a:gd name="connsiteY4" fmla="*/ 786538 h 1230850"/>
-              <a:gd name="connsiteX5" fmla="*/ 563240 w 1361005"/>
-              <a:gd name="connsiteY5" fmla="*/ 1077779 h 1230850"/>
-              <a:gd name="connsiteX6" fmla="*/ 712 w 1361005"/>
-              <a:gd name="connsiteY6" fmla="*/ 1230850 h 1230850"/>
-              <a:gd name="connsiteX0" fmla="*/ 712 w 1411059"/>
-              <a:gd name="connsiteY0" fmla="*/ 1297399 h 1297399"/>
-              <a:gd name="connsiteX1" fmla="*/ 299668 w 1411059"/>
-              <a:gd name="connsiteY1" fmla="*/ 1083157 h 1297399"/>
-              <a:gd name="connsiteX2" fmla="*/ 357835 w 1411059"/>
-              <a:gd name="connsiteY2" fmla="*/ 171185 h 1297399"/>
-              <a:gd name="connsiteX3" fmla="*/ 1222929 w 1411059"/>
-              <a:gd name="connsiteY3" fmla="*/ 59806 h 1297399"/>
-              <a:gd name="connsiteX4" fmla="*/ 1319141 w 1411059"/>
-              <a:gd name="connsiteY4" fmla="*/ 853087 h 1297399"/>
-              <a:gd name="connsiteX5" fmla="*/ 563240 w 1411059"/>
-              <a:gd name="connsiteY5" fmla="*/ 1144328 h 1297399"/>
-              <a:gd name="connsiteX6" fmla="*/ 712 w 1411059"/>
-              <a:gd name="connsiteY6" fmla="*/ 1297399 h 1297399"/>
-              <a:gd name="connsiteX0" fmla="*/ 712 w 1460307"/>
-              <a:gd name="connsiteY0" fmla="*/ 1437130 h 1437130"/>
-              <a:gd name="connsiteX1" fmla="*/ 299668 w 1460307"/>
-              <a:gd name="connsiteY1" fmla="*/ 1222888 h 1437130"/>
-              <a:gd name="connsiteX2" fmla="*/ 357835 w 1460307"/>
-              <a:gd name="connsiteY2" fmla="*/ 310916 h 1437130"/>
-              <a:gd name="connsiteX3" fmla="*/ 1344408 w 1460307"/>
-              <a:gd name="connsiteY3" fmla="*/ 33885 h 1437130"/>
-              <a:gd name="connsiteX4" fmla="*/ 1319141 w 1460307"/>
-              <a:gd name="connsiteY4" fmla="*/ 992818 h 1437130"/>
-              <a:gd name="connsiteX5" fmla="*/ 563240 w 1460307"/>
-              <a:gd name="connsiteY5" fmla="*/ 1284059 h 1437130"/>
-              <a:gd name="connsiteX6" fmla="*/ 712 w 1460307"/>
-              <a:gd name="connsiteY6" fmla="*/ 1437130 h 1437130"/>
-              <a:gd name="connsiteX0" fmla="*/ 712 w 1461025"/>
-              <a:gd name="connsiteY0" fmla="*/ 1474013 h 1474013"/>
-              <a:gd name="connsiteX1" fmla="*/ 299668 w 1461025"/>
-              <a:gd name="connsiteY1" fmla="*/ 1259771 h 1474013"/>
-              <a:gd name="connsiteX2" fmla="*/ 346792 w 1461025"/>
-              <a:gd name="connsiteY2" fmla="*/ 204234 h 1474013"/>
-              <a:gd name="connsiteX3" fmla="*/ 1344408 w 1461025"/>
-              <a:gd name="connsiteY3" fmla="*/ 70768 h 1474013"/>
-              <a:gd name="connsiteX4" fmla="*/ 1319141 w 1461025"/>
-              <a:gd name="connsiteY4" fmla="*/ 1029701 h 1474013"/>
-              <a:gd name="connsiteX5" fmla="*/ 563240 w 1461025"/>
-              <a:gd name="connsiteY5" fmla="*/ 1320942 h 1474013"/>
-              <a:gd name="connsiteX6" fmla="*/ 712 w 1461025"/>
-              <a:gd name="connsiteY6" fmla="*/ 1474013 h 1474013"/>
-              <a:gd name="connsiteX0" fmla="*/ 712 w 1530256"/>
-              <a:gd name="connsiteY0" fmla="*/ 1472381 h 1472381"/>
-              <a:gd name="connsiteX1" fmla="*/ 299668 w 1530256"/>
-              <a:gd name="connsiteY1" fmla="*/ 1258139 h 1472381"/>
-              <a:gd name="connsiteX2" fmla="*/ 346792 w 1530256"/>
-              <a:gd name="connsiteY2" fmla="*/ 202602 h 1472381"/>
-              <a:gd name="connsiteX3" fmla="*/ 1344408 w 1530256"/>
-              <a:gd name="connsiteY3" fmla="*/ 69136 h 1472381"/>
-              <a:gd name="connsiteX4" fmla="*/ 1429576 w 1530256"/>
-              <a:gd name="connsiteY4" fmla="*/ 1005982 h 1472381"/>
-              <a:gd name="connsiteX5" fmla="*/ 563240 w 1530256"/>
-              <a:gd name="connsiteY5" fmla="*/ 1319310 h 1472381"/>
-              <a:gd name="connsiteX6" fmla="*/ 712 w 1530256"/>
-              <a:gd name="connsiteY6" fmla="*/ 1472381 h 1472381"/>
-            </a:gdLst>
-            <a:ahLst/>
-            <a:cxnLst>
-              <a:cxn ang="0">
-                <a:pos x="connsiteX0" y="connsiteY0"/>
-              </a:cxn>
-              <a:cxn ang="0">
-                <a:pos x="connsiteX1" y="connsiteY1"/>
-              </a:cxn>
-              <a:cxn ang="0">
-                <a:pos x="connsiteX2" y="connsiteY2"/>
-              </a:cxn>
-              <a:cxn ang="0">
-                <a:pos x="connsiteX3" y="connsiteY3"/>
-              </a:cxn>
-              <a:cxn ang="0">
-                <a:pos x="connsiteX4" y="connsiteY4"/>
-              </a:cxn>
-              <a:cxn ang="0">
-                <a:pos x="connsiteX5" y="connsiteY5"/>
-              </a:cxn>
-              <a:cxn ang="0">
-                <a:pos x="connsiteX6" y="connsiteY6"/>
-              </a:cxn>
-            </a:cxnLst>
-            <a:rect l="l" t="t" r="r" b="b"/>
-            <a:pathLst>
-              <a:path w="1530256" h="1472381">
-                <a:moveTo>
-                  <a:pt x="712" y="1472381"/>
-                </a:moveTo>
-                <a:cubicBezTo>
-                  <a:pt x="-17433" y="1408329"/>
-                  <a:pt x="317813" y="1322191"/>
-                  <a:pt x="299668" y="1258139"/>
-                </a:cubicBezTo>
-                <a:cubicBezTo>
-                  <a:pt x="-105310" y="1099033"/>
-                  <a:pt x="172669" y="400769"/>
-                  <a:pt x="346792" y="202602"/>
-                </a:cubicBezTo>
-                <a:cubicBezTo>
-                  <a:pt x="520915" y="4435"/>
-                  <a:pt x="1163944" y="-64761"/>
-                  <a:pt x="1344408" y="69136"/>
-                </a:cubicBezTo>
-                <a:cubicBezTo>
-                  <a:pt x="1524872" y="203033"/>
-                  <a:pt x="1611505" y="729915"/>
-                  <a:pt x="1429576" y="1005982"/>
-                </a:cubicBezTo>
-                <a:cubicBezTo>
-                  <a:pt x="1296505" y="1207910"/>
-                  <a:pt x="879648" y="1348058"/>
-                  <a:pt x="563240" y="1319310"/>
-                </a:cubicBezTo>
-                <a:lnTo>
-                  <a:pt x="712" y="1472381"/>
-                </a:lnTo>
-                <a:close/>
-              </a:path>
-            </a:pathLst>
-          </a:custGeom>
-          <a:solidFill>
-            <a:schemeClr val="tx2">
-              <a:lumMod val="20000"/>
-              <a:lumOff val="80000"/>
-            </a:schemeClr>
-          </a:solidFill>
-          <a:ln>
-            <a:noFill/>
-          </a:ln>
-        </p:spPr>
-        <p:style>
-          <a:lnRef idx="1">
-            <a:schemeClr val="accent1"/>
-          </a:lnRef>
-          <a:fillRef idx="3">
-            <a:schemeClr val="accent1"/>
-          </a:fillRef>
-          <a:effectRef idx="2">
-            <a:schemeClr val="accent1"/>
-          </a:effectRef>
-          <a:fontRef idx="minor">
-            <a:schemeClr val="lt1"/>
-          </a:fontRef>
-        </p:style>
-        <p:txBody>
-          <a:bodyPr rtlCol="0" anchor="ctr"/>
-          <a:lstStyle/>
-          <a:p>
-            <a:pPr algn="ctr"/>
-            <a:endParaRPr lang="en-US"/>
-          </a:p>
-        </p:txBody>
-      </p:sp>
-      <p:sp>
-        <p:nvSpPr>
-          <p:cNvPr id="55" name="TextBox 54"/>
-          <p:cNvSpPr txBox="1"/>
-          <p:nvPr/>
-        </p:nvSpPr>
-        <p:spPr>
-          <a:xfrm>
-            <a:off x="5223408" y="571355"/>
-            <a:ext cx="1181746" cy="646331"/>
-          </a:xfrm>
-          <a:prstGeom prst="rect">
-            <a:avLst/>
-          </a:prstGeom>
-          <a:noFill/>
-        </p:spPr>
-        <p:txBody>
-          <a:bodyPr wrap="square" rtlCol="0">
-            <a:spAutoFit/>
-          </a:bodyPr>
-          <a:lstStyle/>
-          <a:p>
-            <a:r>
-              <a:rPr lang="en-US" dirty="0" smtClean="0"/>
-              <a:t>Find my organs!</a:t>
-            </a:r>
-            <a:endParaRPr lang="en-US" dirty="0"/>
-          </a:p>
-        </p:txBody>
-      </p:sp>
     </p:spTree>
     <p:extLst>
       <p:ext uri="{BB962C8B-B14F-4D97-AF65-F5344CB8AC3E}">

</xml_diff>

<commit_message>
adding lungs + heart
</commit_message>
<xml_diff>
--- a/edoc person.pptx
+++ b/edoc person.pptx
@@ -8,6 +8,7 @@
     <p:sldId id="256" r:id="rId2"/>
     <p:sldId id="257" r:id="rId3"/>
     <p:sldId id="260" r:id="rId4"/>
+    <p:sldId id="261" r:id="rId5"/>
   </p:sldIdLst>
   <p:sldSz cx="9144000" cy="6858000" type="screen4x3"/>
   <p:notesSz cx="6858000" cy="9144000"/>
@@ -290,7 +291,7 @@
           <a:p>
             <a:fld id="{CC5F992D-EA7D-6042-A048-FB62374BB333}" type="datetimeFigureOut">
               <a:rPr lang="en-US" smtClean="0"/>
-              <a:t>08/11/18</a:t>
+              <a:t>19/11/18</a:t>
             </a:fld>
             <a:endParaRPr lang="en-US"/>
           </a:p>
@@ -460,7 +461,7 @@
           <a:p>
             <a:fld id="{CC5F992D-EA7D-6042-A048-FB62374BB333}" type="datetimeFigureOut">
               <a:rPr lang="en-US" smtClean="0"/>
-              <a:t>08/11/18</a:t>
+              <a:t>19/11/18</a:t>
             </a:fld>
             <a:endParaRPr lang="en-US"/>
           </a:p>
@@ -640,7 +641,7 @@
           <a:p>
             <a:fld id="{CC5F992D-EA7D-6042-A048-FB62374BB333}" type="datetimeFigureOut">
               <a:rPr lang="en-US" smtClean="0"/>
-              <a:t>08/11/18</a:t>
+              <a:t>19/11/18</a:t>
             </a:fld>
             <a:endParaRPr lang="en-US"/>
           </a:p>
@@ -810,7 +811,7 @@
           <a:p>
             <a:fld id="{CC5F992D-EA7D-6042-A048-FB62374BB333}" type="datetimeFigureOut">
               <a:rPr lang="en-US" smtClean="0"/>
-              <a:t>08/11/18</a:t>
+              <a:t>19/11/18</a:t>
             </a:fld>
             <a:endParaRPr lang="en-US"/>
           </a:p>
@@ -1056,7 +1057,7 @@
           <a:p>
             <a:fld id="{CC5F992D-EA7D-6042-A048-FB62374BB333}" type="datetimeFigureOut">
               <a:rPr lang="en-US" smtClean="0"/>
-              <a:t>08/11/18</a:t>
+              <a:t>19/11/18</a:t>
             </a:fld>
             <a:endParaRPr lang="en-US"/>
           </a:p>
@@ -1344,7 +1345,7 @@
           <a:p>
             <a:fld id="{CC5F992D-EA7D-6042-A048-FB62374BB333}" type="datetimeFigureOut">
               <a:rPr lang="en-US" smtClean="0"/>
-              <a:t>08/11/18</a:t>
+              <a:t>19/11/18</a:t>
             </a:fld>
             <a:endParaRPr lang="en-US"/>
           </a:p>
@@ -1766,7 +1767,7 @@
           <a:p>
             <a:fld id="{CC5F992D-EA7D-6042-A048-FB62374BB333}" type="datetimeFigureOut">
               <a:rPr lang="en-US" smtClean="0"/>
-              <a:t>08/11/18</a:t>
+              <a:t>19/11/18</a:t>
             </a:fld>
             <a:endParaRPr lang="en-US"/>
           </a:p>
@@ -1884,7 +1885,7 @@
           <a:p>
             <a:fld id="{CC5F992D-EA7D-6042-A048-FB62374BB333}" type="datetimeFigureOut">
               <a:rPr lang="en-US" smtClean="0"/>
-              <a:t>08/11/18</a:t>
+              <a:t>19/11/18</a:t>
             </a:fld>
             <a:endParaRPr lang="en-US"/>
           </a:p>
@@ -1979,7 +1980,7 @@
           <a:p>
             <a:fld id="{CC5F992D-EA7D-6042-A048-FB62374BB333}" type="datetimeFigureOut">
               <a:rPr lang="en-US" smtClean="0"/>
-              <a:t>08/11/18</a:t>
+              <a:t>19/11/18</a:t>
             </a:fld>
             <a:endParaRPr lang="en-US"/>
           </a:p>
@@ -2256,7 +2257,7 @@
           <a:p>
             <a:fld id="{CC5F992D-EA7D-6042-A048-FB62374BB333}" type="datetimeFigureOut">
               <a:rPr lang="en-US" smtClean="0"/>
-              <a:t>08/11/18</a:t>
+              <a:t>19/11/18</a:t>
             </a:fld>
             <a:endParaRPr lang="en-US"/>
           </a:p>
@@ -2509,7 +2510,7 @@
           <a:p>
             <a:fld id="{CC5F992D-EA7D-6042-A048-FB62374BB333}" type="datetimeFigureOut">
               <a:rPr lang="en-US" smtClean="0"/>
-              <a:t>08/11/18</a:t>
+              <a:t>19/11/18</a:t>
             </a:fld>
             <a:endParaRPr lang="en-US"/>
           </a:p>
@@ -2722,7 +2723,7 @@
           <a:p>
             <a:fld id="{CC5F992D-EA7D-6042-A048-FB62374BB333}" type="datetimeFigureOut">
               <a:rPr lang="en-US" smtClean="0"/>
-              <a:t>08/11/18</a:t>
+              <a:t>19/11/18</a:t>
             </a:fld>
             <a:endParaRPr lang="en-US"/>
           </a:p>
@@ -5966,6 +5967,529 @@
 </p:sld>
 </file>
 
+<file path=ppt/slides/slide4.xml><?xml version="1.0" encoding="utf-8"?>
+<p:sld xmlns:a="http://schemas.openxmlformats.org/drawingml/2006/main" xmlns:r="http://schemas.openxmlformats.org/officeDocument/2006/relationships" xmlns:p="http://schemas.openxmlformats.org/presentationml/2006/main">
+  <p:cSld>
+    <p:spTree>
+      <p:nvGrpSpPr>
+        <p:cNvPr id="1" name=""/>
+        <p:cNvGrpSpPr/>
+        <p:nvPr/>
+      </p:nvGrpSpPr>
+      <p:grpSpPr>
+        <a:xfrm>
+          <a:off x="0" y="0"/>
+          <a:ext cx="0" cy="0"/>
+          <a:chOff x="0" y="0"/>
+          <a:chExt cx="0" cy="0"/>
+        </a:xfrm>
+      </p:grpSpPr>
+      <p:sp>
+        <p:nvSpPr>
+          <p:cNvPr id="2" name="Title 1"/>
+          <p:cNvSpPr>
+            <a:spLocks noGrp="1"/>
+          </p:cNvSpPr>
+          <p:nvPr>
+            <p:ph type="title"/>
+          </p:nvPr>
+        </p:nvSpPr>
+        <p:spPr/>
+        <p:txBody>
+          <a:bodyPr/>
+          <a:lstStyle/>
+          <a:p>
+            <a:endParaRPr lang="en-US"/>
+          </a:p>
+        </p:txBody>
+      </p:sp>
+      <p:sp>
+        <p:nvSpPr>
+          <p:cNvPr id="5" name="Vertical Scroll 4"/>
+          <p:cNvSpPr/>
+          <p:nvPr/>
+        </p:nvSpPr>
+        <p:spPr>
+          <a:xfrm>
+            <a:off x="2040721" y="2439985"/>
+            <a:ext cx="1412807" cy="1954843"/>
+          </a:xfrm>
+          <a:prstGeom prst="verticalScroll">
+            <a:avLst/>
+          </a:prstGeom>
+        </p:spPr>
+        <p:style>
+          <a:lnRef idx="1">
+            <a:schemeClr val="accent1"/>
+          </a:lnRef>
+          <a:fillRef idx="3">
+            <a:schemeClr val="accent1"/>
+          </a:fillRef>
+          <a:effectRef idx="2">
+            <a:schemeClr val="accent1"/>
+          </a:effectRef>
+          <a:fontRef idx="minor">
+            <a:schemeClr val="lt1"/>
+          </a:fontRef>
+        </p:style>
+        <p:txBody>
+          <a:bodyPr rtlCol="0" anchor="ctr"/>
+          <a:lstStyle/>
+          <a:p>
+            <a:pPr algn="ctr"/>
+            <a:endParaRPr lang="en-US"/>
+          </a:p>
+        </p:txBody>
+      </p:sp>
+      <p:grpSp>
+        <p:nvGrpSpPr>
+          <p:cNvPr id="19" name="Group 18"/>
+          <p:cNvGrpSpPr/>
+          <p:nvPr/>
+        </p:nvGrpSpPr>
+        <p:grpSpPr>
+          <a:xfrm>
+            <a:off x="5194644" y="2254347"/>
+            <a:ext cx="2290525" cy="2725640"/>
+            <a:chOff x="5194644" y="2254347"/>
+            <a:chExt cx="2290525" cy="2725640"/>
+          </a:xfrm>
+        </p:grpSpPr>
+        <p:cxnSp>
+          <p:nvCxnSpPr>
+            <p:cNvPr id="17" name="Straight Connector 16"/>
+            <p:cNvCxnSpPr/>
+            <p:nvPr/>
+          </p:nvCxnSpPr>
+          <p:spPr>
+            <a:xfrm>
+              <a:off x="6264862" y="2254347"/>
+              <a:ext cx="0" cy="1084438"/>
+            </a:xfrm>
+            <a:prstGeom prst="line">
+              <a:avLst/>
+            </a:prstGeom>
+            <a:ln w="152400" cmpd="sng">
+              <a:solidFill>
+                <a:schemeClr val="accent2">
+                  <a:lumMod val="40000"/>
+                  <a:lumOff val="60000"/>
+                </a:schemeClr>
+              </a:solidFill>
+            </a:ln>
+            <a:scene3d>
+              <a:camera prst="orthographicFront"/>
+              <a:lightRig rig="threePt" dir="t"/>
+            </a:scene3d>
+            <a:sp3d>
+              <a:bevelT w="165100" prst="coolSlant"/>
+            </a:sp3d>
+          </p:spPr>
+          <p:style>
+            <a:lnRef idx="2">
+              <a:schemeClr val="accent1"/>
+            </a:lnRef>
+            <a:fillRef idx="0">
+              <a:schemeClr val="accent1"/>
+            </a:fillRef>
+            <a:effectRef idx="1">
+              <a:schemeClr val="accent1"/>
+            </a:effectRef>
+            <a:fontRef idx="minor">
+              <a:schemeClr val="tx1"/>
+            </a:fontRef>
+          </p:style>
+        </p:cxnSp>
+        <p:sp>
+          <p:nvSpPr>
+            <p:cNvPr id="11" name="Diagonal Stripe 10"/>
+            <p:cNvSpPr/>
+            <p:nvPr/>
+          </p:nvSpPr>
+          <p:spPr>
+            <a:xfrm>
+              <a:off x="6010326" y="3196238"/>
+              <a:ext cx="325898" cy="585025"/>
+            </a:xfrm>
+            <a:prstGeom prst="diagStripe">
+              <a:avLst/>
+            </a:prstGeom>
+            <a:solidFill>
+              <a:schemeClr val="accent2">
+                <a:lumMod val="40000"/>
+                <a:lumOff val="60000"/>
+              </a:schemeClr>
+            </a:solidFill>
+            <a:ln>
+              <a:noFill/>
+            </a:ln>
+            <a:scene3d>
+              <a:camera prst="orthographicFront"/>
+              <a:lightRig rig="threePt" dir="t"/>
+            </a:scene3d>
+            <a:sp3d>
+              <a:bevelT w="63500" h="127000"/>
+            </a:sp3d>
+          </p:spPr>
+          <p:style>
+            <a:lnRef idx="1">
+              <a:schemeClr val="accent1"/>
+            </a:lnRef>
+            <a:fillRef idx="3">
+              <a:schemeClr val="accent1"/>
+            </a:fillRef>
+            <a:effectRef idx="2">
+              <a:schemeClr val="accent1"/>
+            </a:effectRef>
+            <a:fontRef idx="minor">
+              <a:schemeClr val="lt1"/>
+            </a:fontRef>
+          </p:style>
+          <p:txBody>
+            <a:bodyPr rtlCol="0" anchor="ctr"/>
+            <a:lstStyle/>
+            <a:p>
+              <a:pPr algn="ctr"/>
+              <a:endParaRPr lang="en-US">
+                <a:solidFill>
+                  <a:schemeClr val="tx1"/>
+                </a:solidFill>
+              </a:endParaRPr>
+            </a:p>
+          </p:txBody>
+        </p:sp>
+        <p:sp>
+          <p:nvSpPr>
+            <p:cNvPr id="12" name="Diagonal Stripe 11"/>
+            <p:cNvSpPr/>
+            <p:nvPr/>
+          </p:nvSpPr>
+          <p:spPr>
+            <a:xfrm flipH="1">
+              <a:off x="6164975" y="3196238"/>
+              <a:ext cx="325898" cy="585025"/>
+            </a:xfrm>
+            <a:prstGeom prst="diagStripe">
+              <a:avLst/>
+            </a:prstGeom>
+            <a:solidFill>
+              <a:schemeClr val="accent2">
+                <a:lumMod val="40000"/>
+                <a:lumOff val="60000"/>
+              </a:schemeClr>
+            </a:solidFill>
+            <a:ln>
+              <a:noFill/>
+            </a:ln>
+            <a:scene3d>
+              <a:camera prst="orthographicFront"/>
+              <a:lightRig rig="threePt" dir="t"/>
+            </a:scene3d>
+            <a:sp3d>
+              <a:bevelT w="63500" h="127000"/>
+            </a:sp3d>
+          </p:spPr>
+          <p:style>
+            <a:lnRef idx="1">
+              <a:schemeClr val="accent1"/>
+            </a:lnRef>
+            <a:fillRef idx="3">
+              <a:schemeClr val="accent1"/>
+            </a:fillRef>
+            <a:effectRef idx="2">
+              <a:schemeClr val="accent1"/>
+            </a:effectRef>
+            <a:fontRef idx="minor">
+              <a:schemeClr val="lt1"/>
+            </a:fontRef>
+          </p:style>
+          <p:txBody>
+            <a:bodyPr rtlCol="0" anchor="ctr"/>
+            <a:lstStyle/>
+            <a:p>
+              <a:pPr algn="ctr"/>
+              <a:endParaRPr lang="en-US">
+                <a:solidFill>
+                  <a:schemeClr val="tx1"/>
+                </a:solidFill>
+              </a:endParaRPr>
+            </a:p>
+          </p:txBody>
+        </p:sp>
+        <p:sp>
+          <p:nvSpPr>
+            <p:cNvPr id="7" name="Delay 6"/>
+            <p:cNvSpPr/>
+            <p:nvPr/>
+          </p:nvSpPr>
+          <p:spPr>
+            <a:xfrm rot="16200000">
+              <a:off x="4652314" y="3410240"/>
+              <a:ext cx="2112076" cy="1027415"/>
+            </a:xfrm>
+            <a:custGeom>
+              <a:avLst/>
+              <a:gdLst>
+                <a:gd name="connsiteX0" fmla="*/ 0 w 2112075"/>
+                <a:gd name="connsiteY0" fmla="*/ 0 h 970331"/>
+                <a:gd name="connsiteX1" fmla="*/ 1056038 w 2112075"/>
+                <a:gd name="connsiteY1" fmla="*/ 0 h 970331"/>
+                <a:gd name="connsiteX2" fmla="*/ 2112076 w 2112075"/>
+                <a:gd name="connsiteY2" fmla="*/ 485166 h 970331"/>
+                <a:gd name="connsiteX3" fmla="*/ 1056038 w 2112075"/>
+                <a:gd name="connsiteY3" fmla="*/ 970332 h 970331"/>
+                <a:gd name="connsiteX4" fmla="*/ 0 w 2112075"/>
+                <a:gd name="connsiteY4" fmla="*/ 970331 h 970331"/>
+                <a:gd name="connsiteX5" fmla="*/ 0 w 2112075"/>
+                <a:gd name="connsiteY5" fmla="*/ 0 h 970331"/>
+                <a:gd name="connsiteX0" fmla="*/ 0 w 2112076"/>
+                <a:gd name="connsiteY0" fmla="*/ 0 h 1027415"/>
+                <a:gd name="connsiteX1" fmla="*/ 1056038 w 2112076"/>
+                <a:gd name="connsiteY1" fmla="*/ 0 h 1027415"/>
+                <a:gd name="connsiteX2" fmla="*/ 2112076 w 2112076"/>
+                <a:gd name="connsiteY2" fmla="*/ 485166 h 1027415"/>
+                <a:gd name="connsiteX3" fmla="*/ 1056038 w 2112076"/>
+                <a:gd name="connsiteY3" fmla="*/ 1027415 h 1027415"/>
+                <a:gd name="connsiteX4" fmla="*/ 0 w 2112076"/>
+                <a:gd name="connsiteY4" fmla="*/ 970331 h 1027415"/>
+                <a:gd name="connsiteX5" fmla="*/ 0 w 2112076"/>
+                <a:gd name="connsiteY5" fmla="*/ 0 h 1027415"/>
+              </a:gdLst>
+              <a:ahLst/>
+              <a:cxnLst>
+                <a:cxn ang="0">
+                  <a:pos x="connsiteX0" y="connsiteY0"/>
+                </a:cxn>
+                <a:cxn ang="0">
+                  <a:pos x="connsiteX1" y="connsiteY1"/>
+                </a:cxn>
+                <a:cxn ang="0">
+                  <a:pos x="connsiteX2" y="connsiteY2"/>
+                </a:cxn>
+                <a:cxn ang="0">
+                  <a:pos x="connsiteX3" y="connsiteY3"/>
+                </a:cxn>
+                <a:cxn ang="0">
+                  <a:pos x="connsiteX4" y="connsiteY4"/>
+                </a:cxn>
+                <a:cxn ang="0">
+                  <a:pos x="connsiteX5" y="connsiteY5"/>
+                </a:cxn>
+              </a:cxnLst>
+              <a:rect l="l" t="t" r="r" b="b"/>
+              <a:pathLst>
+                <a:path w="2112076" h="1027415">
+                  <a:moveTo>
+                    <a:pt x="0" y="0"/>
+                  </a:moveTo>
+                  <a:lnTo>
+                    <a:pt x="1056038" y="0"/>
+                  </a:lnTo>
+                  <a:cubicBezTo>
+                    <a:pt x="1639272" y="0"/>
+                    <a:pt x="2112076" y="313930"/>
+                    <a:pt x="2112076" y="485166"/>
+                  </a:cubicBezTo>
+                  <a:cubicBezTo>
+                    <a:pt x="2112076" y="656402"/>
+                    <a:pt x="1639272" y="1027415"/>
+                    <a:pt x="1056038" y="1027415"/>
+                  </a:cubicBezTo>
+                  <a:lnTo>
+                    <a:pt x="0" y="970331"/>
+                  </a:lnTo>
+                  <a:lnTo>
+                    <a:pt x="0" y="0"/>
+                  </a:lnTo>
+                  <a:close/>
+                </a:path>
+              </a:pathLst>
+            </a:custGeom>
+            <a:solidFill>
+              <a:schemeClr val="accent2">
+                <a:lumMod val="40000"/>
+                <a:lumOff val="60000"/>
+              </a:schemeClr>
+            </a:solidFill>
+            <a:ln>
+              <a:noFill/>
+            </a:ln>
+            <a:scene3d>
+              <a:camera prst="perspectiveBelow"/>
+              <a:lightRig rig="threePt" dir="t"/>
+            </a:scene3d>
+            <a:sp3d>
+              <a:bevelT w="381000" h="381000"/>
+            </a:sp3d>
+          </p:spPr>
+          <p:style>
+            <a:lnRef idx="1">
+              <a:schemeClr val="accent1"/>
+            </a:lnRef>
+            <a:fillRef idx="3">
+              <a:schemeClr val="accent1"/>
+            </a:fillRef>
+            <a:effectRef idx="2">
+              <a:schemeClr val="accent1"/>
+            </a:effectRef>
+            <a:fontRef idx="minor">
+              <a:schemeClr val="lt1"/>
+            </a:fontRef>
+          </p:style>
+          <p:txBody>
+            <a:bodyPr rtlCol="0" anchor="ctr"/>
+            <a:lstStyle/>
+            <a:p>
+              <a:pPr algn="ctr"/>
+              <a:endParaRPr lang="en-US"/>
+            </a:p>
+          </p:txBody>
+        </p:sp>
+        <p:sp>
+          <p:nvSpPr>
+            <p:cNvPr id="8" name="Delay 7"/>
+            <p:cNvSpPr/>
+            <p:nvPr/>
+          </p:nvSpPr>
+          <p:spPr>
+            <a:xfrm rot="16200000">
+              <a:off x="5924843" y="3419661"/>
+              <a:ext cx="2112085" cy="1008567"/>
+            </a:xfrm>
+            <a:custGeom>
+              <a:avLst/>
+              <a:gdLst>
+                <a:gd name="connsiteX0" fmla="*/ 0 w 2112075"/>
+                <a:gd name="connsiteY0" fmla="*/ 0 h 994295"/>
+                <a:gd name="connsiteX1" fmla="*/ 1056038 w 2112075"/>
+                <a:gd name="connsiteY1" fmla="*/ 0 h 994295"/>
+                <a:gd name="connsiteX2" fmla="*/ 2112076 w 2112075"/>
+                <a:gd name="connsiteY2" fmla="*/ 497148 h 994295"/>
+                <a:gd name="connsiteX3" fmla="*/ 1056038 w 2112075"/>
+                <a:gd name="connsiteY3" fmla="*/ 994296 h 994295"/>
+                <a:gd name="connsiteX4" fmla="*/ 0 w 2112075"/>
+                <a:gd name="connsiteY4" fmla="*/ 994295 h 994295"/>
+                <a:gd name="connsiteX5" fmla="*/ 0 w 2112075"/>
+                <a:gd name="connsiteY5" fmla="*/ 0 h 994295"/>
+                <a:gd name="connsiteX0" fmla="*/ 0 w 2112085"/>
+                <a:gd name="connsiteY0" fmla="*/ 14271 h 1008567"/>
+                <a:gd name="connsiteX1" fmla="*/ 1070307 w 2112085"/>
+                <a:gd name="connsiteY1" fmla="*/ 0 h 1008567"/>
+                <a:gd name="connsiteX2" fmla="*/ 2112076 w 2112085"/>
+                <a:gd name="connsiteY2" fmla="*/ 511419 h 1008567"/>
+                <a:gd name="connsiteX3" fmla="*/ 1056038 w 2112085"/>
+                <a:gd name="connsiteY3" fmla="*/ 1008567 h 1008567"/>
+                <a:gd name="connsiteX4" fmla="*/ 0 w 2112085"/>
+                <a:gd name="connsiteY4" fmla="*/ 1008566 h 1008567"/>
+                <a:gd name="connsiteX5" fmla="*/ 0 w 2112085"/>
+                <a:gd name="connsiteY5" fmla="*/ 14271 h 1008567"/>
+              </a:gdLst>
+              <a:ahLst/>
+              <a:cxnLst>
+                <a:cxn ang="0">
+                  <a:pos x="connsiteX0" y="connsiteY0"/>
+                </a:cxn>
+                <a:cxn ang="0">
+                  <a:pos x="connsiteX1" y="connsiteY1"/>
+                </a:cxn>
+                <a:cxn ang="0">
+                  <a:pos x="connsiteX2" y="connsiteY2"/>
+                </a:cxn>
+                <a:cxn ang="0">
+                  <a:pos x="connsiteX3" y="connsiteY3"/>
+                </a:cxn>
+                <a:cxn ang="0">
+                  <a:pos x="connsiteX4" y="connsiteY4"/>
+                </a:cxn>
+                <a:cxn ang="0">
+                  <a:pos x="connsiteX5" y="connsiteY5"/>
+                </a:cxn>
+              </a:cxnLst>
+              <a:rect l="l" t="t" r="r" b="b"/>
+              <a:pathLst>
+                <a:path w="2112085" h="1008567">
+                  <a:moveTo>
+                    <a:pt x="0" y="14271"/>
+                  </a:moveTo>
+                  <a:cubicBezTo>
+                    <a:pt x="352013" y="14271"/>
+                    <a:pt x="718294" y="0"/>
+                    <a:pt x="1070307" y="0"/>
+                  </a:cubicBezTo>
+                  <a:cubicBezTo>
+                    <a:pt x="1653541" y="0"/>
+                    <a:pt x="2114454" y="343325"/>
+                    <a:pt x="2112076" y="511419"/>
+                  </a:cubicBezTo>
+                  <a:cubicBezTo>
+                    <a:pt x="2109698" y="679513"/>
+                    <a:pt x="1639272" y="1008567"/>
+                    <a:pt x="1056038" y="1008567"/>
+                  </a:cubicBezTo>
+                  <a:lnTo>
+                    <a:pt x="0" y="1008566"/>
+                  </a:lnTo>
+                  <a:lnTo>
+                    <a:pt x="0" y="14271"/>
+                  </a:lnTo>
+                  <a:close/>
+                </a:path>
+              </a:pathLst>
+            </a:custGeom>
+            <a:solidFill>
+              <a:schemeClr val="accent2">
+                <a:lumMod val="40000"/>
+                <a:lumOff val="60000"/>
+              </a:schemeClr>
+            </a:solidFill>
+            <a:ln>
+              <a:noFill/>
+            </a:ln>
+            <a:scene3d>
+              <a:camera prst="perspectiveBelow"/>
+              <a:lightRig rig="threePt" dir="t"/>
+            </a:scene3d>
+            <a:sp3d>
+              <a:bevelT w="381000" h="381000"/>
+            </a:sp3d>
+          </p:spPr>
+          <p:style>
+            <a:lnRef idx="1">
+              <a:schemeClr val="accent1"/>
+            </a:lnRef>
+            <a:fillRef idx="3">
+              <a:schemeClr val="accent1"/>
+            </a:fillRef>
+            <a:effectRef idx="2">
+              <a:schemeClr val="accent1"/>
+            </a:effectRef>
+            <a:fontRef idx="minor">
+              <a:schemeClr val="lt1"/>
+            </a:fontRef>
+          </p:style>
+          <p:txBody>
+            <a:bodyPr rtlCol="0" anchor="ctr"/>
+            <a:lstStyle/>
+            <a:p>
+              <a:pPr algn="ctr"/>
+              <a:endParaRPr lang="en-US"/>
+            </a:p>
+          </p:txBody>
+        </p:sp>
+      </p:grpSp>
+    </p:spTree>
+    <p:extLst>
+      <p:ext uri="{BB962C8B-B14F-4D97-AF65-F5344CB8AC3E}">
+        <p14:creationId xmlns:p14="http://schemas.microsoft.com/office/powerpoint/2010/main" val="2317148578"/>
+      </p:ext>
+    </p:extLst>
+  </p:cSld>
+  <p:clrMapOvr>
+    <a:masterClrMapping/>
+  </p:clrMapOvr>
+</p:sld>
+</file>
+
 <file path=ppt/theme/theme1.xml><?xml version="1.0" encoding="utf-8"?>
 <a:theme xmlns:a="http://schemas.openxmlformats.org/drawingml/2006/main" name="Office Theme">
   <a:themeElements>

</xml_diff>

<commit_message>
making heart and lungs move; making them link to heart and lung pages
</commit_message>
<xml_diff>
--- a/edoc person.pptx
+++ b/edoc person.pptx
@@ -3217,138 +3217,6 @@
           </a:prstGeom>
         </p:spPr>
       </p:pic>
-      <p:sp>
-        <p:nvSpPr>
-          <p:cNvPr id="9" name="Snip Same Side Corner Rectangle 8"/>
-          <p:cNvSpPr/>
-          <p:nvPr/>
-        </p:nvSpPr>
-        <p:spPr>
-          <a:xfrm>
-            <a:off x="1995641" y="2796357"/>
-            <a:ext cx="1269956" cy="751561"/>
-          </a:xfrm>
-          <a:prstGeom prst="snip2SameRect">
-            <a:avLst/>
-          </a:prstGeom>
-        </p:spPr>
-        <p:style>
-          <a:lnRef idx="1">
-            <a:schemeClr val="accent1"/>
-          </a:lnRef>
-          <a:fillRef idx="3">
-            <a:schemeClr val="accent1"/>
-          </a:fillRef>
-          <a:effectRef idx="2">
-            <a:schemeClr val="accent1"/>
-          </a:effectRef>
-          <a:fontRef idx="minor">
-            <a:schemeClr val="lt1"/>
-          </a:fontRef>
-        </p:style>
-        <p:txBody>
-          <a:bodyPr rtlCol="0" anchor="ctr"/>
-          <a:lstStyle/>
-          <a:p>
-            <a:pPr algn="ctr"/>
-            <a:endParaRPr lang="en-US"/>
-          </a:p>
-        </p:txBody>
-      </p:sp>
-      <p:sp>
-        <p:nvSpPr>
-          <p:cNvPr id="5" name="Oval 4"/>
-          <p:cNvSpPr/>
-          <p:nvPr/>
-        </p:nvSpPr>
-        <p:spPr>
-          <a:xfrm>
-            <a:off x="1995641" y="3172138"/>
-            <a:ext cx="1269956" cy="1166217"/>
-          </a:xfrm>
-          <a:prstGeom prst="ellipse">
-            <a:avLst/>
-          </a:prstGeom>
-          <a:solidFill>
-            <a:schemeClr val="accent6">
-              <a:lumMod val="40000"/>
-              <a:lumOff val="60000"/>
-            </a:schemeClr>
-          </a:solidFill>
-          <a:ln>
-            <a:noFill/>
-          </a:ln>
-        </p:spPr>
-        <p:style>
-          <a:lnRef idx="1">
-            <a:schemeClr val="accent1"/>
-          </a:lnRef>
-          <a:fillRef idx="3">
-            <a:schemeClr val="accent1"/>
-          </a:fillRef>
-          <a:effectRef idx="2">
-            <a:schemeClr val="accent1"/>
-          </a:effectRef>
-          <a:fontRef idx="minor">
-            <a:schemeClr val="lt1"/>
-          </a:fontRef>
-        </p:style>
-        <p:txBody>
-          <a:bodyPr rtlCol="0" anchor="ctr"/>
-          <a:lstStyle/>
-          <a:p>
-            <a:pPr algn="ctr"/>
-            <a:endParaRPr lang="en-US"/>
-          </a:p>
-        </p:txBody>
-      </p:sp>
-      <p:sp>
-        <p:nvSpPr>
-          <p:cNvPr id="6" name="Trapezoid 5"/>
-          <p:cNvSpPr/>
-          <p:nvPr/>
-        </p:nvSpPr>
-        <p:spPr>
-          <a:xfrm rot="21438737">
-            <a:off x="1753539" y="3961559"/>
-            <a:ext cx="1750080" cy="1114384"/>
-          </a:xfrm>
-          <a:prstGeom prst="trapezoid">
-            <a:avLst/>
-          </a:prstGeom>
-          <a:solidFill>
-            <a:schemeClr val="accent6">
-              <a:lumMod val="40000"/>
-              <a:lumOff val="60000"/>
-            </a:schemeClr>
-          </a:solidFill>
-          <a:ln>
-            <a:noFill/>
-          </a:ln>
-        </p:spPr>
-        <p:style>
-          <a:lnRef idx="1">
-            <a:schemeClr val="accent1"/>
-          </a:lnRef>
-          <a:fillRef idx="3">
-            <a:schemeClr val="accent1"/>
-          </a:fillRef>
-          <a:effectRef idx="2">
-            <a:schemeClr val="accent1"/>
-          </a:effectRef>
-          <a:fontRef idx="minor">
-            <a:schemeClr val="lt1"/>
-          </a:fontRef>
-        </p:style>
-        <p:txBody>
-          <a:bodyPr rtlCol="0" anchor="ctr"/>
-          <a:lstStyle/>
-          <a:p>
-            <a:pPr algn="ctr"/>
-            <a:endParaRPr lang="en-US"/>
-          </a:p>
-        </p:txBody>
-      </p:sp>
     </p:spTree>
     <p:extLst>
       <p:ext uri="{BB962C8B-B14F-4D97-AF65-F5344CB8AC3E}">

</xml_diff>

<commit_message>
beginning to format lung page
</commit_message>
<xml_diff>
--- a/edoc person.pptx
+++ b/edoc person.pptx
@@ -9,6 +9,7 @@
     <p:sldId id="257" r:id="rId3"/>
     <p:sldId id="260" r:id="rId4"/>
     <p:sldId id="261" r:id="rId5"/>
+    <p:sldId id="262" r:id="rId6"/>
   </p:sldIdLst>
   <p:sldSz cx="9144000" cy="6858000" type="screen4x3"/>
   <p:notesSz cx="6858000" cy="9144000"/>
@@ -291,7 +292,7 @@
           <a:p>
             <a:fld id="{CC5F992D-EA7D-6042-A048-FB62374BB333}" type="datetimeFigureOut">
               <a:rPr lang="en-US" smtClean="0"/>
-              <a:t>19/11/18</a:t>
+              <a:t>20/11/18</a:t>
             </a:fld>
             <a:endParaRPr lang="en-US"/>
           </a:p>
@@ -461,7 +462,7 @@
           <a:p>
             <a:fld id="{CC5F992D-EA7D-6042-A048-FB62374BB333}" type="datetimeFigureOut">
               <a:rPr lang="en-US" smtClean="0"/>
-              <a:t>19/11/18</a:t>
+              <a:t>20/11/18</a:t>
             </a:fld>
             <a:endParaRPr lang="en-US"/>
           </a:p>
@@ -641,7 +642,7 @@
           <a:p>
             <a:fld id="{CC5F992D-EA7D-6042-A048-FB62374BB333}" type="datetimeFigureOut">
               <a:rPr lang="en-US" smtClean="0"/>
-              <a:t>19/11/18</a:t>
+              <a:t>20/11/18</a:t>
             </a:fld>
             <a:endParaRPr lang="en-US"/>
           </a:p>
@@ -811,7 +812,7 @@
           <a:p>
             <a:fld id="{CC5F992D-EA7D-6042-A048-FB62374BB333}" type="datetimeFigureOut">
               <a:rPr lang="en-US" smtClean="0"/>
-              <a:t>19/11/18</a:t>
+              <a:t>20/11/18</a:t>
             </a:fld>
             <a:endParaRPr lang="en-US"/>
           </a:p>
@@ -1057,7 +1058,7 @@
           <a:p>
             <a:fld id="{CC5F992D-EA7D-6042-A048-FB62374BB333}" type="datetimeFigureOut">
               <a:rPr lang="en-US" smtClean="0"/>
-              <a:t>19/11/18</a:t>
+              <a:t>20/11/18</a:t>
             </a:fld>
             <a:endParaRPr lang="en-US"/>
           </a:p>
@@ -1345,7 +1346,7 @@
           <a:p>
             <a:fld id="{CC5F992D-EA7D-6042-A048-FB62374BB333}" type="datetimeFigureOut">
               <a:rPr lang="en-US" smtClean="0"/>
-              <a:t>19/11/18</a:t>
+              <a:t>20/11/18</a:t>
             </a:fld>
             <a:endParaRPr lang="en-US"/>
           </a:p>
@@ -1767,7 +1768,7 @@
           <a:p>
             <a:fld id="{CC5F992D-EA7D-6042-A048-FB62374BB333}" type="datetimeFigureOut">
               <a:rPr lang="en-US" smtClean="0"/>
-              <a:t>19/11/18</a:t>
+              <a:t>20/11/18</a:t>
             </a:fld>
             <a:endParaRPr lang="en-US"/>
           </a:p>
@@ -1885,7 +1886,7 @@
           <a:p>
             <a:fld id="{CC5F992D-EA7D-6042-A048-FB62374BB333}" type="datetimeFigureOut">
               <a:rPr lang="en-US" smtClean="0"/>
-              <a:t>19/11/18</a:t>
+              <a:t>20/11/18</a:t>
             </a:fld>
             <a:endParaRPr lang="en-US"/>
           </a:p>
@@ -1980,7 +1981,7 @@
           <a:p>
             <a:fld id="{CC5F992D-EA7D-6042-A048-FB62374BB333}" type="datetimeFigureOut">
               <a:rPr lang="en-US" smtClean="0"/>
-              <a:t>19/11/18</a:t>
+              <a:t>20/11/18</a:t>
             </a:fld>
             <a:endParaRPr lang="en-US"/>
           </a:p>
@@ -2257,7 +2258,7 @@
           <a:p>
             <a:fld id="{CC5F992D-EA7D-6042-A048-FB62374BB333}" type="datetimeFigureOut">
               <a:rPr lang="en-US" smtClean="0"/>
-              <a:t>19/11/18</a:t>
+              <a:t>20/11/18</a:t>
             </a:fld>
             <a:endParaRPr lang="en-US"/>
           </a:p>
@@ -2510,7 +2511,7 @@
           <a:p>
             <a:fld id="{CC5F992D-EA7D-6042-A048-FB62374BB333}" type="datetimeFigureOut">
               <a:rPr lang="en-US" smtClean="0"/>
-              <a:t>19/11/18</a:t>
+              <a:t>20/11/18</a:t>
             </a:fld>
             <a:endParaRPr lang="en-US"/>
           </a:p>
@@ -2723,7 +2724,7 @@
           <a:p>
             <a:fld id="{CC5F992D-EA7D-6042-A048-FB62374BB333}" type="datetimeFigureOut">
               <a:rPr lang="en-US" smtClean="0"/>
-              <a:t>19/11/18</a:t>
+              <a:t>20/11/18</a:t>
             </a:fld>
             <a:endParaRPr lang="en-US"/>
           </a:p>
@@ -6358,6 +6359,148 @@
 </p:sld>
 </file>
 
+<file path=ppt/slides/slide5.xml><?xml version="1.0" encoding="utf-8"?>
+<p:sld xmlns:a="http://schemas.openxmlformats.org/drawingml/2006/main" xmlns:r="http://schemas.openxmlformats.org/officeDocument/2006/relationships" xmlns:p="http://schemas.openxmlformats.org/presentationml/2006/main">
+  <p:cSld>
+    <p:spTree>
+      <p:nvGrpSpPr>
+        <p:cNvPr id="1" name=""/>
+        <p:cNvGrpSpPr/>
+        <p:nvPr/>
+      </p:nvGrpSpPr>
+      <p:grpSpPr>
+        <a:xfrm>
+          <a:off x="0" y="0"/>
+          <a:ext cx="0" cy="0"/>
+          <a:chOff x="0" y="0"/>
+          <a:chExt cx="0" cy="0"/>
+        </a:xfrm>
+      </p:grpSpPr>
+      <p:sp>
+        <p:nvSpPr>
+          <p:cNvPr id="2" name="Title 1"/>
+          <p:cNvSpPr>
+            <a:spLocks noGrp="1"/>
+          </p:cNvSpPr>
+          <p:nvPr>
+            <p:ph type="title"/>
+          </p:nvPr>
+        </p:nvSpPr>
+        <p:spPr/>
+        <p:txBody>
+          <a:bodyPr/>
+          <a:lstStyle/>
+          <a:p>
+            <a:endParaRPr lang="en-US"/>
+          </a:p>
+        </p:txBody>
+      </p:sp>
+      <p:sp>
+        <p:nvSpPr>
+          <p:cNvPr id="3" name="Content Placeholder 2"/>
+          <p:cNvSpPr>
+            <a:spLocks noGrp="1"/>
+          </p:cNvSpPr>
+          <p:nvPr>
+            <p:ph idx="1"/>
+          </p:nvPr>
+        </p:nvSpPr>
+        <p:spPr/>
+        <p:txBody>
+          <a:bodyPr/>
+          <a:lstStyle/>
+          <a:p>
+            <a:endParaRPr lang="en-US" dirty="0"/>
+          </a:p>
+        </p:txBody>
+      </p:sp>
+      <p:sp>
+        <p:nvSpPr>
+          <p:cNvPr id="4" name="Cube 3"/>
+          <p:cNvSpPr/>
+          <p:nvPr/>
+        </p:nvSpPr>
+        <p:spPr>
+          <a:xfrm>
+            <a:off x="2725718" y="2639750"/>
+            <a:ext cx="3453528" cy="2711095"/>
+          </a:xfrm>
+          <a:prstGeom prst="cube">
+            <a:avLst/>
+          </a:prstGeom>
+        </p:spPr>
+        <p:style>
+          <a:lnRef idx="1">
+            <a:schemeClr val="accent1"/>
+          </a:lnRef>
+          <a:fillRef idx="3">
+            <a:schemeClr val="accent1"/>
+          </a:fillRef>
+          <a:effectRef idx="2">
+            <a:schemeClr val="accent1"/>
+          </a:effectRef>
+          <a:fontRef idx="minor">
+            <a:schemeClr val="lt1"/>
+          </a:fontRef>
+        </p:style>
+        <p:txBody>
+          <a:bodyPr rtlCol="0" anchor="ctr"/>
+          <a:lstStyle/>
+          <a:p>
+            <a:pPr algn="ctr"/>
+            <a:endParaRPr lang="en-US"/>
+          </a:p>
+        </p:txBody>
+      </p:sp>
+      <p:cxnSp>
+        <p:nvCxnSpPr>
+          <p:cNvPr id="9" name="Straight Connector 8"/>
+          <p:cNvCxnSpPr/>
+          <p:nvPr/>
+        </p:nvCxnSpPr>
+        <p:spPr>
+          <a:xfrm>
+            <a:off x="3953005" y="2925129"/>
+            <a:ext cx="984684" cy="14269"/>
+          </a:xfrm>
+          <a:prstGeom prst="line">
+            <a:avLst/>
+          </a:prstGeom>
+          <a:ln w="76200" cmpd="sng">
+            <a:solidFill>
+              <a:schemeClr val="tx1"/>
+            </a:solidFill>
+          </a:ln>
+          <a:effectLst/>
+        </p:spPr>
+        <p:style>
+          <a:lnRef idx="2">
+            <a:schemeClr val="accent1"/>
+          </a:lnRef>
+          <a:fillRef idx="0">
+            <a:schemeClr val="accent1"/>
+          </a:fillRef>
+          <a:effectRef idx="1">
+            <a:schemeClr val="accent1"/>
+          </a:effectRef>
+          <a:fontRef idx="minor">
+            <a:schemeClr val="tx1"/>
+          </a:fontRef>
+        </p:style>
+      </p:cxnSp>
+    </p:spTree>
+    <p:extLst>
+      <p:ext uri="{BB962C8B-B14F-4D97-AF65-F5344CB8AC3E}">
+        <p14:creationId xmlns:p14="http://schemas.microsoft.com/office/powerpoint/2010/main" val="3599259293"/>
+      </p:ext>
+    </p:extLst>
+  </p:cSld>
+  <p:clrMapOvr>
+    <a:masterClrMapping/>
+  </p:clrMapOvr>
+</p:sld>
+</file>
+
 <file path=ppt/theme/theme1.xml><?xml version="1.0" encoding="utf-8"?>
 <a:theme xmlns:a="http://schemas.openxmlformats.org/drawingml/2006/main" name="Office Theme">
   <a:themeElements>

</xml_diff>

<commit_message>
changing the about button formatting
</commit_message>
<xml_diff>
--- a/edoc person.pptx
+++ b/edoc person.pptx
@@ -10,6 +10,7 @@
     <p:sldId id="260" r:id="rId4"/>
     <p:sldId id="261" r:id="rId5"/>
     <p:sldId id="262" r:id="rId6"/>
+    <p:sldId id="263" r:id="rId7"/>
   </p:sldIdLst>
   <p:sldSz cx="9144000" cy="6858000" type="screen4x3"/>
   <p:notesSz cx="6858000" cy="9144000"/>
@@ -6501,6 +6502,947 @@
 </p:sld>
 </file>
 
+<file path=ppt/slides/slide6.xml><?xml version="1.0" encoding="utf-8"?>
+<p:sld xmlns:a="http://schemas.openxmlformats.org/drawingml/2006/main" xmlns:r="http://schemas.openxmlformats.org/officeDocument/2006/relationships" xmlns:p="http://schemas.openxmlformats.org/presentationml/2006/main">
+  <p:cSld>
+    <p:spTree>
+      <p:nvGrpSpPr>
+        <p:cNvPr id="1" name=""/>
+        <p:cNvGrpSpPr/>
+        <p:nvPr/>
+      </p:nvGrpSpPr>
+      <p:grpSpPr>
+        <a:xfrm>
+          <a:off x="0" y="0"/>
+          <a:ext cx="0" cy="0"/>
+          <a:chOff x="0" y="0"/>
+          <a:chExt cx="0" cy="0"/>
+        </a:xfrm>
+      </p:grpSpPr>
+      <p:sp>
+        <p:nvSpPr>
+          <p:cNvPr id="2" name="Title 1"/>
+          <p:cNvSpPr>
+            <a:spLocks noGrp="1"/>
+          </p:cNvSpPr>
+          <p:nvPr>
+            <p:ph type="title"/>
+          </p:nvPr>
+        </p:nvSpPr>
+        <p:spPr/>
+        <p:txBody>
+          <a:bodyPr/>
+          <a:lstStyle/>
+          <a:p>
+            <a:endParaRPr lang="en-US"/>
+          </a:p>
+        </p:txBody>
+      </p:sp>
+      <p:sp>
+        <p:nvSpPr>
+          <p:cNvPr id="4" name="Block Arc 3"/>
+          <p:cNvSpPr/>
+          <p:nvPr/>
+        </p:nvSpPr>
+        <p:spPr>
+          <a:xfrm rot="1424792">
+            <a:off x="2937808" y="2795546"/>
+            <a:ext cx="770622" cy="1545601"/>
+          </a:xfrm>
+          <a:custGeom>
+            <a:avLst/>
+            <a:gdLst/>
+            <a:ahLst/>
+            <a:cxnLst/>
+            <a:rect l="l" t="t" r="r" b="b"/>
+            <a:pathLst>
+              <a:path w="770622" h="1545601">
+                <a:moveTo>
+                  <a:pt x="0" y="0"/>
+                </a:moveTo>
+                <a:lnTo>
+                  <a:pt x="192655" y="0"/>
+                </a:lnTo>
+                <a:cubicBezTo>
+                  <a:pt x="192655" y="161537"/>
+                  <a:pt x="278910" y="292488"/>
+                  <a:pt x="385311" y="292488"/>
+                </a:cubicBezTo>
+                <a:cubicBezTo>
+                  <a:pt x="491712" y="292488"/>
+                  <a:pt x="577967" y="161537"/>
+                  <a:pt x="577967" y="0"/>
+                </a:cubicBezTo>
+                <a:lnTo>
+                  <a:pt x="770622" y="0"/>
+                </a:lnTo>
+                <a:cubicBezTo>
+                  <a:pt x="770622" y="200953"/>
+                  <a:pt x="673585" y="373369"/>
+                  <a:pt x="535291" y="447018"/>
+                </a:cubicBezTo>
+                <a:lnTo>
+                  <a:pt x="485207" y="466593"/>
+                </a:lnTo>
+                <a:lnTo>
+                  <a:pt x="485207" y="1079008"/>
+                </a:lnTo>
+                <a:lnTo>
+                  <a:pt x="535291" y="1098583"/>
+                </a:lnTo>
+                <a:cubicBezTo>
+                  <a:pt x="673585" y="1172232"/>
+                  <a:pt x="770622" y="1344648"/>
+                  <a:pt x="770622" y="1545601"/>
+                </a:cubicBezTo>
+                <a:lnTo>
+                  <a:pt x="577967" y="1545601"/>
+                </a:lnTo>
+                <a:cubicBezTo>
+                  <a:pt x="577967" y="1384064"/>
+                  <a:pt x="491712" y="1253113"/>
+                  <a:pt x="385311" y="1253113"/>
+                </a:cubicBezTo>
+                <a:cubicBezTo>
+                  <a:pt x="278910" y="1253113"/>
+                  <a:pt x="192655" y="1384064"/>
+                  <a:pt x="192655" y="1545601"/>
+                </a:cubicBezTo>
+                <a:lnTo>
+                  <a:pt x="0" y="1545601"/>
+                </a:lnTo>
+                <a:cubicBezTo>
+                  <a:pt x="0" y="1344648"/>
+                  <a:pt x="97037" y="1172232"/>
+                  <a:pt x="235331" y="1098583"/>
+                </a:cubicBezTo>
+                <a:lnTo>
+                  <a:pt x="299686" y="1073430"/>
+                </a:lnTo>
+                <a:lnTo>
+                  <a:pt x="299686" y="472171"/>
+                </a:lnTo>
+                <a:lnTo>
+                  <a:pt x="235331" y="447018"/>
+                </a:lnTo>
+                <a:cubicBezTo>
+                  <a:pt x="97037" y="373369"/>
+                  <a:pt x="0" y="200953"/>
+                  <a:pt x="0" y="0"/>
+                </a:cubicBezTo>
+                <a:close/>
+              </a:path>
+            </a:pathLst>
+          </a:custGeom>
+          <a:solidFill>
+            <a:schemeClr val="tx2">
+              <a:lumMod val="60000"/>
+              <a:lumOff val="40000"/>
+            </a:schemeClr>
+          </a:solidFill>
+          <a:ln>
+            <a:noFill/>
+          </a:ln>
+          <a:effectLst/>
+        </p:spPr>
+        <p:style>
+          <a:lnRef idx="1">
+            <a:schemeClr val="accent1"/>
+          </a:lnRef>
+          <a:fillRef idx="3">
+            <a:schemeClr val="accent1"/>
+          </a:fillRef>
+          <a:effectRef idx="2">
+            <a:schemeClr val="accent1"/>
+          </a:effectRef>
+          <a:fontRef idx="minor">
+            <a:schemeClr val="lt1"/>
+          </a:fontRef>
+        </p:style>
+        <p:txBody>
+          <a:bodyPr rtlCol="0" anchor="ctr"/>
+          <a:lstStyle/>
+          <a:p>
+            <a:pPr algn="ctr"/>
+            <a:endParaRPr lang="en-US">
+              <a:solidFill>
+                <a:schemeClr val="tx1"/>
+              </a:solidFill>
+            </a:endParaRPr>
+          </a:p>
+        </p:txBody>
+      </p:sp>
+      <p:sp>
+        <p:nvSpPr>
+          <p:cNvPr id="20" name="Trapezoid 19"/>
+          <p:cNvSpPr/>
+          <p:nvPr/>
+        </p:nvSpPr>
+        <p:spPr>
+          <a:xfrm rot="4366681">
+            <a:off x="3531508" y="3356928"/>
+            <a:ext cx="515287" cy="563667"/>
+          </a:xfrm>
+          <a:custGeom>
+            <a:avLst/>
+            <a:gdLst/>
+            <a:ahLst/>
+            <a:cxnLst/>
+            <a:rect l="l" t="t" r="r" b="b"/>
+            <a:pathLst>
+              <a:path w="1524994" h="1504359">
+                <a:moveTo>
+                  <a:pt x="588509" y="687822"/>
+                </a:moveTo>
+                <a:cubicBezTo>
+                  <a:pt x="551168" y="808288"/>
+                  <a:pt x="612427" y="934315"/>
+                  <a:pt x="725335" y="969314"/>
+                </a:cubicBezTo>
+                <a:cubicBezTo>
+                  <a:pt x="838243" y="1004312"/>
+                  <a:pt x="960044" y="935028"/>
+                  <a:pt x="997385" y="814562"/>
+                </a:cubicBezTo>
+                <a:cubicBezTo>
+                  <a:pt x="1034725" y="694097"/>
+                  <a:pt x="973466" y="568069"/>
+                  <a:pt x="860558" y="533071"/>
+                </a:cubicBezTo>
+                <a:cubicBezTo>
+                  <a:pt x="747650" y="498073"/>
+                  <a:pt x="625850" y="567357"/>
+                  <a:pt x="588509" y="687822"/>
+                </a:cubicBezTo>
+                <a:close/>
+                <a:moveTo>
+                  <a:pt x="35727" y="657296"/>
+                </a:moveTo>
+                <a:lnTo>
+                  <a:pt x="377388" y="636354"/>
+                </a:lnTo>
+                <a:lnTo>
+                  <a:pt x="188159" y="296967"/>
+                </a:lnTo>
+                <a:lnTo>
+                  <a:pt x="340497" y="156924"/>
+                </a:lnTo>
+                <a:lnTo>
+                  <a:pt x="626814" y="349744"/>
+                </a:lnTo>
+                <a:lnTo>
+                  <a:pt x="649364" y="340064"/>
+                </a:lnTo>
+                <a:lnTo>
+                  <a:pt x="730691" y="0"/>
+                </a:lnTo>
+                <a:lnTo>
+                  <a:pt x="937618" y="0"/>
+                </a:lnTo>
+                <a:lnTo>
+                  <a:pt x="1021164" y="349342"/>
+                </a:lnTo>
+                <a:lnTo>
+                  <a:pt x="1309410" y="198527"/>
+                </a:lnTo>
+                <a:lnTo>
+                  <a:pt x="1445355" y="354532"/>
+                </a:lnTo>
+                <a:lnTo>
+                  <a:pt x="1220513" y="669970"/>
+                </a:lnTo>
+                <a:lnTo>
+                  <a:pt x="1524994" y="764197"/>
+                </a:lnTo>
+                <a:lnTo>
+                  <a:pt x="1511476" y="970682"/>
+                </a:lnTo>
+                <a:lnTo>
+                  <a:pt x="1199797" y="1023980"/>
+                </a:lnTo>
+                <a:lnTo>
+                  <a:pt x="1295282" y="1349214"/>
+                </a:lnTo>
+                <a:lnTo>
+                  <a:pt x="1115740" y="1452088"/>
+                </a:lnTo>
+                <a:lnTo>
+                  <a:pt x="922993" y="1247274"/>
+                </a:lnTo>
+                <a:lnTo>
+                  <a:pt x="877453" y="1493616"/>
+                </a:lnTo>
+                <a:lnTo>
+                  <a:pt x="670805" y="1504359"/>
+                </a:lnTo>
+                <a:lnTo>
+                  <a:pt x="588121" y="1223885"/>
+                </a:lnTo>
+                <a:lnTo>
+                  <a:pt x="281223" y="1357674"/>
+                </a:lnTo>
+                <a:lnTo>
+                  <a:pt x="156679" y="1192423"/>
+                </a:lnTo>
+                <a:lnTo>
+                  <a:pt x="317010" y="998245"/>
+                </a:lnTo>
+                <a:lnTo>
+                  <a:pt x="0" y="861116"/>
+                </a:lnTo>
+                <a:close/>
+              </a:path>
+            </a:pathLst>
+          </a:custGeom>
+          <a:solidFill>
+            <a:schemeClr val="tx2">
+              <a:lumMod val="60000"/>
+              <a:lumOff val="40000"/>
+            </a:schemeClr>
+          </a:solidFill>
+          <a:ln>
+            <a:noFill/>
+          </a:ln>
+          <a:effectLst/>
+        </p:spPr>
+        <p:style>
+          <a:lnRef idx="1">
+            <a:schemeClr val="accent1"/>
+          </a:lnRef>
+          <a:fillRef idx="3">
+            <a:schemeClr val="accent1"/>
+          </a:fillRef>
+          <a:effectRef idx="2">
+            <a:schemeClr val="accent1"/>
+          </a:effectRef>
+          <a:fontRef idx="minor">
+            <a:schemeClr val="lt1"/>
+          </a:fontRef>
+        </p:style>
+        <p:txBody>
+          <a:bodyPr rtlCol="0" anchor="ctr"/>
+          <a:lstStyle/>
+          <a:p>
+            <a:pPr algn="ctr"/>
+            <a:endParaRPr lang="en-US"/>
+          </a:p>
+        </p:txBody>
+      </p:sp>
+      <p:sp>
+        <p:nvSpPr>
+          <p:cNvPr id="27" name="Trapezoid 19"/>
+          <p:cNvSpPr/>
+          <p:nvPr/>
+        </p:nvSpPr>
+        <p:spPr>
+          <a:xfrm rot="4366681">
+            <a:off x="3362691" y="3802343"/>
+            <a:ext cx="475753" cy="388028"/>
+          </a:xfrm>
+          <a:custGeom>
+            <a:avLst/>
+            <a:gdLst/>
+            <a:ahLst/>
+            <a:cxnLst/>
+            <a:rect l="l" t="t" r="r" b="b"/>
+            <a:pathLst>
+              <a:path w="1524994" h="1504359">
+                <a:moveTo>
+                  <a:pt x="588509" y="687822"/>
+                </a:moveTo>
+                <a:cubicBezTo>
+                  <a:pt x="551168" y="808288"/>
+                  <a:pt x="612427" y="934315"/>
+                  <a:pt x="725335" y="969314"/>
+                </a:cubicBezTo>
+                <a:cubicBezTo>
+                  <a:pt x="838243" y="1004312"/>
+                  <a:pt x="960044" y="935028"/>
+                  <a:pt x="997385" y="814562"/>
+                </a:cubicBezTo>
+                <a:cubicBezTo>
+                  <a:pt x="1034725" y="694097"/>
+                  <a:pt x="973466" y="568069"/>
+                  <a:pt x="860558" y="533071"/>
+                </a:cubicBezTo>
+                <a:cubicBezTo>
+                  <a:pt x="747650" y="498073"/>
+                  <a:pt x="625850" y="567357"/>
+                  <a:pt x="588509" y="687822"/>
+                </a:cubicBezTo>
+                <a:close/>
+                <a:moveTo>
+                  <a:pt x="35727" y="657296"/>
+                </a:moveTo>
+                <a:lnTo>
+                  <a:pt x="377388" y="636354"/>
+                </a:lnTo>
+                <a:lnTo>
+                  <a:pt x="188159" y="296967"/>
+                </a:lnTo>
+                <a:lnTo>
+                  <a:pt x="340497" y="156924"/>
+                </a:lnTo>
+                <a:lnTo>
+                  <a:pt x="626814" y="349744"/>
+                </a:lnTo>
+                <a:lnTo>
+                  <a:pt x="649364" y="340064"/>
+                </a:lnTo>
+                <a:lnTo>
+                  <a:pt x="730691" y="0"/>
+                </a:lnTo>
+                <a:lnTo>
+                  <a:pt x="937618" y="0"/>
+                </a:lnTo>
+                <a:lnTo>
+                  <a:pt x="1021164" y="349342"/>
+                </a:lnTo>
+                <a:lnTo>
+                  <a:pt x="1309410" y="198527"/>
+                </a:lnTo>
+                <a:lnTo>
+                  <a:pt x="1445355" y="354532"/>
+                </a:lnTo>
+                <a:lnTo>
+                  <a:pt x="1220513" y="669970"/>
+                </a:lnTo>
+                <a:lnTo>
+                  <a:pt x="1524994" y="764197"/>
+                </a:lnTo>
+                <a:lnTo>
+                  <a:pt x="1511476" y="970682"/>
+                </a:lnTo>
+                <a:lnTo>
+                  <a:pt x="1199797" y="1023980"/>
+                </a:lnTo>
+                <a:lnTo>
+                  <a:pt x="1295282" y="1349214"/>
+                </a:lnTo>
+                <a:lnTo>
+                  <a:pt x="1115740" y="1452088"/>
+                </a:lnTo>
+                <a:lnTo>
+                  <a:pt x="922993" y="1247274"/>
+                </a:lnTo>
+                <a:lnTo>
+                  <a:pt x="877453" y="1493616"/>
+                </a:lnTo>
+                <a:lnTo>
+                  <a:pt x="670805" y="1504359"/>
+                </a:lnTo>
+                <a:lnTo>
+                  <a:pt x="588121" y="1223885"/>
+                </a:lnTo>
+                <a:lnTo>
+                  <a:pt x="281223" y="1357674"/>
+                </a:lnTo>
+                <a:lnTo>
+                  <a:pt x="156679" y="1192423"/>
+                </a:lnTo>
+                <a:lnTo>
+                  <a:pt x="317010" y="998245"/>
+                </a:lnTo>
+                <a:lnTo>
+                  <a:pt x="0" y="861116"/>
+                </a:lnTo>
+                <a:close/>
+              </a:path>
+            </a:pathLst>
+          </a:custGeom>
+          <a:solidFill>
+            <a:schemeClr val="tx2">
+              <a:lumMod val="60000"/>
+              <a:lumOff val="40000"/>
+            </a:schemeClr>
+          </a:solidFill>
+          <a:ln>
+            <a:noFill/>
+          </a:ln>
+          <a:effectLst/>
+        </p:spPr>
+        <p:style>
+          <a:lnRef idx="1">
+            <a:schemeClr val="accent1"/>
+          </a:lnRef>
+          <a:fillRef idx="3">
+            <a:schemeClr val="accent1"/>
+          </a:fillRef>
+          <a:effectRef idx="2">
+            <a:schemeClr val="accent1"/>
+          </a:effectRef>
+          <a:fontRef idx="minor">
+            <a:schemeClr val="lt1"/>
+          </a:fontRef>
+        </p:style>
+        <p:txBody>
+          <a:bodyPr rtlCol="0" anchor="ctr"/>
+          <a:lstStyle/>
+          <a:p>
+            <a:pPr algn="ctr"/>
+            <a:endParaRPr lang="en-US"/>
+          </a:p>
+        </p:txBody>
+      </p:sp>
+      <p:sp>
+        <p:nvSpPr>
+          <p:cNvPr id="28" name="Trapezoid 19"/>
+          <p:cNvSpPr/>
+          <p:nvPr/>
+        </p:nvSpPr>
+        <p:spPr>
+          <a:xfrm rot="4366681">
+            <a:off x="3833021" y="3756724"/>
+            <a:ext cx="603216" cy="595753"/>
+          </a:xfrm>
+          <a:custGeom>
+            <a:avLst/>
+            <a:gdLst/>
+            <a:ahLst/>
+            <a:cxnLst/>
+            <a:rect l="l" t="t" r="r" b="b"/>
+            <a:pathLst>
+              <a:path w="1524994" h="1504359">
+                <a:moveTo>
+                  <a:pt x="588509" y="687822"/>
+                </a:moveTo>
+                <a:cubicBezTo>
+                  <a:pt x="551168" y="808288"/>
+                  <a:pt x="612427" y="934315"/>
+                  <a:pt x="725335" y="969314"/>
+                </a:cubicBezTo>
+                <a:cubicBezTo>
+                  <a:pt x="838243" y="1004312"/>
+                  <a:pt x="960044" y="935028"/>
+                  <a:pt x="997385" y="814562"/>
+                </a:cubicBezTo>
+                <a:cubicBezTo>
+                  <a:pt x="1034725" y="694097"/>
+                  <a:pt x="973466" y="568069"/>
+                  <a:pt x="860558" y="533071"/>
+                </a:cubicBezTo>
+                <a:cubicBezTo>
+                  <a:pt x="747650" y="498073"/>
+                  <a:pt x="625850" y="567357"/>
+                  <a:pt x="588509" y="687822"/>
+                </a:cubicBezTo>
+                <a:close/>
+                <a:moveTo>
+                  <a:pt x="35727" y="657296"/>
+                </a:moveTo>
+                <a:lnTo>
+                  <a:pt x="377388" y="636354"/>
+                </a:lnTo>
+                <a:lnTo>
+                  <a:pt x="188159" y="296967"/>
+                </a:lnTo>
+                <a:lnTo>
+                  <a:pt x="340497" y="156924"/>
+                </a:lnTo>
+                <a:lnTo>
+                  <a:pt x="626814" y="349744"/>
+                </a:lnTo>
+                <a:lnTo>
+                  <a:pt x="649364" y="340064"/>
+                </a:lnTo>
+                <a:lnTo>
+                  <a:pt x="730691" y="0"/>
+                </a:lnTo>
+                <a:lnTo>
+                  <a:pt x="937618" y="0"/>
+                </a:lnTo>
+                <a:lnTo>
+                  <a:pt x="1021164" y="349342"/>
+                </a:lnTo>
+                <a:lnTo>
+                  <a:pt x="1309410" y="198527"/>
+                </a:lnTo>
+                <a:lnTo>
+                  <a:pt x="1445355" y="354532"/>
+                </a:lnTo>
+                <a:lnTo>
+                  <a:pt x="1220513" y="669970"/>
+                </a:lnTo>
+                <a:lnTo>
+                  <a:pt x="1524994" y="764197"/>
+                </a:lnTo>
+                <a:lnTo>
+                  <a:pt x="1511476" y="970682"/>
+                </a:lnTo>
+                <a:lnTo>
+                  <a:pt x="1199797" y="1023980"/>
+                </a:lnTo>
+                <a:lnTo>
+                  <a:pt x="1295282" y="1349214"/>
+                </a:lnTo>
+                <a:lnTo>
+                  <a:pt x="1115740" y="1452088"/>
+                </a:lnTo>
+                <a:lnTo>
+                  <a:pt x="922993" y="1247274"/>
+                </a:lnTo>
+                <a:lnTo>
+                  <a:pt x="877453" y="1493616"/>
+                </a:lnTo>
+                <a:lnTo>
+                  <a:pt x="670805" y="1504359"/>
+                </a:lnTo>
+                <a:lnTo>
+                  <a:pt x="588121" y="1223885"/>
+                </a:lnTo>
+                <a:lnTo>
+                  <a:pt x="281223" y="1357674"/>
+                </a:lnTo>
+                <a:lnTo>
+                  <a:pt x="156679" y="1192423"/>
+                </a:lnTo>
+                <a:lnTo>
+                  <a:pt x="317010" y="998245"/>
+                </a:lnTo>
+                <a:lnTo>
+                  <a:pt x="0" y="861116"/>
+                </a:lnTo>
+                <a:close/>
+              </a:path>
+            </a:pathLst>
+          </a:custGeom>
+          <a:solidFill>
+            <a:schemeClr val="tx2">
+              <a:lumMod val="60000"/>
+              <a:lumOff val="40000"/>
+            </a:schemeClr>
+          </a:solidFill>
+          <a:ln>
+            <a:noFill/>
+          </a:ln>
+          <a:effectLst/>
+        </p:spPr>
+        <p:style>
+          <a:lnRef idx="1">
+            <a:schemeClr val="accent1"/>
+          </a:lnRef>
+          <a:fillRef idx="3">
+            <a:schemeClr val="accent1"/>
+          </a:fillRef>
+          <a:effectRef idx="2">
+            <a:schemeClr val="accent1"/>
+          </a:effectRef>
+          <a:fontRef idx="minor">
+            <a:schemeClr val="lt1"/>
+          </a:fontRef>
+        </p:style>
+        <p:txBody>
+          <a:bodyPr rtlCol="0" anchor="ctr"/>
+          <a:lstStyle/>
+          <a:p>
+            <a:pPr algn="ctr"/>
+            <a:endParaRPr lang="en-US"/>
+          </a:p>
+        </p:txBody>
+      </p:sp>
+      <p:sp>
+        <p:nvSpPr>
+          <p:cNvPr id="33" name="Block Arc 3"/>
+          <p:cNvSpPr/>
+          <p:nvPr/>
+        </p:nvSpPr>
+        <p:spPr>
+          <a:xfrm rot="1424792">
+            <a:off x="5430615" y="1933012"/>
+            <a:ext cx="770622" cy="1545601"/>
+          </a:xfrm>
+          <a:custGeom>
+            <a:avLst/>
+            <a:gdLst/>
+            <a:ahLst/>
+            <a:cxnLst/>
+            <a:rect l="l" t="t" r="r" b="b"/>
+            <a:pathLst>
+              <a:path w="770622" h="1545601">
+                <a:moveTo>
+                  <a:pt x="0" y="0"/>
+                </a:moveTo>
+                <a:lnTo>
+                  <a:pt x="192655" y="0"/>
+                </a:lnTo>
+                <a:cubicBezTo>
+                  <a:pt x="192655" y="161537"/>
+                  <a:pt x="278910" y="292488"/>
+                  <a:pt x="385311" y="292488"/>
+                </a:cubicBezTo>
+                <a:cubicBezTo>
+                  <a:pt x="491712" y="292488"/>
+                  <a:pt x="577967" y="161537"/>
+                  <a:pt x="577967" y="0"/>
+                </a:cubicBezTo>
+                <a:lnTo>
+                  <a:pt x="770622" y="0"/>
+                </a:lnTo>
+                <a:cubicBezTo>
+                  <a:pt x="770622" y="200953"/>
+                  <a:pt x="673585" y="373369"/>
+                  <a:pt x="535291" y="447018"/>
+                </a:cubicBezTo>
+                <a:lnTo>
+                  <a:pt x="485207" y="466593"/>
+                </a:lnTo>
+                <a:lnTo>
+                  <a:pt x="485207" y="1079008"/>
+                </a:lnTo>
+                <a:lnTo>
+                  <a:pt x="535291" y="1098583"/>
+                </a:lnTo>
+                <a:cubicBezTo>
+                  <a:pt x="673585" y="1172232"/>
+                  <a:pt x="770622" y="1344648"/>
+                  <a:pt x="770622" y="1545601"/>
+                </a:cubicBezTo>
+                <a:lnTo>
+                  <a:pt x="577967" y="1545601"/>
+                </a:lnTo>
+                <a:cubicBezTo>
+                  <a:pt x="577967" y="1384064"/>
+                  <a:pt x="491712" y="1253113"/>
+                  <a:pt x="385311" y="1253113"/>
+                </a:cubicBezTo>
+                <a:cubicBezTo>
+                  <a:pt x="278910" y="1253113"/>
+                  <a:pt x="192655" y="1384064"/>
+                  <a:pt x="192655" y="1545601"/>
+                </a:cubicBezTo>
+                <a:lnTo>
+                  <a:pt x="0" y="1545601"/>
+                </a:lnTo>
+                <a:cubicBezTo>
+                  <a:pt x="0" y="1344648"/>
+                  <a:pt x="97037" y="1172232"/>
+                  <a:pt x="235331" y="1098583"/>
+                </a:cubicBezTo>
+                <a:lnTo>
+                  <a:pt x="299686" y="1073430"/>
+                </a:lnTo>
+                <a:lnTo>
+                  <a:pt x="299686" y="472171"/>
+                </a:lnTo>
+                <a:lnTo>
+                  <a:pt x="235331" y="447018"/>
+                </a:lnTo>
+                <a:cubicBezTo>
+                  <a:pt x="97037" y="373369"/>
+                  <a:pt x="0" y="200953"/>
+                  <a:pt x="0" y="0"/>
+                </a:cubicBezTo>
+                <a:close/>
+              </a:path>
+            </a:pathLst>
+          </a:custGeom>
+          <a:solidFill>
+            <a:schemeClr val="tx2">
+              <a:lumMod val="60000"/>
+              <a:lumOff val="40000"/>
+            </a:schemeClr>
+          </a:solidFill>
+          <a:ln>
+            <a:noFill/>
+          </a:ln>
+          <a:effectLst/>
+        </p:spPr>
+        <p:style>
+          <a:lnRef idx="1">
+            <a:schemeClr val="accent1"/>
+          </a:lnRef>
+          <a:fillRef idx="3">
+            <a:schemeClr val="accent1"/>
+          </a:fillRef>
+          <a:effectRef idx="2">
+            <a:schemeClr val="accent1"/>
+          </a:effectRef>
+          <a:fontRef idx="minor">
+            <a:schemeClr val="lt1"/>
+          </a:fontRef>
+        </p:style>
+        <p:txBody>
+          <a:bodyPr rtlCol="0" anchor="ctr"/>
+          <a:lstStyle/>
+          <a:p>
+            <a:pPr algn="ctr"/>
+            <a:endParaRPr lang="en-US">
+              <a:solidFill>
+                <a:schemeClr val="tx1"/>
+              </a:solidFill>
+            </a:endParaRPr>
+          </a:p>
+        </p:txBody>
+      </p:sp>
+      <p:sp>
+        <p:nvSpPr>
+          <p:cNvPr id="34" name="Trapezoid 19"/>
+          <p:cNvSpPr/>
+          <p:nvPr/>
+        </p:nvSpPr>
+        <p:spPr>
+          <a:xfrm rot="4366681">
+            <a:off x="5938615" y="2521626"/>
+            <a:ext cx="866241" cy="820973"/>
+          </a:xfrm>
+          <a:custGeom>
+            <a:avLst/>
+            <a:gdLst/>
+            <a:ahLst/>
+            <a:cxnLst/>
+            <a:rect l="l" t="t" r="r" b="b"/>
+            <a:pathLst>
+              <a:path w="1524994" h="1504359">
+                <a:moveTo>
+                  <a:pt x="588509" y="687822"/>
+                </a:moveTo>
+                <a:cubicBezTo>
+                  <a:pt x="551168" y="808288"/>
+                  <a:pt x="612427" y="934315"/>
+                  <a:pt x="725335" y="969314"/>
+                </a:cubicBezTo>
+                <a:cubicBezTo>
+                  <a:pt x="838243" y="1004312"/>
+                  <a:pt x="960044" y="935028"/>
+                  <a:pt x="997385" y="814562"/>
+                </a:cubicBezTo>
+                <a:cubicBezTo>
+                  <a:pt x="1034725" y="694097"/>
+                  <a:pt x="973466" y="568069"/>
+                  <a:pt x="860558" y="533071"/>
+                </a:cubicBezTo>
+                <a:cubicBezTo>
+                  <a:pt x="747650" y="498073"/>
+                  <a:pt x="625850" y="567357"/>
+                  <a:pt x="588509" y="687822"/>
+                </a:cubicBezTo>
+                <a:close/>
+                <a:moveTo>
+                  <a:pt x="35727" y="657296"/>
+                </a:moveTo>
+                <a:lnTo>
+                  <a:pt x="377388" y="636354"/>
+                </a:lnTo>
+                <a:lnTo>
+                  <a:pt x="188159" y="296967"/>
+                </a:lnTo>
+                <a:lnTo>
+                  <a:pt x="340497" y="156924"/>
+                </a:lnTo>
+                <a:lnTo>
+                  <a:pt x="626814" y="349744"/>
+                </a:lnTo>
+                <a:lnTo>
+                  <a:pt x="649364" y="340064"/>
+                </a:lnTo>
+                <a:lnTo>
+                  <a:pt x="730691" y="0"/>
+                </a:lnTo>
+                <a:lnTo>
+                  <a:pt x="937618" y="0"/>
+                </a:lnTo>
+                <a:lnTo>
+                  <a:pt x="1021164" y="349342"/>
+                </a:lnTo>
+                <a:lnTo>
+                  <a:pt x="1309410" y="198527"/>
+                </a:lnTo>
+                <a:lnTo>
+                  <a:pt x="1445355" y="354532"/>
+                </a:lnTo>
+                <a:lnTo>
+                  <a:pt x="1220513" y="669970"/>
+                </a:lnTo>
+                <a:lnTo>
+                  <a:pt x="1524994" y="764197"/>
+                </a:lnTo>
+                <a:lnTo>
+                  <a:pt x="1511476" y="970682"/>
+                </a:lnTo>
+                <a:lnTo>
+                  <a:pt x="1199797" y="1023980"/>
+                </a:lnTo>
+                <a:lnTo>
+                  <a:pt x="1295282" y="1349214"/>
+                </a:lnTo>
+                <a:lnTo>
+                  <a:pt x="1115740" y="1452088"/>
+                </a:lnTo>
+                <a:lnTo>
+                  <a:pt x="922993" y="1247274"/>
+                </a:lnTo>
+                <a:lnTo>
+                  <a:pt x="877453" y="1493616"/>
+                </a:lnTo>
+                <a:lnTo>
+                  <a:pt x="670805" y="1504359"/>
+                </a:lnTo>
+                <a:lnTo>
+                  <a:pt x="588121" y="1223885"/>
+                </a:lnTo>
+                <a:lnTo>
+                  <a:pt x="281223" y="1357674"/>
+                </a:lnTo>
+                <a:lnTo>
+                  <a:pt x="156679" y="1192423"/>
+                </a:lnTo>
+                <a:lnTo>
+                  <a:pt x="317010" y="998245"/>
+                </a:lnTo>
+                <a:lnTo>
+                  <a:pt x="0" y="861116"/>
+                </a:lnTo>
+                <a:close/>
+              </a:path>
+            </a:pathLst>
+          </a:custGeom>
+          <a:solidFill>
+            <a:schemeClr val="tx2">
+              <a:lumMod val="60000"/>
+              <a:lumOff val="40000"/>
+            </a:schemeClr>
+          </a:solidFill>
+          <a:ln>
+            <a:noFill/>
+          </a:ln>
+          <a:effectLst/>
+        </p:spPr>
+        <p:style>
+          <a:lnRef idx="1">
+            <a:schemeClr val="accent1"/>
+          </a:lnRef>
+          <a:fillRef idx="3">
+            <a:schemeClr val="accent1"/>
+          </a:fillRef>
+          <a:effectRef idx="2">
+            <a:schemeClr val="accent1"/>
+          </a:effectRef>
+          <a:fontRef idx="minor">
+            <a:schemeClr val="lt1"/>
+          </a:fontRef>
+        </p:style>
+        <p:txBody>
+          <a:bodyPr rtlCol="0" anchor="ctr"/>
+          <a:lstStyle/>
+          <a:p>
+            <a:pPr algn="ctr"/>
+            <a:endParaRPr lang="en-US"/>
+          </a:p>
+        </p:txBody>
+      </p:sp>
+    </p:spTree>
+    <p:extLst>
+      <p:ext uri="{BB962C8B-B14F-4D97-AF65-F5344CB8AC3E}">
+        <p14:creationId xmlns:p14="http://schemas.microsoft.com/office/powerpoint/2010/main" val="2577128404"/>
+      </p:ext>
+    </p:extLst>
+  </p:cSld>
+  <p:clrMapOvr>
+    <a:masterClrMapping/>
+  </p:clrMapOvr>
+</p:sld>
+</file>
+
 <file path=ppt/theme/theme1.xml><?xml version="1.0" encoding="utf-8"?>
 <a:theme xmlns:a="http://schemas.openxmlformats.org/drawingml/2006/main" name="Office Theme">
   <a:themeElements>

</xml_diff>

<commit_message>
adding the box to idea box page
</commit_message>
<xml_diff>
--- a/edoc person.pptx
+++ b/edoc person.pptx
@@ -293,7 +293,7 @@
           <a:p>
             <a:fld id="{CC5F992D-EA7D-6042-A048-FB62374BB333}" type="datetimeFigureOut">
               <a:rPr lang="en-US" smtClean="0"/>
-              <a:t>20/11/18</a:t>
+              <a:t>26/11/18</a:t>
             </a:fld>
             <a:endParaRPr lang="en-US"/>
           </a:p>
@@ -463,7 +463,7 @@
           <a:p>
             <a:fld id="{CC5F992D-EA7D-6042-A048-FB62374BB333}" type="datetimeFigureOut">
               <a:rPr lang="en-US" smtClean="0"/>
-              <a:t>20/11/18</a:t>
+              <a:t>26/11/18</a:t>
             </a:fld>
             <a:endParaRPr lang="en-US"/>
           </a:p>
@@ -643,7 +643,7 @@
           <a:p>
             <a:fld id="{CC5F992D-EA7D-6042-A048-FB62374BB333}" type="datetimeFigureOut">
               <a:rPr lang="en-US" smtClean="0"/>
-              <a:t>20/11/18</a:t>
+              <a:t>26/11/18</a:t>
             </a:fld>
             <a:endParaRPr lang="en-US"/>
           </a:p>
@@ -813,7 +813,7 @@
           <a:p>
             <a:fld id="{CC5F992D-EA7D-6042-A048-FB62374BB333}" type="datetimeFigureOut">
               <a:rPr lang="en-US" smtClean="0"/>
-              <a:t>20/11/18</a:t>
+              <a:t>26/11/18</a:t>
             </a:fld>
             <a:endParaRPr lang="en-US"/>
           </a:p>
@@ -1059,7 +1059,7 @@
           <a:p>
             <a:fld id="{CC5F992D-EA7D-6042-A048-FB62374BB333}" type="datetimeFigureOut">
               <a:rPr lang="en-US" smtClean="0"/>
-              <a:t>20/11/18</a:t>
+              <a:t>26/11/18</a:t>
             </a:fld>
             <a:endParaRPr lang="en-US"/>
           </a:p>
@@ -1347,7 +1347,7 @@
           <a:p>
             <a:fld id="{CC5F992D-EA7D-6042-A048-FB62374BB333}" type="datetimeFigureOut">
               <a:rPr lang="en-US" smtClean="0"/>
-              <a:t>20/11/18</a:t>
+              <a:t>26/11/18</a:t>
             </a:fld>
             <a:endParaRPr lang="en-US"/>
           </a:p>
@@ -1769,7 +1769,7 @@
           <a:p>
             <a:fld id="{CC5F992D-EA7D-6042-A048-FB62374BB333}" type="datetimeFigureOut">
               <a:rPr lang="en-US" smtClean="0"/>
-              <a:t>20/11/18</a:t>
+              <a:t>26/11/18</a:t>
             </a:fld>
             <a:endParaRPr lang="en-US"/>
           </a:p>
@@ -1887,7 +1887,7 @@
           <a:p>
             <a:fld id="{CC5F992D-EA7D-6042-A048-FB62374BB333}" type="datetimeFigureOut">
               <a:rPr lang="en-US" smtClean="0"/>
-              <a:t>20/11/18</a:t>
+              <a:t>26/11/18</a:t>
             </a:fld>
             <a:endParaRPr lang="en-US"/>
           </a:p>
@@ -1982,7 +1982,7 @@
           <a:p>
             <a:fld id="{CC5F992D-EA7D-6042-A048-FB62374BB333}" type="datetimeFigureOut">
               <a:rPr lang="en-US" smtClean="0"/>
-              <a:t>20/11/18</a:t>
+              <a:t>26/11/18</a:t>
             </a:fld>
             <a:endParaRPr lang="en-US"/>
           </a:p>
@@ -2259,7 +2259,7 @@
           <a:p>
             <a:fld id="{CC5F992D-EA7D-6042-A048-FB62374BB333}" type="datetimeFigureOut">
               <a:rPr lang="en-US" smtClean="0"/>
-              <a:t>20/11/18</a:t>
+              <a:t>26/11/18</a:t>
             </a:fld>
             <a:endParaRPr lang="en-US"/>
           </a:p>
@@ -2512,7 +2512,7 @@
           <a:p>
             <a:fld id="{CC5F992D-EA7D-6042-A048-FB62374BB333}" type="datetimeFigureOut">
               <a:rPr lang="en-US" smtClean="0"/>
-              <a:t>20/11/18</a:t>
+              <a:t>26/11/18</a:t>
             </a:fld>
             <a:endParaRPr lang="en-US"/>
           </a:p>
@@ -2725,7 +2725,7 @@
           <a:p>
             <a:fld id="{CC5F992D-EA7D-6042-A048-FB62374BB333}" type="datetimeFigureOut">
               <a:rPr lang="en-US" smtClean="0"/>
-              <a:t>20/11/18</a:t>
+              <a:t>26/11/18</a:t>
             </a:fld>
             <a:endParaRPr lang="en-US"/>
           </a:p>
@@ -6423,12 +6423,29 @@
         </p:nvSpPr>
         <p:spPr>
           <a:xfrm>
-            <a:off x="2725718" y="2639750"/>
-            <a:ext cx="3453528" cy="2711095"/>
+            <a:off x="2240511" y="2240220"/>
+            <a:ext cx="4866335" cy="3310390"/>
           </a:xfrm>
           <a:prstGeom prst="cube">
             <a:avLst/>
           </a:prstGeom>
+          <a:solidFill>
+            <a:srgbClr val="FFFFCA"/>
+          </a:solidFill>
+          <a:ln w="38100" cmpd="sng">
+            <a:solidFill>
+              <a:schemeClr val="accent6">
+                <a:lumMod val="75000"/>
+              </a:schemeClr>
+            </a:solidFill>
+          </a:ln>
+          <a:effectLst>
+            <a:outerShdw blurRad="40000" dist="23000" dir="5400000" rotWithShape="0">
+              <a:srgbClr val="000000">
+                <a:alpha val="35000"/>
+              </a:srgbClr>
+            </a:outerShdw>
+          </a:effectLst>
         </p:spPr>
         <p:style>
           <a:lnRef idx="1">
@@ -6449,46 +6466,10 @@
           <a:lstStyle/>
           <a:p>
             <a:pPr algn="ctr"/>
-            <a:endParaRPr lang="en-US"/>
+            <a:endParaRPr lang="en-US" dirty="0"/>
           </a:p>
         </p:txBody>
       </p:sp>
-      <p:cxnSp>
-        <p:nvCxnSpPr>
-          <p:cNvPr id="9" name="Straight Connector 8"/>
-          <p:cNvCxnSpPr/>
-          <p:nvPr/>
-        </p:nvCxnSpPr>
-        <p:spPr>
-          <a:xfrm>
-            <a:off x="3953005" y="2925129"/>
-            <a:ext cx="984684" cy="14269"/>
-          </a:xfrm>
-          <a:prstGeom prst="line">
-            <a:avLst/>
-          </a:prstGeom>
-          <a:ln w="76200" cmpd="sng">
-            <a:solidFill>
-              <a:schemeClr val="tx1"/>
-            </a:solidFill>
-          </a:ln>
-          <a:effectLst/>
-        </p:spPr>
-        <p:style>
-          <a:lnRef idx="2">
-            <a:schemeClr val="accent1"/>
-          </a:lnRef>
-          <a:fillRef idx="0">
-            <a:schemeClr val="accent1"/>
-          </a:fillRef>
-          <a:effectRef idx="1">
-            <a:schemeClr val="accent1"/>
-          </a:effectRef>
-          <a:fontRef idx="minor">
-            <a:schemeClr val="tx1"/>
-          </a:fontRef>
-        </p:style>
-      </p:cxnSp>
     </p:spTree>
     <p:extLst>
       <p:ext uri="{BB962C8B-B14F-4D97-AF65-F5344CB8AC3E}">

</xml_diff>